<commit_message>
Finalisation de la présentation, ajout de commentaires
</commit_message>
<xml_diff>
--- a/Administration/JamesGouinSePresente.pptx
+++ b/Administration/JamesGouinSePresente.pptx
@@ -793,20 +793,418 @@
             </a:r>
           </a:p>
           <a:p>
-            <a:r>
-              <a:rPr lang="fr-FR" dirty="0" smtClean="0"/>
-              <a:t>	- Champ de vision,</a:t>
-            </a:r>
+            <a:endParaRPr lang="fr-FR" dirty="0" smtClean="0"/>
+          </a:p>
+          <a:p>
+            <a:r>
+              <a:rPr lang="fr-FR" b="1" dirty="0" smtClean="0"/>
+              <a:t>Classes</a:t>
+            </a:r>
+            <a:r>
+              <a:rPr lang="fr-FR" b="1" baseline="0" dirty="0" smtClean="0"/>
+              <a:t> Ennemi (héritage)</a:t>
+            </a:r>
+          </a:p>
+          <a:p>
+            <a:pPr marL="171450" indent="-171450">
+              <a:buFont typeface="Arial"/>
+              <a:buChar char="•"/>
+            </a:pPr>
+            <a:r>
+              <a:rPr lang="fr-FR" baseline="0" dirty="0" err="1" smtClean="0"/>
+              <a:t>E_Renard</a:t>
+            </a:r>
+            <a:endParaRPr lang="fr-FR" baseline="0" dirty="0" smtClean="0"/>
+          </a:p>
+          <a:p>
+            <a:pPr marL="171450" indent="-171450">
+              <a:buFont typeface="Arial"/>
+              <a:buChar char="•"/>
+            </a:pPr>
+            <a:r>
+              <a:rPr lang="fr-FR" baseline="0" dirty="0" err="1" smtClean="0"/>
+              <a:t>E_Loup</a:t>
+            </a:r>
+            <a:endParaRPr lang="fr-FR" dirty="0" smtClean="0"/>
+          </a:p>
+          <a:p>
+            <a:endParaRPr lang="fr-FR" dirty="0" smtClean="0"/>
+          </a:p>
+          <a:p>
+            <a:pPr marL="0" indent="0">
+              <a:buFont typeface="Arial"/>
+              <a:buNone/>
+            </a:pPr>
+            <a:r>
+              <a:rPr lang="fr-FR" b="1" dirty="0" smtClean="0"/>
+              <a:t>Champ </a:t>
+            </a:r>
+            <a:r>
+              <a:rPr lang="fr-FR" b="1" dirty="0" smtClean="0"/>
+              <a:t>de </a:t>
+            </a:r>
+            <a:r>
+              <a:rPr lang="fr-FR" b="1" dirty="0" smtClean="0"/>
+              <a:t>vision, création</a:t>
+            </a:r>
+          </a:p>
+          <a:p>
+            <a:pPr marL="171450" indent="-171450">
+              <a:buFont typeface="Arial"/>
+              <a:buChar char="•"/>
+            </a:pPr>
             <a:r>
               <a:rPr lang="fr-FR" baseline="0" dirty="0" smtClean="0"/>
-              <a:t> lignes et colonne, tout dans une liste dans Ennemi.</a:t>
-            </a:r>
-          </a:p>
-          <a:p>
+              <a:t>blocs assignés </a:t>
+            </a:r>
             <a:r>
               <a:rPr lang="fr-FR" baseline="0" dirty="0" smtClean="0"/>
-              <a:t>	- </a:t>
-            </a:r>
+              <a:t>à une</a:t>
+            </a:r>
+            <a:r>
+              <a:rPr lang="fr-FR" baseline="0" dirty="0" smtClean="0"/>
+              <a:t> </a:t>
+            </a:r>
+            <a:r>
+              <a:rPr lang="fr-FR" baseline="0" dirty="0" smtClean="0"/>
+              <a:t>lignes et colonne, tout dans une liste dans Ennemi.</a:t>
+            </a:r>
+          </a:p>
+          <a:p>
+            <a:pPr marL="171450" indent="-171450">
+              <a:buFont typeface="Arial"/>
+              <a:buChar char="•"/>
+            </a:pPr>
+            <a:r>
+              <a:rPr lang="fr-FR" baseline="0" dirty="0" smtClean="0"/>
+              <a:t>forme du champ de vision définissable avec des blocs assignés </a:t>
+            </a:r>
+            <a:r>
+              <a:rPr lang="fr-FR" baseline="0" dirty="0" smtClean="0"/>
+              <a:t>à</a:t>
+            </a:r>
+            <a:r>
+              <a:rPr lang="fr-FR" baseline="0" dirty="0" smtClean="0"/>
+              <a:t> certaines lignes et colonnes.</a:t>
+            </a:r>
+          </a:p>
+          <a:p>
+            <a:pPr marL="628650" lvl="1" indent="-171450">
+              <a:buFont typeface="Arial"/>
+              <a:buChar char="•"/>
+            </a:pPr>
+            <a:r>
+              <a:rPr lang="fr-FR" baseline="0" dirty="0" smtClean="0"/>
+              <a:t>Dessin créer dans les classes </a:t>
+            </a:r>
+            <a:r>
+              <a:rPr lang="fr-FR" baseline="0" dirty="0" err="1" smtClean="0"/>
+              <a:t>héritantes</a:t>
+            </a:r>
+            <a:endParaRPr lang="fr-FR" baseline="0" dirty="0" smtClean="0"/>
+          </a:p>
+          <a:p>
+            <a:pPr marL="171450" indent="-171450">
+              <a:buFont typeface="Arial"/>
+              <a:buChar char="•"/>
+            </a:pPr>
+            <a:r>
+              <a:rPr lang="fr-FR" baseline="0" dirty="0" smtClean="0"/>
+              <a:t>Utilisation des lignes et colonnes de chaque bloc pour leur position suivant l’orientation du méchant.</a:t>
+            </a:r>
+          </a:p>
+          <a:p>
+            <a:pPr marL="171450" indent="-171450">
+              <a:buFont typeface="Arial"/>
+              <a:buChar char="•"/>
+            </a:pPr>
+            <a:endParaRPr lang="fr-FR" baseline="0" dirty="0" smtClean="0"/>
+          </a:p>
+          <a:p>
+            <a:pPr marL="0" indent="0">
+              <a:buFont typeface="Arial"/>
+              <a:buNone/>
+            </a:pPr>
+            <a:r>
+              <a:rPr lang="fr-FR" b="1" baseline="0" dirty="0" smtClean="0"/>
+              <a:t>Mise </a:t>
+            </a:r>
+            <a:r>
+              <a:rPr lang="fr-FR" b="1" baseline="0" dirty="0" smtClean="0"/>
+              <a:t>à</a:t>
+            </a:r>
+            <a:r>
+              <a:rPr lang="fr-FR" b="1" baseline="0" dirty="0" smtClean="0"/>
+              <a:t> jour du champ de vision 10fois par seconde :</a:t>
+            </a:r>
+          </a:p>
+          <a:p>
+            <a:pPr marL="171450" indent="-171450">
+              <a:buFont typeface="Arial"/>
+              <a:buChar char="•"/>
+            </a:pPr>
+            <a:r>
+              <a:rPr lang="fr-FR" baseline="0" dirty="0" smtClean="0"/>
+              <a:t>Utilisation d’un seul </a:t>
+            </a:r>
+            <a:r>
+              <a:rPr lang="fr-FR" baseline="0" dirty="0" err="1" smtClean="0"/>
+              <a:t>timer</a:t>
+            </a:r>
+            <a:r>
+              <a:rPr lang="fr-FR" baseline="0" dirty="0" smtClean="0"/>
+              <a:t> connecté sur la scène pour tout les ennemis mais déplacements non-simultanés.</a:t>
+            </a:r>
+          </a:p>
+          <a:p>
+            <a:pPr marL="171450" marR="0" lvl="0" indent="-171450" algn="l" defTabSz="457200" rtl="0" eaLnBrk="1" fontAlgn="auto" latinLnBrk="0" hangingPunct="1">
+              <a:lnSpc>
+                <a:spcPct val="100000"/>
+              </a:lnSpc>
+              <a:spcBef>
+                <a:spcPts val="0"/>
+              </a:spcBef>
+              <a:spcAft>
+                <a:spcPts val="0"/>
+              </a:spcAft>
+              <a:buClrTx/>
+              <a:buSzTx/>
+              <a:buFont typeface="Arial"/>
+              <a:buChar char="•"/>
+              <a:tabLst/>
+              <a:defRPr/>
+            </a:pPr>
+            <a:r>
+              <a:rPr lang="fr-FR" baseline="0" dirty="0" smtClean="0"/>
+              <a:t>Détection du pingouin</a:t>
+            </a:r>
+          </a:p>
+          <a:p>
+            <a:pPr marL="171450" marR="0" lvl="0" indent="-171450" algn="l" defTabSz="457200" rtl="0" eaLnBrk="1" fontAlgn="auto" latinLnBrk="0" hangingPunct="1">
+              <a:lnSpc>
+                <a:spcPct val="100000"/>
+              </a:lnSpc>
+              <a:spcBef>
+                <a:spcPts val="0"/>
+              </a:spcBef>
+              <a:spcAft>
+                <a:spcPts val="0"/>
+              </a:spcAft>
+              <a:buClrTx/>
+              <a:buSzTx/>
+              <a:buFont typeface="Arial"/>
+              <a:buChar char="•"/>
+              <a:tabLst/>
+              <a:defRPr/>
+            </a:pPr>
+            <a:r>
+              <a:rPr lang="fr-FR" baseline="0" dirty="0" smtClean="0"/>
+              <a:t>Zones du champ de vision désactivées en vertes :</a:t>
+            </a:r>
+          </a:p>
+          <a:p>
+            <a:pPr marL="628650" marR="0" lvl="1" indent="-171450" algn="l" defTabSz="457200" rtl="0" eaLnBrk="1" fontAlgn="auto" latinLnBrk="0" hangingPunct="1">
+              <a:lnSpc>
+                <a:spcPct val="100000"/>
+              </a:lnSpc>
+              <a:spcBef>
+                <a:spcPts val="0"/>
+              </a:spcBef>
+              <a:spcAft>
+                <a:spcPts val="0"/>
+              </a:spcAft>
+              <a:buClrTx/>
+              <a:buSzTx/>
+              <a:buFont typeface="Arial"/>
+              <a:buChar char="•"/>
+              <a:tabLst/>
+              <a:defRPr/>
+            </a:pPr>
+            <a:r>
+              <a:rPr lang="fr-FR" baseline="0" dirty="0" smtClean="0"/>
+              <a:t>Utilisation des lignes et colonnes. Si tout le blocs après la lignes sont désactivés.</a:t>
+            </a:r>
+          </a:p>
+          <a:p>
+            <a:pPr marL="628650" marR="0" lvl="1" indent="-171450" algn="l" defTabSz="457200" rtl="0" eaLnBrk="1" fontAlgn="auto" latinLnBrk="0" hangingPunct="1">
+              <a:lnSpc>
+                <a:spcPct val="100000"/>
+              </a:lnSpc>
+              <a:spcBef>
+                <a:spcPts val="0"/>
+              </a:spcBef>
+              <a:spcAft>
+                <a:spcPts val="0"/>
+              </a:spcAft>
+              <a:buClrTx/>
+              <a:buSzTx/>
+              <a:buFont typeface="Arial"/>
+              <a:buChar char="•"/>
+              <a:tabLst/>
+              <a:defRPr/>
+            </a:pPr>
+            <a:r>
+              <a:rPr lang="fr-FR" baseline="0" dirty="0" smtClean="0"/>
+              <a:t>Pour champs de vision extra large : implémentation pensée mais pas mise en place</a:t>
+            </a:r>
+          </a:p>
+          <a:p>
+            <a:pPr marL="914400" marR="0" lvl="2" indent="0" algn="l" defTabSz="457200" rtl="0" eaLnBrk="1" fontAlgn="auto" latinLnBrk="0" hangingPunct="1">
+              <a:lnSpc>
+                <a:spcPct val="100000"/>
+              </a:lnSpc>
+              <a:spcBef>
+                <a:spcPts val="0"/>
+              </a:spcBef>
+              <a:spcAft>
+                <a:spcPts val="0"/>
+              </a:spcAft>
+              <a:buClrTx/>
+              <a:buSzTx/>
+              <a:buFont typeface="Arial"/>
+              <a:buNone/>
+              <a:tabLst/>
+              <a:defRPr/>
+            </a:pPr>
+            <a:endParaRPr lang="fr-FR" sz="1200" kern="1200" baseline="0" dirty="0" smtClean="0">
+              <a:solidFill>
+                <a:schemeClr val="tx1"/>
+              </a:solidFill>
+              <a:effectLst/>
+              <a:latin typeface="+mn-lt"/>
+              <a:ea typeface="+mn-ea"/>
+              <a:cs typeface="+mn-cs"/>
+            </a:endParaRPr>
+          </a:p>
+          <a:p>
+            <a:pPr marL="914400" marR="0" lvl="2" indent="0" algn="l" defTabSz="457200" rtl="0" eaLnBrk="1" fontAlgn="auto" latinLnBrk="0" hangingPunct="1">
+              <a:lnSpc>
+                <a:spcPct val="100000"/>
+              </a:lnSpc>
+              <a:spcBef>
+                <a:spcPts val="0"/>
+              </a:spcBef>
+              <a:spcAft>
+                <a:spcPts val="0"/>
+              </a:spcAft>
+              <a:buClrTx/>
+              <a:buSzTx/>
+              <a:buFont typeface="Arial"/>
+              <a:buNone/>
+              <a:tabLst/>
+              <a:defRPr/>
+            </a:pPr>
+            <a:r>
+              <a:rPr lang="fr-FR" sz="1200" kern="1200" dirty="0" smtClean="0">
+                <a:solidFill>
+                  <a:schemeClr val="tx1"/>
+                </a:solidFill>
+                <a:effectLst/>
+                <a:latin typeface="+mn-lt"/>
+                <a:ea typeface="+mn-ea"/>
+                <a:cs typeface="+mn-cs"/>
+              </a:rPr>
+              <a:t>B(colonne, ligne) obstrué : </a:t>
+            </a:r>
+          </a:p>
+          <a:p>
+            <a:pPr marL="1085850" lvl="2" indent="-171450">
+              <a:buFont typeface="Arial"/>
+              <a:buChar char="•"/>
+            </a:pPr>
+            <a:r>
+              <a:rPr lang="fr-FR" sz="1200" kern="1200" dirty="0" smtClean="0">
+                <a:solidFill>
+                  <a:schemeClr val="tx1"/>
+                </a:solidFill>
+                <a:effectLst/>
+                <a:latin typeface="+mn-lt"/>
+                <a:ea typeface="+mn-ea"/>
+                <a:cs typeface="+mn-cs"/>
+              </a:rPr>
+              <a:t>B(&gt;colonne, ligne) seront désactivés. (implémenté)</a:t>
+            </a:r>
+          </a:p>
+          <a:p>
+            <a:pPr marL="1085850" lvl="2" indent="-171450">
+              <a:buFont typeface="Arial"/>
+              <a:buChar char="•"/>
+            </a:pPr>
+            <a:r>
+              <a:rPr lang="fr-FR" sz="1200" kern="1200" dirty="0" smtClean="0">
+                <a:solidFill>
+                  <a:schemeClr val="tx1"/>
+                </a:solidFill>
+                <a:effectLst/>
+                <a:latin typeface="+mn-lt"/>
+                <a:ea typeface="+mn-ea"/>
+                <a:cs typeface="+mn-cs"/>
+              </a:rPr>
+              <a:t>Si le bloc de direction est obstrué, tous les autres blocs sont désactivés ! (implémenté)</a:t>
+            </a:r>
+          </a:p>
+          <a:p>
+            <a:pPr marL="1085850" lvl="2" indent="-171450">
+              <a:buFont typeface="Arial"/>
+              <a:buChar char="•"/>
+            </a:pPr>
+            <a:r>
+              <a:rPr lang="fr-FR" sz="1200" kern="1200" dirty="0" smtClean="0">
+                <a:solidFill>
+                  <a:schemeClr val="tx1"/>
+                </a:solidFill>
+                <a:effectLst/>
+                <a:latin typeface="+mn-lt"/>
+                <a:ea typeface="+mn-ea"/>
+                <a:cs typeface="+mn-cs"/>
+              </a:rPr>
+              <a:t>Si ligne &gt; 0 : 	B(&gt;colonne, &gt;=ligne ) seront désactivés. (non implémenté)</a:t>
+            </a:r>
+          </a:p>
+          <a:p>
+            <a:pPr marL="1085850" lvl="2" indent="-171450">
+              <a:buFont typeface="Arial"/>
+              <a:buChar char="•"/>
+            </a:pPr>
+            <a:r>
+              <a:rPr lang="fr-FR" sz="1200" kern="1200" dirty="0" smtClean="0">
+                <a:solidFill>
+                  <a:schemeClr val="tx1"/>
+                </a:solidFill>
+                <a:effectLst/>
+                <a:latin typeface="+mn-lt"/>
+                <a:ea typeface="+mn-ea"/>
+                <a:cs typeface="+mn-cs"/>
+              </a:rPr>
+              <a:t>Si ligne &lt; 0 : 	B(&gt;colonne, &lt;=ligne ) seront désactivés. (non implémenté)</a:t>
+            </a:r>
+          </a:p>
+          <a:p>
+            <a:pPr marL="628650" marR="0" lvl="1" indent="-171450" algn="l" defTabSz="457200" rtl="0" eaLnBrk="1" fontAlgn="auto" latinLnBrk="0" hangingPunct="1">
+              <a:lnSpc>
+                <a:spcPct val="100000"/>
+              </a:lnSpc>
+              <a:spcBef>
+                <a:spcPts val="0"/>
+              </a:spcBef>
+              <a:spcAft>
+                <a:spcPts val="0"/>
+              </a:spcAft>
+              <a:buClrTx/>
+              <a:buSzTx/>
+              <a:buFont typeface="Arial"/>
+              <a:buChar char="•"/>
+              <a:tabLst/>
+              <a:defRPr/>
+            </a:pPr>
+            <a:endParaRPr lang="fr-FR" baseline="0" dirty="0" smtClean="0"/>
+          </a:p>
+          <a:p>
+            <a:pPr marL="171450" indent="-171450">
+              <a:buFont typeface="Arial"/>
+              <a:buChar char="•"/>
+            </a:pPr>
+            <a:endParaRPr lang="fr-FR" baseline="0" dirty="0" smtClean="0"/>
           </a:p>
         </p:txBody>
       </p:sp>
@@ -894,6 +1292,111 @@
               <a:rPr lang="fr-FR" dirty="0" smtClean="0"/>
               <a:t>Steve</a:t>
             </a:r>
+          </a:p>
+          <a:p>
+            <a:r>
+              <a:rPr lang="fr-FR" b="1" dirty="0" smtClean="0"/>
+              <a:t>Chemin constitué de points</a:t>
+            </a:r>
+            <a:r>
+              <a:rPr lang="fr-FR" b="1" baseline="0" dirty="0" smtClean="0"/>
+              <a:t> enregistrés dans une liste</a:t>
+            </a:r>
+            <a:endParaRPr lang="fr-FR" b="1" dirty="0" smtClean="0"/>
+          </a:p>
+          <a:p>
+            <a:pPr marL="171450" marR="0" indent="-171450" algn="l" defTabSz="457200" rtl="0" eaLnBrk="1" fontAlgn="auto" latinLnBrk="0" hangingPunct="1">
+              <a:lnSpc>
+                <a:spcPct val="100000"/>
+              </a:lnSpc>
+              <a:spcBef>
+                <a:spcPts val="0"/>
+              </a:spcBef>
+              <a:spcAft>
+                <a:spcPts val="0"/>
+              </a:spcAft>
+              <a:buClrTx/>
+              <a:buSzTx/>
+              <a:buFont typeface="Arial"/>
+              <a:buChar char="•"/>
+              <a:tabLst/>
+              <a:defRPr/>
+            </a:pPr>
+            <a:r>
+              <a:rPr lang="fr-FR" baseline="0" dirty="0" smtClean="0"/>
+              <a:t>Chemin réglé automatiquement avec la population de la scène</a:t>
+            </a:r>
+          </a:p>
+          <a:p>
+            <a:pPr marL="0" marR="0" indent="0" algn="l" defTabSz="457200" rtl="0" eaLnBrk="1" fontAlgn="auto" latinLnBrk="0" hangingPunct="1">
+              <a:lnSpc>
+                <a:spcPct val="100000"/>
+              </a:lnSpc>
+              <a:spcBef>
+                <a:spcPts val="0"/>
+              </a:spcBef>
+              <a:spcAft>
+                <a:spcPts val="0"/>
+              </a:spcAft>
+              <a:buClrTx/>
+              <a:buSzTx/>
+              <a:buFontTx/>
+              <a:buNone/>
+              <a:tabLst/>
+              <a:defRPr/>
+            </a:pPr>
+            <a:endParaRPr lang="fr-FR" baseline="0" dirty="0" smtClean="0"/>
+          </a:p>
+          <a:p>
+            <a:pPr marL="0" marR="0" indent="0" algn="l" defTabSz="457200" rtl="0" eaLnBrk="1" fontAlgn="auto" latinLnBrk="0" hangingPunct="1">
+              <a:lnSpc>
+                <a:spcPct val="100000"/>
+              </a:lnSpc>
+              <a:spcBef>
+                <a:spcPts val="0"/>
+              </a:spcBef>
+              <a:spcAft>
+                <a:spcPts val="0"/>
+              </a:spcAft>
+              <a:buClrTx/>
+              <a:buSzTx/>
+              <a:buFontTx/>
+              <a:buNone/>
+              <a:tabLst/>
+              <a:defRPr/>
+            </a:pPr>
+            <a:r>
+              <a:rPr lang="fr-FR" b="1" baseline="0" dirty="0" smtClean="0"/>
+              <a:t>Retour de l’ennemis en arri</a:t>
+            </a:r>
+            <a:r>
+              <a:rPr lang="fr-FR" b="1" baseline="0" dirty="0" smtClean="0"/>
+              <a:t>ère si obstacle sur son chemin. Il n’essaye pas de le contourner</a:t>
+            </a:r>
+            <a:endParaRPr lang="fr-FR" b="1" baseline="0" dirty="0" smtClean="0"/>
+          </a:p>
+          <a:p>
+            <a:endParaRPr lang="fr-FR" dirty="0" smtClean="0"/>
+          </a:p>
+          <a:p>
+            <a:pPr marL="0" indent="0">
+              <a:buFont typeface="Arial"/>
+              <a:buNone/>
+            </a:pPr>
+            <a:r>
+              <a:rPr lang="fr-FR" b="1" dirty="0" smtClean="0"/>
+              <a:t>Vitesse</a:t>
+            </a:r>
+            <a:r>
+              <a:rPr lang="fr-FR" b="1" baseline="0" dirty="0" smtClean="0"/>
+              <a:t> de déplacement différent suivant le type du méchant</a:t>
+            </a:r>
+          </a:p>
+          <a:p>
+            <a:pPr marL="171450" indent="-171450">
+              <a:buFont typeface="Arial"/>
+              <a:buChar char="•"/>
+            </a:pPr>
             <a:endParaRPr lang="fr-FR" dirty="0" smtClean="0"/>
           </a:p>
         </p:txBody>
@@ -979,10 +1482,110 @@
           <a:lstStyle/>
           <a:p>
             <a:r>
-              <a:rPr lang="fr-FR" dirty="0" smtClean="0"/>
-              <a:t>Steve</a:t>
-            </a:r>
-            <a:endParaRPr lang="fr-FR" dirty="0"/>
+              <a:rPr lang="fr-FR" b="1" dirty="0" smtClean="0"/>
+              <a:t>Ennemis</a:t>
+            </a:r>
+          </a:p>
+          <a:p>
+            <a:pPr marL="0" indent="0">
+              <a:buFont typeface="Arial"/>
+              <a:buNone/>
+            </a:pPr>
+            <a:endParaRPr lang="fr-FR" b="1" dirty="0" smtClean="0"/>
+          </a:p>
+          <a:p>
+            <a:pPr marL="171450" indent="-171450">
+              <a:buFont typeface="Arial"/>
+              <a:buChar char="•"/>
+            </a:pPr>
+            <a:r>
+              <a:rPr lang="fr-FR" b="0" dirty="0" smtClean="0"/>
+              <a:t>Détection par un ennemi</a:t>
+            </a:r>
+          </a:p>
+          <a:p>
+            <a:pPr marL="171450" indent="-171450">
+              <a:buFont typeface="Arial"/>
+              <a:buChar char="•"/>
+            </a:pPr>
+            <a:r>
+              <a:rPr lang="fr-FR" b="0" dirty="0" err="1" smtClean="0"/>
+              <a:t>Obstruation</a:t>
+            </a:r>
+            <a:r>
+              <a:rPr lang="fr-FR" b="0" baseline="0" dirty="0" smtClean="0"/>
+              <a:t> du champ de vue</a:t>
+            </a:r>
+          </a:p>
+          <a:p>
+            <a:pPr marL="171450" indent="-171450">
+              <a:buFont typeface="Arial"/>
+              <a:buChar char="•"/>
+            </a:pPr>
+            <a:r>
+              <a:rPr lang="fr-FR" b="0" baseline="0" dirty="0" smtClean="0"/>
+              <a:t>Bloquer le chemin d’un ennemi</a:t>
+            </a:r>
+          </a:p>
+          <a:p>
+            <a:pPr marL="171450" indent="-171450">
+              <a:buFont typeface="Arial"/>
+              <a:buChar char="•"/>
+            </a:pPr>
+            <a:r>
+              <a:rPr lang="fr-FR" b="0" baseline="0" dirty="0" smtClean="0"/>
+              <a:t>Adaptation du champ de vue (observation)</a:t>
+            </a:r>
+          </a:p>
+          <a:p>
+            <a:pPr marL="171450" indent="-171450">
+              <a:buFont typeface="Arial"/>
+              <a:buChar char="•"/>
+            </a:pPr>
+            <a:endParaRPr lang="fr-FR" b="0" baseline="0" dirty="0" smtClean="0"/>
+          </a:p>
+          <a:p>
+            <a:pPr marL="171450" indent="-171450">
+              <a:buFont typeface="Arial"/>
+              <a:buChar char="•"/>
+            </a:pPr>
+            <a:r>
+              <a:rPr lang="fr-FR" b="0" baseline="0" dirty="0" smtClean="0"/>
+              <a:t>Fin, la loutre mange ses poissons</a:t>
+            </a:r>
+          </a:p>
+          <a:p>
+            <a:pPr marL="628650" lvl="1" indent="-171450">
+              <a:buFont typeface="Arial"/>
+              <a:buChar char="•"/>
+            </a:pPr>
+            <a:r>
+              <a:rPr lang="fr-FR" b="0" baseline="0" dirty="0" smtClean="0"/>
+              <a:t>Accès au niveau suivant</a:t>
+            </a:r>
+          </a:p>
+          <a:p>
+            <a:pPr marL="628650" lvl="1" indent="-171450">
+              <a:buFont typeface="Arial"/>
+              <a:buChar char="•"/>
+            </a:pPr>
+            <a:r>
+              <a:rPr lang="fr-FR" b="0" baseline="0" dirty="0" smtClean="0"/>
+              <a:t>Présentation de la carte de l’ile</a:t>
+            </a:r>
+            <a:endParaRPr lang="fr-FR" b="0" dirty="0" smtClean="0"/>
+          </a:p>
+          <a:p>
+            <a:endParaRPr lang="fr-FR" b="0" dirty="0" smtClean="0"/>
+          </a:p>
+          <a:p>
+            <a:endParaRPr lang="fr-FR" b="0" dirty="0" smtClean="0"/>
+          </a:p>
+          <a:p>
+            <a:endParaRPr lang="fr-FR" b="0" dirty="0" smtClean="0"/>
+          </a:p>
+          <a:p>
+            <a:endParaRPr lang="fr-FR" b="1" dirty="0"/>
           </a:p>
         </p:txBody>
       </p:sp>
@@ -1615,15 +2218,153 @@
             </a:r>
             <a:r>
               <a:rPr lang="fr-FR" baseline="0" dirty="0" smtClean="0"/>
-              <a:t> y joue comment ?</a:t>
-            </a:r>
-          </a:p>
-          <a:p>
+              <a:t> y joue comment </a:t>
+            </a:r>
             <a:r>
               <a:rPr lang="fr-FR" baseline="0" dirty="0" smtClean="0"/>
-              <a:t>Et les item ?</a:t>
-            </a:r>
-            <a:endParaRPr lang="fr-FR" dirty="0"/>
+              <a:t>?</a:t>
+            </a:r>
+          </a:p>
+          <a:p>
+            <a:r>
+              <a:rPr lang="fr-FR" baseline="0" dirty="0" smtClean="0"/>
+              <a:t>Présentation du </a:t>
+            </a:r>
+            <a:r>
+              <a:rPr lang="fr-FR" baseline="0" dirty="0" err="1" smtClean="0"/>
+              <a:t>game</a:t>
+            </a:r>
+            <a:r>
+              <a:rPr lang="fr-FR" baseline="0" dirty="0" smtClean="0"/>
+              <a:t> </a:t>
+            </a:r>
+            <a:r>
+              <a:rPr lang="fr-FR" baseline="0" dirty="0" err="1" smtClean="0"/>
+              <a:t>play</a:t>
+            </a:r>
+            <a:r>
+              <a:rPr lang="fr-FR" baseline="0" dirty="0" smtClean="0"/>
+              <a:t> et du concept du jeu.</a:t>
+            </a:r>
+          </a:p>
+          <a:p>
+            <a:endParaRPr lang="fr-FR" baseline="0" dirty="0" smtClean="0"/>
+          </a:p>
+          <a:p>
+            <a:r>
+              <a:rPr lang="fr-FR" b="1" baseline="0" dirty="0" smtClean="0"/>
+              <a:t>Eléments principaux du jeux</a:t>
+            </a:r>
+          </a:p>
+          <a:p>
+            <a:pPr marL="171450" indent="-171450">
+              <a:buFont typeface="Arial"/>
+              <a:buChar char="•"/>
+            </a:pPr>
+            <a:r>
+              <a:rPr lang="fr-FR" b="0" baseline="0" dirty="0" smtClean="0"/>
+              <a:t>Syst</a:t>
+            </a:r>
+            <a:r>
+              <a:rPr lang="fr-FR" b="0" baseline="0" dirty="0" smtClean="0"/>
+              <a:t>ème de vies</a:t>
+            </a:r>
+          </a:p>
+          <a:p>
+            <a:pPr marL="171450" indent="-171450">
+              <a:buFont typeface="Arial"/>
+              <a:buChar char="•"/>
+            </a:pPr>
+            <a:r>
+              <a:rPr lang="fr-FR" b="0" baseline="0" dirty="0" smtClean="0"/>
+              <a:t>Système de sauvegarde ! Avancement du joueur enregistré ! (on sauvegarde où ?)</a:t>
+            </a:r>
+          </a:p>
+          <a:p>
+            <a:pPr marL="171450" indent="-171450">
+              <a:buFont typeface="Arial"/>
+              <a:buChar char="•"/>
+            </a:pPr>
+            <a:r>
+              <a:rPr lang="fr-FR" b="0" baseline="0" dirty="0" err="1" smtClean="0"/>
+              <a:t>CheckPoints</a:t>
+            </a:r>
+            <a:endParaRPr lang="fr-FR" b="0" baseline="0" dirty="0" smtClean="0"/>
+          </a:p>
+          <a:p>
+            <a:pPr marL="171450" indent="-171450">
+              <a:buFont typeface="Arial"/>
+              <a:buChar char="•"/>
+            </a:pPr>
+            <a:r>
+              <a:rPr lang="fr-FR" b="0" baseline="0" dirty="0" smtClean="0"/>
+              <a:t>Bottes </a:t>
+            </a:r>
+            <a:r>
+              <a:rPr lang="fr-FR" b="0" baseline="0" dirty="0" err="1" smtClean="0"/>
+              <a:t>anti-glisse</a:t>
+            </a:r>
+            <a:r>
+              <a:rPr lang="fr-FR" b="0" baseline="0" dirty="0" smtClean="0"/>
+              <a:t> car il y a des surfaces glissantes (voire </a:t>
+            </a:r>
+            <a:r>
+              <a:rPr lang="fr-FR" b="0" baseline="0" dirty="0" err="1" smtClean="0"/>
+              <a:t>slide</a:t>
+            </a:r>
+            <a:r>
+              <a:rPr lang="fr-FR" b="0" baseline="0" dirty="0" smtClean="0"/>
+              <a:t> suivante)</a:t>
+            </a:r>
+          </a:p>
+          <a:p>
+            <a:pPr marL="171450" indent="-171450">
+              <a:buFont typeface="Arial"/>
+              <a:buChar char="•"/>
+            </a:pPr>
+            <a:r>
+              <a:rPr lang="fr-FR" b="0" baseline="0" dirty="0" smtClean="0"/>
+              <a:t>Poisson indispensable pour le niveau </a:t>
+            </a:r>
+            <a:r>
+              <a:rPr lang="fr-FR" b="0" baseline="0" dirty="0" err="1" smtClean="0"/>
+              <a:t>tuto</a:t>
+            </a:r>
+            <a:endParaRPr lang="fr-FR" b="0" baseline="0" dirty="0" smtClean="0"/>
+          </a:p>
+          <a:p>
+            <a:pPr marL="171450" indent="-171450">
+              <a:buFont typeface="Arial"/>
+              <a:buChar char="•"/>
+            </a:pPr>
+            <a:r>
+              <a:rPr lang="fr-FR" b="0" baseline="0" dirty="0" smtClean="0"/>
+              <a:t>Utilisation d’une « Trousse d’objets »</a:t>
+            </a:r>
+          </a:p>
+          <a:p>
+            <a:pPr marL="171450" indent="-171450">
+              <a:buFont typeface="Arial"/>
+              <a:buChar char="•"/>
+            </a:pPr>
+            <a:endParaRPr lang="fr-FR" b="0" baseline="0" dirty="0" smtClean="0"/>
+          </a:p>
+          <a:p>
+            <a:pPr marL="171450" indent="-171450">
+              <a:buFont typeface="Arial"/>
+              <a:buChar char="•"/>
+            </a:pPr>
+            <a:r>
+              <a:rPr lang="fr-FR" b="0" baseline="0" dirty="0" smtClean="0"/>
+              <a:t>Ennemi, sentinelles à éviter (coté infiltration)</a:t>
+            </a:r>
+          </a:p>
+          <a:p>
+            <a:pPr marL="171450" indent="-171450">
+              <a:buFont typeface="Arial"/>
+              <a:buChar char="•"/>
+            </a:pPr>
+            <a:endParaRPr lang="fr-FR" b="0" baseline="0" dirty="0" smtClean="0"/>
           </a:p>
         </p:txBody>
       </p:sp>
@@ -1713,65 +2454,478 @@
             </a:r>
           </a:p>
           <a:p>
-            <a:endParaRPr lang="fr-FR" dirty="0" smtClean="0"/>
-          </a:p>
-          <a:p>
-            <a:r>
-              <a:rPr lang="fr-FR" dirty="0" smtClean="0"/>
-              <a:t>Et </a:t>
+            <a:pPr marL="0" marR="0" indent="0" algn="l" defTabSz="457200" rtl="0" eaLnBrk="1" fontAlgn="auto" latinLnBrk="0" hangingPunct="1">
+              <a:lnSpc>
+                <a:spcPct val="100000"/>
+              </a:lnSpc>
+              <a:spcBef>
+                <a:spcPts val="0"/>
+              </a:spcBef>
+              <a:spcAft>
+                <a:spcPts val="0"/>
+              </a:spcAft>
+              <a:buClrTx/>
+              <a:buSzTx/>
+              <a:buFontTx/>
+              <a:buNone/>
+              <a:tabLst/>
+              <a:defRPr/>
+            </a:pPr>
+            <a:endParaRPr lang="fr-FR" b="1" baseline="0" dirty="0" smtClean="0"/>
+          </a:p>
+          <a:p>
+            <a:pPr marL="0" marR="0" indent="0" algn="l" defTabSz="457200" rtl="0" eaLnBrk="1" fontAlgn="auto" latinLnBrk="0" hangingPunct="1">
+              <a:lnSpc>
+                <a:spcPct val="100000"/>
+              </a:lnSpc>
+              <a:spcBef>
+                <a:spcPts val="0"/>
+              </a:spcBef>
+              <a:spcAft>
+                <a:spcPts val="0"/>
+              </a:spcAft>
+              <a:buClrTx/>
+              <a:buSzTx/>
+              <a:buFontTx/>
+              <a:buNone/>
+              <a:tabLst/>
+              <a:defRPr/>
+            </a:pPr>
+            <a:r>
+              <a:rPr lang="fr-FR" b="1" baseline="0" dirty="0" smtClean="0"/>
+              <a:t>Le pingouin, il peut</a:t>
+            </a:r>
+          </a:p>
+          <a:p>
+            <a:pPr marL="171450" marR="0" indent="-171450" algn="l" defTabSz="457200" rtl="0" eaLnBrk="1" fontAlgn="auto" latinLnBrk="0" hangingPunct="1">
+              <a:lnSpc>
+                <a:spcPct val="100000"/>
+              </a:lnSpc>
+              <a:spcBef>
+                <a:spcPts val="0"/>
+              </a:spcBef>
+              <a:spcAft>
+                <a:spcPts val="0"/>
+              </a:spcAft>
+              <a:buClrTx/>
+              <a:buSzTx/>
+              <a:buFont typeface="Arial"/>
+              <a:buChar char="•"/>
+              <a:tabLst/>
+              <a:defRPr/>
+            </a:pPr>
+            <a:r>
+              <a:rPr lang="fr-FR" b="1" baseline="0" dirty="0" smtClean="0"/>
+              <a:t>Pousser</a:t>
             </a:r>
             <a:r>
               <a:rPr lang="fr-FR" baseline="0" dirty="0" smtClean="0"/>
-              <a:t>ça marche comment ? </a:t>
-            </a:r>
-          </a:p>
-          <a:p>
+              <a:t> un bloc déplaçable</a:t>
+            </a:r>
+          </a:p>
+          <a:p>
+            <a:pPr marL="171450" marR="0" indent="-171450" algn="l" defTabSz="457200" rtl="0" eaLnBrk="1" fontAlgn="auto" latinLnBrk="0" hangingPunct="1">
+              <a:lnSpc>
+                <a:spcPct val="100000"/>
+              </a:lnSpc>
+              <a:spcBef>
+                <a:spcPts val="0"/>
+              </a:spcBef>
+              <a:spcAft>
+                <a:spcPts val="0"/>
+              </a:spcAft>
+              <a:buClrTx/>
+              <a:buSzTx/>
+              <a:buFont typeface="Arial"/>
+              <a:buChar char="•"/>
+              <a:tabLst/>
+              <a:defRPr/>
+            </a:pPr>
             <a:r>
               <a:rPr lang="fr-FR" baseline="0" dirty="0" smtClean="0"/>
-              <a:t>    - Les surfaces ça sert </a:t>
-            </a:r>
+              <a:t>Glisser sur de la glace</a:t>
+            </a:r>
+          </a:p>
+          <a:p>
+            <a:pPr marL="628650" marR="0" lvl="1" indent="-171450" algn="l" defTabSz="457200" rtl="0" eaLnBrk="1" fontAlgn="auto" latinLnBrk="0" hangingPunct="1">
+              <a:lnSpc>
+                <a:spcPct val="100000"/>
+              </a:lnSpc>
+              <a:spcBef>
+                <a:spcPts val="0"/>
+              </a:spcBef>
+              <a:spcAft>
+                <a:spcPts val="0"/>
+              </a:spcAft>
+              <a:buClrTx/>
+              <a:buSzTx/>
+              <a:buFont typeface="Arial"/>
+              <a:buChar char="•"/>
+              <a:tabLst/>
+              <a:defRPr/>
+            </a:pPr>
             <a:r>
               <a:rPr lang="fr-FR" baseline="0" dirty="0" smtClean="0"/>
-              <a:t>à quoi d’un point de vue très terre-à-terre (pas parler de </a:t>
+              <a:t>Utilisation d’un </a:t>
             </a:r>
             <a:r>
               <a:rPr lang="fr-FR" baseline="0" dirty="0" err="1" smtClean="0"/>
-              <a:t>typeid</a:t>
+              <a:t>timer</a:t>
             </a:r>
             <a:r>
               <a:rPr lang="fr-FR" baseline="0" dirty="0" smtClean="0"/>
-              <a:t> ici…)</a:t>
-            </a:r>
-          </a:p>
-          <a:p>
+              <a:t> pour tous</a:t>
+            </a:r>
+          </a:p>
+          <a:p>
+            <a:pPr marL="171450" marR="0" indent="-171450" algn="l" defTabSz="457200" rtl="0" eaLnBrk="1" fontAlgn="auto" latinLnBrk="0" hangingPunct="1">
+              <a:lnSpc>
+                <a:spcPct val="100000"/>
+              </a:lnSpc>
+              <a:spcBef>
+                <a:spcPts val="0"/>
+              </a:spcBef>
+              <a:spcAft>
+                <a:spcPts val="0"/>
+              </a:spcAft>
+              <a:buClrTx/>
+              <a:buSzTx/>
+              <a:buFont typeface="Arial"/>
+              <a:buChar char="•"/>
+              <a:tabLst/>
+              <a:defRPr/>
+            </a:pPr>
             <a:r>
               <a:rPr lang="fr-FR" baseline="0" dirty="0" smtClean="0"/>
-              <a:t>        - les blocs déplaçables coulent dans l’eau, murs ne bougent pas etc…</a:t>
-            </a:r>
-          </a:p>
-          <a:p>
+              <a:t>Couler dans l’eau</a:t>
+            </a:r>
+          </a:p>
+          <a:p>
+            <a:pPr marL="171450" marR="0" indent="-171450" algn="l" defTabSz="457200" rtl="0" eaLnBrk="1" fontAlgn="auto" latinLnBrk="0" hangingPunct="1">
+              <a:lnSpc>
+                <a:spcPct val="100000"/>
+              </a:lnSpc>
+              <a:spcBef>
+                <a:spcPts val="0"/>
+              </a:spcBef>
+              <a:spcAft>
+                <a:spcPts val="0"/>
+              </a:spcAft>
+              <a:buClrTx/>
+              <a:buSzTx/>
+              <a:buFont typeface="Arial"/>
+              <a:buChar char="•"/>
+              <a:tabLst/>
+              <a:defRPr/>
+            </a:pPr>
             <a:r>
               <a:rPr lang="fr-FR" baseline="0" dirty="0" smtClean="0"/>
-              <a:t>      </a:t>
-            </a:r>
-          </a:p>
-          <a:p>
+              <a:t>Se payer un mur !</a:t>
+            </a:r>
+          </a:p>
+          <a:p>
+            <a:pPr marL="171450" marR="0" indent="-171450" algn="l" defTabSz="457200" rtl="0" eaLnBrk="1" fontAlgn="auto" latinLnBrk="0" hangingPunct="1">
+              <a:lnSpc>
+                <a:spcPct val="100000"/>
+              </a:lnSpc>
+              <a:spcBef>
+                <a:spcPts val="0"/>
+              </a:spcBef>
+              <a:spcAft>
+                <a:spcPts val="0"/>
+              </a:spcAft>
+              <a:buClrTx/>
+              <a:buSzTx/>
+              <a:buFont typeface="Arial"/>
+              <a:buChar char="•"/>
+              <a:tabLst/>
+              <a:defRPr/>
+            </a:pPr>
             <a:endParaRPr lang="fr-FR" baseline="0" dirty="0" smtClean="0"/>
           </a:p>
           <a:p>
+            <a:pPr marL="0" marR="0" indent="0" algn="l" defTabSz="457200" rtl="0" eaLnBrk="1" fontAlgn="auto" latinLnBrk="0" hangingPunct="1">
+              <a:lnSpc>
+                <a:spcPct val="100000"/>
+              </a:lnSpc>
+              <a:spcBef>
+                <a:spcPts val="0"/>
+              </a:spcBef>
+              <a:spcAft>
+                <a:spcPts val="0"/>
+              </a:spcAft>
+              <a:buClrTx/>
+              <a:buSzTx/>
+              <a:buFont typeface="Arial"/>
+              <a:buNone/>
+              <a:tabLst/>
+              <a:defRPr/>
+            </a:pPr>
+            <a:r>
+              <a:rPr lang="fr-FR" b="1" baseline="0" dirty="0" smtClean="0"/>
+              <a:t>Le bloc </a:t>
+            </a:r>
+            <a:r>
+              <a:rPr lang="fr-FR" b="1" baseline="0" dirty="0" err="1" smtClean="0"/>
+              <a:t>déplacable</a:t>
+            </a:r>
+            <a:r>
+              <a:rPr lang="fr-FR" b="1" baseline="0" dirty="0" smtClean="0"/>
+              <a:t> il peut</a:t>
+            </a:r>
+          </a:p>
+          <a:p>
+            <a:pPr marL="171450" marR="0" indent="-171450" algn="l" defTabSz="457200" rtl="0" eaLnBrk="1" fontAlgn="auto" latinLnBrk="0" hangingPunct="1">
+              <a:lnSpc>
+                <a:spcPct val="100000"/>
+              </a:lnSpc>
+              <a:spcBef>
+                <a:spcPts val="0"/>
+              </a:spcBef>
+              <a:spcAft>
+                <a:spcPts val="0"/>
+              </a:spcAft>
+              <a:buClrTx/>
+              <a:buSzTx/>
+              <a:buFont typeface="Arial"/>
+              <a:buChar char="•"/>
+              <a:tabLst/>
+              <a:defRPr/>
+            </a:pPr>
             <a:r>
               <a:rPr lang="fr-FR" baseline="0" dirty="0" smtClean="0"/>
-              <a:t>Une population automatique c’est cool, pourquoi ?</a:t>
-            </a:r>
-          </a:p>
-          <a:p>
+              <a:t>Glisser seul sur de la glace (plusieurs blocs peuvent glisser ensemble)</a:t>
+            </a:r>
+          </a:p>
+          <a:p>
+            <a:pPr marL="628650" marR="0" lvl="1" indent="-171450" algn="l" defTabSz="457200" rtl="0" eaLnBrk="1" fontAlgn="auto" latinLnBrk="0" hangingPunct="1">
+              <a:lnSpc>
+                <a:spcPct val="100000"/>
+              </a:lnSpc>
+              <a:spcBef>
+                <a:spcPts val="0"/>
+              </a:spcBef>
+              <a:spcAft>
+                <a:spcPts val="0"/>
+              </a:spcAft>
+              <a:buClrTx/>
+              <a:buSzTx/>
+              <a:buFont typeface="Arial"/>
+              <a:buChar char="•"/>
+              <a:tabLst/>
+              <a:defRPr/>
+            </a:pPr>
+            <a:r>
+              <a:rPr lang="fr-FR" baseline="0" dirty="0" smtClean="0"/>
+              <a:t>Utilisation d’un </a:t>
+            </a:r>
+            <a:r>
+              <a:rPr lang="fr-FR" baseline="0" dirty="0" err="1" smtClean="0"/>
+              <a:t>timer</a:t>
+            </a:r>
+            <a:r>
+              <a:rPr lang="fr-FR" baseline="0" dirty="0" smtClean="0"/>
+              <a:t> pour tous</a:t>
+            </a:r>
+          </a:p>
+          <a:p>
+            <a:pPr marL="171450" marR="0" indent="-171450" algn="l" defTabSz="457200" rtl="0" eaLnBrk="1" fontAlgn="auto" latinLnBrk="0" hangingPunct="1">
+              <a:lnSpc>
+                <a:spcPct val="100000"/>
+              </a:lnSpc>
+              <a:spcBef>
+                <a:spcPts val="0"/>
+              </a:spcBef>
+              <a:spcAft>
+                <a:spcPts val="0"/>
+              </a:spcAft>
+              <a:buClrTx/>
+              <a:buSzTx/>
+              <a:buFont typeface="Arial"/>
+              <a:buChar char="•"/>
+              <a:tabLst/>
+              <a:defRPr/>
+            </a:pPr>
+            <a:r>
+              <a:rPr lang="fr-FR" baseline="0" dirty="0" smtClean="0"/>
+              <a:t>Tomber dans l’eau et se transformer en neige</a:t>
+            </a:r>
+          </a:p>
+          <a:p>
+            <a:pPr marL="171450" marR="0" indent="-171450" algn="l" defTabSz="457200" rtl="0" eaLnBrk="1" fontAlgn="auto" latinLnBrk="0" hangingPunct="1">
+              <a:lnSpc>
+                <a:spcPct val="100000"/>
+              </a:lnSpc>
+              <a:spcBef>
+                <a:spcPts val="0"/>
+              </a:spcBef>
+              <a:spcAft>
+                <a:spcPts val="0"/>
+              </a:spcAft>
+              <a:buClrTx/>
+              <a:buSzTx/>
+              <a:buFont typeface="Arial"/>
+              <a:buChar char="•"/>
+              <a:tabLst/>
+              <a:defRPr/>
+            </a:pPr>
+            <a:r>
+              <a:rPr lang="fr-FR" baseline="0" dirty="0" smtClean="0"/>
+              <a:t>Deux blocs déplaçables en collision ne bougent plus !</a:t>
+            </a:r>
+          </a:p>
+          <a:p>
+            <a:pPr marL="171450" marR="0" indent="-171450" algn="l" defTabSz="457200" rtl="0" eaLnBrk="1" fontAlgn="auto" latinLnBrk="0" hangingPunct="1">
+              <a:lnSpc>
+                <a:spcPct val="100000"/>
+              </a:lnSpc>
+              <a:spcBef>
+                <a:spcPts val="0"/>
+              </a:spcBef>
+              <a:spcAft>
+                <a:spcPts val="0"/>
+              </a:spcAft>
+              <a:buClrTx/>
+              <a:buSzTx/>
+              <a:buFont typeface="Arial"/>
+              <a:buChar char="•"/>
+              <a:tabLst/>
+              <a:defRPr/>
+            </a:pPr>
+            <a:r>
+              <a:rPr lang="fr-FR" baseline="0" dirty="0" smtClean="0"/>
+              <a:t>Être bloqué contre un mur (IMPOSSIBLE de tirer un bloc déplaçable)</a:t>
+            </a:r>
+          </a:p>
+          <a:p>
+            <a:pPr marL="171450" marR="0" indent="-171450" algn="l" defTabSz="457200" rtl="0" eaLnBrk="1" fontAlgn="auto" latinLnBrk="0" hangingPunct="1">
+              <a:lnSpc>
+                <a:spcPct val="100000"/>
+              </a:lnSpc>
+              <a:spcBef>
+                <a:spcPts val="0"/>
+              </a:spcBef>
+              <a:spcAft>
+                <a:spcPts val="0"/>
+              </a:spcAft>
+              <a:buClrTx/>
+              <a:buSzTx/>
+              <a:buFont typeface="Arial"/>
+              <a:buChar char="•"/>
+              <a:tabLst/>
+              <a:defRPr/>
+            </a:pPr>
+            <a:r>
+              <a:rPr lang="fr-FR" baseline="0" dirty="0" smtClean="0"/>
+              <a:t>Bloquer la sortie.</a:t>
+            </a:r>
+          </a:p>
+          <a:p>
+            <a:pPr marL="171450" marR="0" indent="-171450" algn="l" defTabSz="457200" rtl="0" eaLnBrk="1" fontAlgn="auto" latinLnBrk="0" hangingPunct="1">
+              <a:lnSpc>
+                <a:spcPct val="100000"/>
+              </a:lnSpc>
+              <a:spcBef>
+                <a:spcPts val="0"/>
+              </a:spcBef>
+              <a:spcAft>
+                <a:spcPts val="0"/>
+              </a:spcAft>
+              <a:buClrTx/>
+              <a:buSzTx/>
+              <a:buFont typeface="Arial"/>
+              <a:buChar char="•"/>
+              <a:tabLst/>
+              <a:defRPr/>
+            </a:pPr>
             <a:endParaRPr lang="fr-FR" baseline="0" dirty="0" smtClean="0"/>
           </a:p>
           <a:p>
-            <a:r>
-              <a:rPr lang="fr-FR" baseline="0" dirty="0" smtClean="0"/>
-              <a:t>Pourquoi une grande image de Background ? Pourquoi pas que des petites de 32px (voire rapport….)</a:t>
-            </a:r>
+            <a:pPr marL="0" marR="0" indent="0" algn="l" defTabSz="457200" rtl="0" eaLnBrk="1" fontAlgn="auto" latinLnBrk="0" hangingPunct="1">
+              <a:lnSpc>
+                <a:spcPct val="100000"/>
+              </a:lnSpc>
+              <a:spcBef>
+                <a:spcPts val="0"/>
+              </a:spcBef>
+              <a:spcAft>
+                <a:spcPts val="0"/>
+              </a:spcAft>
+              <a:buClrTx/>
+              <a:buSzTx/>
+              <a:buFont typeface="Arial"/>
+              <a:buNone/>
+              <a:tabLst/>
+              <a:defRPr/>
+            </a:pPr>
+            <a:r>
+              <a:rPr lang="fr-FR" b="1" baseline="0" dirty="0" smtClean="0"/>
+              <a:t>Pourquoi une grande image de Background ? Pourquoi pas que des petits blocs de 32px (voire rapport….)</a:t>
+            </a:r>
+          </a:p>
+          <a:p>
+            <a:endParaRPr lang="fr-FR" b="1" baseline="0" dirty="0" smtClean="0"/>
+          </a:p>
+          <a:p>
+            <a:r>
+              <a:rPr lang="fr-FR" b="1" baseline="0" dirty="0" smtClean="0"/>
+              <a:t>Une population automatique c’est </a:t>
+            </a:r>
+            <a:r>
+              <a:rPr lang="fr-FR" b="1" baseline="0" dirty="0" smtClean="0"/>
+              <a:t>cool</a:t>
+            </a:r>
+          </a:p>
+          <a:p>
+            <a:pPr marL="171450" indent="-171450">
+              <a:buFont typeface="Arial"/>
+              <a:buChar char="•"/>
+            </a:pPr>
+            <a:r>
+              <a:rPr lang="fr-FR" b="0" baseline="0" dirty="0" smtClean="0"/>
+              <a:t>Associé </a:t>
+            </a:r>
+            <a:r>
+              <a:rPr lang="fr-FR" b="0" baseline="0" dirty="0" smtClean="0"/>
+              <a:t>à « </a:t>
+            </a:r>
+            <a:r>
+              <a:rPr lang="fr-FR" b="0" baseline="0" dirty="0" err="1" smtClean="0"/>
+              <a:t>Tiled</a:t>
+            </a:r>
+            <a:r>
+              <a:rPr lang="fr-FR" b="0" baseline="0" dirty="0" smtClean="0"/>
+              <a:t> » c’est un outil du tonner !</a:t>
+            </a:r>
+          </a:p>
+          <a:p>
+            <a:pPr marL="171450" indent="-171450">
+              <a:buFont typeface="Arial"/>
+              <a:buChar char="•"/>
+            </a:pPr>
+            <a:r>
+              <a:rPr lang="fr-FR" b="0" baseline="0" dirty="0" err="1" smtClean="0"/>
+              <a:t>Lvl</a:t>
+            </a:r>
+            <a:r>
+              <a:rPr lang="fr-FR" b="0" baseline="0" dirty="0" smtClean="0"/>
+              <a:t> </a:t>
+            </a:r>
+            <a:r>
+              <a:rPr lang="fr-FR" b="0" baseline="0" dirty="0" err="1" smtClean="0"/>
+              <a:t>vitent</a:t>
+            </a:r>
+            <a:r>
+              <a:rPr lang="fr-FR" b="0" baseline="0" dirty="0" smtClean="0"/>
+              <a:t> générés</a:t>
+            </a:r>
+          </a:p>
+          <a:p>
+            <a:pPr marL="171450" indent="-171450">
+              <a:buFont typeface="Arial"/>
+              <a:buChar char="•"/>
+            </a:pPr>
+            <a:endParaRPr lang="fr-FR" b="0" baseline="0" dirty="0" smtClean="0"/>
           </a:p>
           <a:p>
             <a:endParaRPr lang="fr-FR" dirty="0"/>
@@ -1868,24 +3022,107 @@
           </a:p>
           <a:p>
             <a:r>
-              <a:rPr lang="fr-FR" dirty="0" smtClean="0"/>
+              <a:rPr lang="fr-FR" b="1" dirty="0" smtClean="0"/>
               <a:t>Comment</a:t>
             </a:r>
             <a:r>
+              <a:rPr lang="fr-FR" b="1" baseline="0" dirty="0" smtClean="0"/>
+              <a:t> anticiper les zones </a:t>
+            </a:r>
+            <a:r>
+              <a:rPr lang="fr-FR" b="1" baseline="0" dirty="0" smtClean="0"/>
+              <a:t>interdites pour interdire le déplacement. Choix possibles :</a:t>
+            </a:r>
+          </a:p>
+          <a:p>
+            <a:pPr marL="171450" indent="-171450">
+              <a:buFont typeface="Arial"/>
+              <a:buChar char="•"/>
+            </a:pPr>
+            <a:r>
+              <a:rPr lang="fr-FR" b="0" baseline="0" dirty="0" smtClean="0"/>
+              <a:t>Détection des collisions par « frôlage » et calcul de la position</a:t>
+            </a:r>
+          </a:p>
+          <a:p>
+            <a:pPr marL="171450" indent="-171450">
+              <a:buFont typeface="Arial"/>
+              <a:buChar char="•"/>
+            </a:pPr>
+            <a:r>
+              <a:rPr lang="fr-FR" b="0" baseline="0" dirty="0" smtClean="0"/>
+              <a:t>Faire bouger et revenir en arrière si KO</a:t>
+            </a:r>
+          </a:p>
+          <a:p>
+            <a:pPr marL="171450" indent="-171450">
+              <a:buFont typeface="Arial"/>
+              <a:buChar char="•"/>
+            </a:pPr>
+            <a:r>
+              <a:rPr lang="fr-FR" b="0" baseline="0" dirty="0" smtClean="0"/>
+              <a:t>Implémentation en croix</a:t>
+            </a:r>
+          </a:p>
+          <a:p>
+            <a:pPr marL="171450" indent="-171450">
+              <a:buFont typeface="Arial"/>
+              <a:buChar char="•"/>
+            </a:pPr>
+            <a:endParaRPr lang="fr-FR" b="0" baseline="0" dirty="0" smtClean="0"/>
+          </a:p>
+          <a:p>
+            <a:pPr marL="0" indent="0">
+              <a:buFont typeface="Arial"/>
+              <a:buNone/>
+            </a:pPr>
+            <a:r>
+              <a:rPr lang="fr-FR" b="1" baseline="0" dirty="0" smtClean="0"/>
+              <a:t>Quelles surface en collisions ?</a:t>
+            </a:r>
+            <a:endParaRPr lang="fr-FR" b="1" baseline="0" dirty="0" smtClean="0"/>
+          </a:p>
+          <a:p>
+            <a:pPr marL="171450" indent="-171450">
+              <a:buFont typeface="Arial"/>
+              <a:buChar char="•"/>
+            </a:pPr>
+            <a:r>
               <a:rPr lang="fr-FR" baseline="0" dirty="0" smtClean="0"/>
-              <a:t> anticiper les zones interdites?</a:t>
-            </a:r>
-          </a:p>
-          <a:p>
+              <a:t>Type </a:t>
+            </a:r>
             <a:r>
               <a:rPr lang="fr-FR" baseline="0" dirty="0" smtClean="0"/>
-              <a:t>  -  Type ID, hiérarchie de classe</a:t>
-            </a:r>
-          </a:p>
-          <a:p>
+              <a:t>ID, </a:t>
+            </a:r>
             <a:r>
               <a:rPr lang="fr-FR" baseline="0" dirty="0" smtClean="0"/>
-              <a:t>Et comment on sait de quel type est la surface ?</a:t>
+              <a:t>utilisation de la hiérarchie </a:t>
+            </a:r>
+            <a:r>
+              <a:rPr lang="fr-FR" baseline="0" dirty="0" smtClean="0"/>
+              <a:t>de </a:t>
+            </a:r>
+            <a:r>
+              <a:rPr lang="fr-FR" baseline="0" dirty="0" smtClean="0"/>
+              <a:t>classe</a:t>
+            </a:r>
+          </a:p>
+          <a:p>
+            <a:endParaRPr lang="fr-FR" baseline="0" dirty="0" smtClean="0"/>
+          </a:p>
+          <a:p>
+            <a:r>
+              <a:rPr lang="fr-FR" b="1" baseline="0" dirty="0" smtClean="0"/>
+              <a:t>Pourquoi </a:t>
+            </a:r>
+            <a:r>
+              <a:rPr lang="fr-FR" b="1" baseline="0" dirty="0" smtClean="0"/>
+              <a:t>30px et pas 32px </a:t>
+            </a:r>
+            <a:r>
+              <a:rPr lang="fr-FR" b="1" baseline="0" dirty="0" smtClean="0"/>
+              <a:t>?</a:t>
             </a:r>
           </a:p>
           <a:p>
@@ -1906,10 +3143,7 @@
               <a:tabLst/>
               <a:defRPr/>
             </a:pPr>
-            <a:r>
-              <a:rPr lang="fr-FR" baseline="0" dirty="0" smtClean="0"/>
-              <a:t>  - On « détecte » comment le type ? (sous-classe et type-id -&gt; hiérarchie de classe)</a:t>
-            </a:r>
+            <a:endParaRPr lang="fr-FR" baseline="0" dirty="0" smtClean="0"/>
           </a:p>
           <a:p>
             <a:pPr marL="0" marR="0" indent="0" algn="l" defTabSz="457200" rtl="0" eaLnBrk="1" fontAlgn="auto" latinLnBrk="0" hangingPunct="1">
@@ -1930,9 +3164,14 @@
               <a:defRPr/>
             </a:pPr>
             <a:r>
-              <a:rPr lang="fr-FR" baseline="0" dirty="0" smtClean="0"/>
-              <a:t>  - pourquoi 30px et pas 32px ?</a:t>
-            </a:r>
+              <a:rPr lang="fr-FR" b="1" baseline="0" dirty="0" smtClean="0"/>
+              <a:t>M</a:t>
+            </a:r>
+            <a:r>
+              <a:rPr lang="fr-FR" b="1" baseline="0" dirty="0" smtClean="0"/>
+              <a:t>ême principe pour les blocs déplaçables</a:t>
+            </a:r>
+            <a:endParaRPr lang="fr-FR" b="1" baseline="0" dirty="0" smtClean="0"/>
           </a:p>
           <a:p>
             <a:endParaRPr lang="fr-FR" dirty="0"/>
@@ -2019,39 +3258,173 @@
           <a:bodyPr/>
           <a:lstStyle/>
           <a:p>
+            <a:pPr marL="171450" marR="0" indent="-171450" algn="l" defTabSz="457200" rtl="0" eaLnBrk="1" fontAlgn="auto" latinLnBrk="0" hangingPunct="1">
+              <a:lnSpc>
+                <a:spcPct val="100000"/>
+              </a:lnSpc>
+              <a:spcBef>
+                <a:spcPts val="0"/>
+              </a:spcBef>
+              <a:spcAft>
+                <a:spcPts val="0"/>
+              </a:spcAft>
+              <a:buClrTx/>
+              <a:buSzTx/>
+              <a:buFont typeface="Arial"/>
+              <a:buChar char="•"/>
+              <a:tabLst/>
+              <a:defRPr/>
+            </a:pPr>
+            <a:r>
+              <a:rPr lang="fr-FR" baseline="0" dirty="0" smtClean="0"/>
+              <a:t>Menu</a:t>
+            </a:r>
+            <a:endParaRPr lang="fr-FR" dirty="0" smtClean="0"/>
+          </a:p>
+          <a:p>
+            <a:pPr marL="628650" lvl="1" indent="-171450">
+              <a:buFont typeface="Arial"/>
+              <a:buChar char="•"/>
+            </a:pPr>
             <a:r>
               <a:rPr lang="fr-FR" dirty="0" smtClean="0"/>
-              <a:t>Steve</a:t>
-            </a:r>
-          </a:p>
-          <a:p>
-            <a:r>
-              <a:rPr lang="fr-FR" dirty="0" smtClean="0"/>
-              <a:t>	- Création</a:t>
+              <a:t>Création</a:t>
             </a:r>
             <a:r>
               <a:rPr lang="fr-FR" baseline="0" dirty="0" smtClean="0"/>
-              <a:t> de partie</a:t>
-            </a:r>
-            <a:endParaRPr lang="fr-FR" dirty="0" smtClean="0"/>
-          </a:p>
-          <a:p>
-            <a:r>
-              <a:rPr lang="fr-FR" dirty="0" smtClean="0"/>
-              <a:t>  	- Jusqu’avant</a:t>
+              <a:t> </a:t>
             </a:r>
             <a:r>
               <a:rPr lang="fr-FR" baseline="0" dirty="0" smtClean="0"/>
-              <a:t> le </a:t>
-            </a:r>
-            <a:r>
-              <a:rPr lang="fr-FR" baseline="0" dirty="0" err="1" smtClean="0"/>
+              <a:t>de </a:t>
+            </a:r>
+            <a:r>
+              <a:rPr lang="fr-FR" baseline="0" dirty="0" smtClean="0"/>
+              <a:t>partie</a:t>
+            </a:r>
+          </a:p>
+          <a:p>
+            <a:pPr marL="171450" marR="0" indent="-171450" algn="l" defTabSz="457200" rtl="0" eaLnBrk="1" fontAlgn="auto" latinLnBrk="0" hangingPunct="1">
+              <a:lnSpc>
+                <a:spcPct val="100000"/>
+              </a:lnSpc>
+              <a:spcBef>
+                <a:spcPts val="0"/>
+              </a:spcBef>
+              <a:spcAft>
+                <a:spcPts val="0"/>
+              </a:spcAft>
+              <a:buClrTx/>
+              <a:buSzTx/>
+              <a:buFont typeface="Arial"/>
+              <a:buChar char="•"/>
+              <a:tabLst/>
+              <a:defRPr/>
+            </a:pPr>
+            <a:r>
+              <a:rPr lang="fr-FR" baseline="0" dirty="0" smtClean="0"/>
+              <a:t>Menu pause</a:t>
+            </a:r>
+          </a:p>
+          <a:p>
+            <a:pPr marL="628650" lvl="1" indent="-171450">
+              <a:buFont typeface="Arial"/>
+              <a:buChar char="•"/>
+            </a:pPr>
+            <a:r>
+              <a:rPr lang="fr-FR" baseline="0" dirty="0" smtClean="0"/>
+              <a:t>Sauvegarde</a:t>
+            </a:r>
+          </a:p>
+          <a:p>
+            <a:pPr marL="628650" lvl="1" indent="-171450">
+              <a:buFont typeface="Arial"/>
+              <a:buChar char="•"/>
+            </a:pPr>
+            <a:r>
+              <a:rPr lang="fr-FR" baseline="0" dirty="0" smtClean="0"/>
+              <a:t>Redémarrage de la partie</a:t>
+            </a:r>
+          </a:p>
+          <a:p>
+            <a:pPr marL="171450" lvl="0" indent="-171450">
+              <a:buFont typeface="Arial"/>
+              <a:buChar char="•"/>
+            </a:pPr>
+            <a:r>
+              <a:rPr lang="fr-FR" b="1" baseline="0" dirty="0" smtClean="0"/>
+              <a:t>Mécaniques du jeux</a:t>
+            </a:r>
+          </a:p>
+          <a:p>
+            <a:pPr marL="628650" lvl="1" indent="-171450">
+              <a:buFont typeface="Arial"/>
+              <a:buChar char="•"/>
+            </a:pPr>
+            <a:r>
+              <a:rPr lang="fr-FR" b="1" baseline="0" dirty="0" smtClean="0"/>
+              <a:t>Perdre une vie</a:t>
+            </a:r>
+          </a:p>
+          <a:p>
+            <a:pPr marL="628650" lvl="1" indent="-171450">
+              <a:buFont typeface="Arial"/>
+              <a:buChar char="•"/>
+            </a:pPr>
+            <a:r>
+              <a:rPr lang="fr-FR" b="1" baseline="0" dirty="0" smtClean="0"/>
+              <a:t>Gagner une vie</a:t>
+            </a:r>
+          </a:p>
+          <a:p>
+            <a:pPr marL="628650" lvl="1" indent="-171450">
+              <a:buFont typeface="Arial"/>
+              <a:buChar char="•"/>
+            </a:pPr>
+            <a:r>
+              <a:rPr lang="fr-FR" b="1" baseline="0" dirty="0" smtClean="0"/>
+              <a:t>Etc…</a:t>
+            </a:r>
+          </a:p>
+          <a:p>
+            <a:pPr marL="0" indent="0">
+              <a:buFont typeface="Arial"/>
+              <a:buNone/>
+            </a:pPr>
+            <a:endParaRPr lang="fr-FR" b="1" u="sng" dirty="0" smtClean="0"/>
+          </a:p>
+          <a:p>
+            <a:pPr marL="0" indent="0">
+              <a:buFont typeface="Arial"/>
+              <a:buNone/>
+            </a:pPr>
+            <a:r>
+              <a:rPr lang="fr-FR" b="1" u="sng" dirty="0" smtClean="0"/>
+              <a:t>/!\ Jusqu’avant</a:t>
+            </a:r>
+            <a:r>
+              <a:rPr lang="fr-FR" b="1" u="sng" baseline="0" dirty="0" smtClean="0"/>
+              <a:t> </a:t>
+            </a:r>
+            <a:r>
+              <a:rPr lang="fr-FR" b="1" u="sng" baseline="0" dirty="0" smtClean="0"/>
+              <a:t>le </a:t>
+            </a:r>
+            <a:r>
+              <a:rPr lang="fr-FR" b="1" u="sng" baseline="0" dirty="0" err="1" smtClean="0"/>
               <a:t>lvl</a:t>
             </a:r>
             <a:r>
-              <a:rPr lang="fr-FR" baseline="0" dirty="0" smtClean="0"/>
-              <a:t> avec méchant</a:t>
-            </a:r>
+              <a:rPr lang="fr-FR" b="1" u="sng" baseline="0" dirty="0" smtClean="0"/>
+              <a:t> avec </a:t>
+            </a:r>
+            <a:r>
+              <a:rPr lang="fr-FR" b="1" u="sng" baseline="0" dirty="0" smtClean="0"/>
+              <a:t>méchants /!\</a:t>
+            </a:r>
+          </a:p>
+          <a:p>
+            <a:endParaRPr lang="fr-FR" baseline="0" dirty="0" smtClean="0"/>
           </a:p>
           <a:p>
             <a:endParaRPr lang="fr-FR" dirty="0"/>
@@ -5837,6 +7210,44 @@
           </a:p>
         </p:txBody>
       </p:sp>
+      <p:sp>
+        <p:nvSpPr>
+          <p:cNvPr id="3" name="ZoneTexte 2"/>
+          <p:cNvSpPr txBox="1"/>
+          <p:nvPr/>
+        </p:nvSpPr>
+        <p:spPr>
+          <a:xfrm>
+            <a:off x="3028506" y="5631053"/>
+            <a:ext cx="3736361" cy="369332"/>
+          </a:xfrm>
+          <a:prstGeom prst="rect">
+            <a:avLst/>
+          </a:prstGeom>
+          <a:noFill/>
+        </p:spPr>
+        <p:txBody>
+          <a:bodyPr wrap="square" rtlCol="0">
+            <a:spAutoFit/>
+          </a:bodyPr>
+          <a:lstStyle/>
+          <a:p>
+            <a:r>
+              <a:rPr lang="fr-FR" dirty="0" err="1" smtClean="0"/>
+              <a:t>E_Renard</a:t>
+            </a:r>
+            <a:r>
+              <a:rPr lang="fr-FR" dirty="0" smtClean="0"/>
+              <a:t>		</a:t>
+            </a:r>
+            <a:r>
+              <a:rPr lang="fr-FR" dirty="0" err="1" smtClean="0"/>
+              <a:t>E_Loup</a:t>
+            </a:r>
+            <a:endParaRPr lang="fr-FR" dirty="0"/>
+          </a:p>
+        </p:txBody>
+      </p:sp>
     </p:spTree>
     <p:extLst>
       <p:ext uri="{BB962C8B-B14F-4D97-AF65-F5344CB8AC3E}">
@@ -6205,7 +7616,7 @@
           <a:p>
             <a:r>
               <a:rPr lang="fr-FR" dirty="0" smtClean="0"/>
-              <a:t>Déplacement</a:t>
+              <a:t>Déplacements</a:t>
             </a:r>
             <a:endParaRPr lang="fr-FR" dirty="0"/>
           </a:p>
@@ -6699,11 +8110,7 @@
           <a:p>
             <a:r>
               <a:rPr lang="fr-FR" dirty="0" smtClean="0"/>
-              <a:t>Population </a:t>
-            </a:r>
-            <a:r>
-              <a:rPr lang="fr-FR" dirty="0" smtClean="0"/>
-              <a:t>automatique</a:t>
+              <a:t>Population automatique</a:t>
             </a:r>
           </a:p>
           <a:p>
@@ -6721,8 +8128,23 @@
           <a:p>
             <a:r>
               <a:rPr lang="fr-FR" dirty="0" smtClean="0"/>
-              <a:t>Optimisation fluidité</a:t>
-            </a:r>
+              <a:t>Optimisation </a:t>
+            </a:r>
+            <a:r>
+              <a:rPr lang="fr-FR" dirty="0" smtClean="0"/>
+              <a:t>fluidité</a:t>
+            </a:r>
+          </a:p>
+          <a:p>
+            <a:r>
+              <a:rPr lang="fr-FR" dirty="0"/>
+              <a:t>Boss de </a:t>
+            </a:r>
+            <a:r>
+              <a:rPr lang="fr-FR" dirty="0" smtClean="0"/>
+              <a:t>fin</a:t>
+            </a:r>
+            <a:endParaRPr lang="fr-FR" dirty="0" smtClean="0"/>
           </a:p>
           <a:p>
             <a:r>
@@ -6734,12 +8156,6 @@
             <a:r>
               <a:rPr lang="fr-FR" dirty="0" smtClean="0"/>
               <a:t>Pouvoirs spéciaux</a:t>
-            </a:r>
-          </a:p>
-          <a:p>
-            <a:r>
-              <a:rPr lang="fr-FR" dirty="0" smtClean="0"/>
-              <a:t>Boss de fin</a:t>
             </a:r>
           </a:p>
           <a:p>
@@ -7299,7 +8715,7 @@
         </p:blipFill>
         <p:spPr>
           <a:xfrm>
-            <a:off x="1433687" y="1519968"/>
+            <a:off x="1433687" y="1653664"/>
             <a:ext cx="6172200" cy="2939143"/>
           </a:xfrm>
           <a:prstGeom prst="rect">
@@ -7316,7 +8732,7 @@
         <p:spPr>
           <a:xfrm>
             <a:off x="2980028" y="4713112"/>
-            <a:ext cx="3091599" cy="1200329"/>
+            <a:ext cx="3091599" cy="923330"/>
           </a:xfrm>
           <a:prstGeom prst="rect">
             <a:avLst/>
@@ -7328,25 +8744,6 @@
             <a:spAutoFit/>
           </a:bodyPr>
           <a:lstStyle/>
-          <a:p>
-            <a:pPr algn="ctr"/>
-            <a:r>
-              <a:rPr lang="fr-FR" b="1" dirty="0" err="1" smtClean="0">
-                <a:solidFill>
-                  <a:srgbClr val="EECF1A"/>
-                </a:solidFill>
-              </a:rPr>
-              <a:t>Powered</a:t>
-            </a:r>
-            <a:r>
-              <a:rPr lang="fr-FR" b="1" dirty="0" smtClean="0">
-                <a:solidFill>
-                  <a:srgbClr val="EECF1A"/>
-                </a:solidFill>
-              </a:rPr>
-              <a:t> by</a:t>
-            </a:r>
-          </a:p>
           <a:p>
             <a:pPr algn="ctr"/>
             <a:r>
@@ -7471,6 +8868,40 @@
                 <a:srgbClr val="FFFFFF"/>
               </a:solidFill>
             </a:endParaRPr>
+          </a:p>
+        </p:txBody>
+      </p:sp>
+      <p:sp>
+        <p:nvSpPr>
+          <p:cNvPr id="13" name="ZoneTexte 12"/>
+          <p:cNvSpPr txBox="1"/>
+          <p:nvPr/>
+        </p:nvSpPr>
+        <p:spPr>
+          <a:xfrm>
+            <a:off x="3719375" y="1150636"/>
+            <a:ext cx="1583524" cy="369332"/>
+          </a:xfrm>
+          <a:prstGeom prst="rect">
+            <a:avLst/>
+          </a:prstGeom>
+          <a:noFill/>
+        </p:spPr>
+        <p:txBody>
+          <a:bodyPr wrap="none" rtlCol="0">
+            <a:spAutoFit/>
+          </a:bodyPr>
+          <a:lstStyle/>
+          <a:p>
+            <a:pPr algn="ctr"/>
+            <a:r>
+              <a:rPr lang="fr-FR" b="1" dirty="0" smtClean="0">
+                <a:solidFill>
+                  <a:srgbClr val="EECF1A"/>
+                </a:solidFill>
+              </a:rPr>
+              <a:t>Présenté par</a:t>
+            </a:r>
           </a:p>
         </p:txBody>
       </p:sp>
@@ -7628,8 +9059,14 @@
                   </a:schemeClr>
                 </a:solidFill>
               </a:rPr>
-              <a:t>Répartition des t</a:t>
-            </a:r>
+              <a:t>Répartition des tâches</a:t>
+            </a:r>
+          </a:p>
+          <a:p>
+            <a:pPr marL="457200" indent="-457200">
+              <a:buFont typeface="+mj-lt"/>
+              <a:buAutoNum type="arabicPeriod"/>
+            </a:pPr>
             <a:r>
               <a:rPr lang="fr-FR" b="1" dirty="0" smtClean="0">
                 <a:solidFill>
@@ -7639,43 +9076,7 @@
                   </a:schemeClr>
                 </a:solidFill>
               </a:rPr>
-              <a:t>âches</a:t>
-            </a:r>
-            <a:endParaRPr lang="fr-FR" b="1" dirty="0" smtClean="0">
-              <a:solidFill>
-                <a:schemeClr val="tx2">
-                  <a:lumMod val="60000"/>
-                  <a:lumOff val="40000"/>
-                </a:schemeClr>
-              </a:solidFill>
-            </a:endParaRPr>
-          </a:p>
-          <a:p>
-            <a:pPr marL="457200" indent="-457200">
-              <a:buFont typeface="+mj-lt"/>
-              <a:buAutoNum type="arabicPeriod"/>
-            </a:pPr>
-            <a:r>
-              <a:rPr lang="fr-FR" b="1" dirty="0" smtClean="0">
-                <a:solidFill>
-                  <a:schemeClr val="tx2">
-                    <a:lumMod val="60000"/>
-                    <a:lumOff val="40000"/>
-                  </a:schemeClr>
-                </a:solidFill>
-              </a:rPr>
-              <a:t>Principe </a:t>
-            </a:r>
-            <a:r>
-              <a:rPr lang="fr-FR" b="1" dirty="0" smtClean="0">
-                <a:solidFill>
-                  <a:schemeClr val="tx2">
-                    <a:lumMod val="60000"/>
-                    <a:lumOff val="40000"/>
-                  </a:schemeClr>
-                </a:solidFill>
-              </a:rPr>
-              <a:t>du jeu</a:t>
+              <a:t>Principe du jeu</a:t>
             </a:r>
           </a:p>
           <a:p>
@@ -7726,27 +9127,8 @@
                   </a:schemeClr>
                 </a:solidFill>
               </a:rPr>
-              <a:t>Ennemis, </a:t>
-            </a:r>
-            <a:r>
-              <a:rPr lang="fr-FR" b="1" dirty="0" smtClean="0">
-                <a:solidFill>
-                  <a:schemeClr val="tx2">
-                    <a:lumMod val="60000"/>
-                    <a:lumOff val="40000"/>
-                  </a:schemeClr>
-                </a:solidFill>
-              </a:rPr>
-              <a:t>IA</a:t>
-            </a:r>
-            <a:endParaRPr lang="fr-FR" b="1" dirty="0" smtClean="0">
-              <a:solidFill>
-                <a:schemeClr val="tx2">
-                  <a:lumMod val="60000"/>
-                  <a:lumOff val="40000"/>
-                </a:schemeClr>
-              </a:solidFill>
-            </a:endParaRPr>
+              <a:t>Ennemis, IA</a:t>
+            </a:r>
           </a:p>
           <a:p>
             <a:pPr marL="457200" indent="-457200">
@@ -7888,7 +9270,7 @@
         </p:blipFill>
         <p:spPr>
           <a:xfrm>
-            <a:off x="6193353" y="3161871"/>
+            <a:off x="6026263" y="3161871"/>
             <a:ext cx="750375" cy="750375"/>
           </a:xfrm>
           <a:prstGeom prst="rect">
@@ -7898,7 +9280,7 @@
       </p:pic>
       <p:pic>
         <p:nvPicPr>
-          <p:cNvPr id="7" name="Image 6" descr="player_front.png"/>
+          <p:cNvPr id="8" name="Image 7" descr="Pingouin_Face.png"/>
           <p:cNvPicPr>
             <a:picLocks noChangeAspect="1"/>
           </p:cNvPicPr>
@@ -7918,8 +9300,8 @@
         </p:blipFill>
         <p:spPr>
           <a:xfrm>
-            <a:off x="6325675" y="3161871"/>
-            <a:ext cx="892170" cy="892170"/>
+            <a:off x="6332599" y="3040368"/>
+            <a:ext cx="739201" cy="871878"/>
           </a:xfrm>
           <a:prstGeom prst="rect">
             <a:avLst/>
@@ -8027,9 +9409,36 @@
           <a:bodyPr/>
           <a:lstStyle/>
           <a:p>
+            <a:endParaRPr lang="fr-FR" dirty="0" smtClean="0"/>
+          </a:p>
+          <a:p>
             <a:r>
               <a:rPr lang="fr-FR" dirty="0" smtClean="0"/>
-              <a:t>Mise au point a chaque rencontre de l’avancement</a:t>
+              <a:t>Mise </a:t>
+            </a:r>
+            <a:r>
+              <a:rPr lang="fr-FR" dirty="0" smtClean="0"/>
+              <a:t>au </a:t>
+            </a:r>
+            <a:r>
+              <a:rPr lang="fr-FR" dirty="0" smtClean="0"/>
+              <a:t>point de l’avancement </a:t>
+            </a:r>
+            <a:r>
+              <a:rPr lang="fr-FR" dirty="0" smtClean="0"/>
+              <a:t>à</a:t>
+            </a:r>
+            <a:r>
+              <a:rPr lang="fr-FR" dirty="0" smtClean="0"/>
+              <a:t> </a:t>
+            </a:r>
+            <a:r>
+              <a:rPr lang="fr-FR" dirty="0" smtClean="0"/>
+              <a:t>chaque </a:t>
+            </a:r>
+            <a:r>
+              <a:rPr lang="fr-FR" dirty="0" smtClean="0"/>
+              <a:t>rencontre</a:t>
             </a:r>
           </a:p>
           <a:p>
@@ -8206,16 +9615,40 @@
           <a:bodyPr/>
           <a:lstStyle/>
           <a:p>
+            <a:endParaRPr lang="fr-FR" dirty="0" smtClean="0"/>
+          </a:p>
+          <a:p>
             <a:r>
               <a:rPr lang="fr-FR" dirty="0" smtClean="0"/>
-              <a:t>Répartition initiale par fonctionnalité</a:t>
-            </a:r>
-          </a:p>
-          <a:p>
+              <a:t>Répartition initiale des t</a:t>
+            </a:r>
             <a:r>
               <a:rPr lang="fr-FR" dirty="0" smtClean="0"/>
-              <a:t>Tout le monde s’est occupé un peu de tout</a:t>
-            </a:r>
+              <a:t>âches</a:t>
+            </a:r>
+            <a:r>
+              <a:rPr lang="fr-FR" dirty="0" smtClean="0"/>
+              <a:t> </a:t>
+            </a:r>
+            <a:r>
+              <a:rPr lang="fr-FR" dirty="0" smtClean="0"/>
+              <a:t>par </a:t>
+            </a:r>
+            <a:r>
+              <a:rPr lang="fr-FR" dirty="0" smtClean="0"/>
+              <a:t>fonctionnalité</a:t>
+            </a:r>
+          </a:p>
+          <a:p>
+            <a:r>
+              <a:rPr lang="fr-FR" dirty="0" smtClean="0"/>
+              <a:t>Adaptation de la répartition des t</a:t>
+            </a:r>
+            <a:r>
+              <a:rPr lang="fr-FR" dirty="0" smtClean="0"/>
+              <a:t>âches en fonction de l’avancement de chacun</a:t>
+            </a:r>
+            <a:endParaRPr lang="fr-FR" dirty="0" smtClean="0"/>
           </a:p>
           <a:p>
             <a:endParaRPr lang="fr-FR" dirty="0"/>
@@ -8392,13 +9825,8 @@
           <a:p>
             <a:r>
               <a:rPr lang="fr-FR" dirty="0" smtClean="0"/>
-              <a:t>5 slots de </a:t>
-            </a:r>
-            <a:r>
-              <a:rPr lang="fr-FR" dirty="0" smtClean="0"/>
-              <a:t>sauvegarde</a:t>
-            </a:r>
-            <a:endParaRPr lang="fr-FR" dirty="0" smtClean="0"/>
+              <a:t>5 slots de sauvegarde</a:t>
+            </a:r>
           </a:p>
         </p:txBody>
       </p:sp>
@@ -8509,7 +9937,7 @@
         </p:blipFill>
         <p:spPr>
           <a:xfrm>
-            <a:off x="705346" y="3945970"/>
+            <a:off x="705346" y="3661866"/>
             <a:ext cx="406400" cy="406400"/>
           </a:xfrm>
           <a:prstGeom prst="rect">
@@ -8539,7 +9967,7 @@
         </p:blipFill>
         <p:spPr>
           <a:xfrm>
-            <a:off x="705346" y="4489374"/>
+            <a:off x="705346" y="4205270"/>
             <a:ext cx="406400" cy="406400"/>
           </a:xfrm>
           <a:prstGeom prst="rect">
@@ -8555,8 +9983,8 @@
         </p:nvSpPr>
         <p:spPr>
           <a:xfrm>
-            <a:off x="1261323" y="3945970"/>
-            <a:ext cx="1794393" cy="1477328"/>
+            <a:off x="1261323" y="3661866"/>
+            <a:ext cx="1794393" cy="2308324"/>
           </a:xfrm>
           <a:prstGeom prst="rect">
             <a:avLst/>
@@ -8580,14 +10008,12 @@
               <a:rPr lang="fr-FR" dirty="0" smtClean="0"/>
               <a:t> </a:t>
             </a:r>
-            <a:endParaRPr lang="fr-FR" dirty="0" smtClean="0"/>
           </a:p>
           <a:p>
             <a:r>
               <a:rPr lang="fr-FR" dirty="0" smtClean="0"/>
               <a:t>Bottes </a:t>
             </a:r>
-            <a:endParaRPr lang="fr-FR" dirty="0" smtClean="0"/>
           </a:p>
           <a:p>
             <a:endParaRPr lang="fr-FR" dirty="0" smtClean="0"/>
@@ -8596,6 +10022,18 @@
             <a:r>
               <a:rPr lang="fr-FR" dirty="0" smtClean="0"/>
               <a:t>Poisson</a:t>
+            </a:r>
+          </a:p>
+          <a:p>
+            <a:endParaRPr lang="fr-FR" dirty="0" smtClean="0"/>
+          </a:p>
+          <a:p>
+            <a:endParaRPr lang="fr-FR" dirty="0"/>
+          </a:p>
+          <a:p>
+            <a:r>
+              <a:rPr lang="fr-FR" dirty="0" smtClean="0"/>
+              <a:t>Ennemi</a:t>
             </a:r>
             <a:endParaRPr lang="fr-FR" dirty="0"/>
           </a:p>
@@ -8623,7 +10061,37 @@
         </p:blipFill>
         <p:spPr>
           <a:xfrm>
-            <a:off x="705346" y="5016898"/>
+            <a:off x="705346" y="4732794"/>
+            <a:ext cx="406400" cy="406400"/>
+          </a:xfrm>
+          <a:prstGeom prst="rect">
+            <a:avLst/>
+          </a:prstGeom>
+        </p:spPr>
+      </p:pic>
+      <p:pic>
+        <p:nvPicPr>
+          <p:cNvPr id="11" name="Image 10" descr="renard_right.png"/>
+          <p:cNvPicPr>
+            <a:picLocks noChangeAspect="1"/>
+          </p:cNvPicPr>
+          <p:nvPr/>
+        </p:nvPicPr>
+        <p:blipFill>
+          <a:blip r:embed="rId8">
+            <a:extLst>
+              <a:ext uri="{28A0092B-C50C-407E-A947-70E740481C1C}">
+                <a14:useLocalDpi xmlns:a14="http://schemas.microsoft.com/office/drawing/2010/main" val="0"/>
+              </a:ext>
+            </a:extLst>
+          </a:blip>
+          <a:stretch>
+            <a:fillRect/>
+          </a:stretch>
+        </p:blipFill>
+        <p:spPr>
+          <a:xfrm>
+            <a:off x="705346" y="5537471"/>
             <a:ext cx="406400" cy="406400"/>
           </a:xfrm>
           <a:prstGeom prst="rect">
@@ -8763,10 +10231,10 @@
               <a:t>Population </a:t>
             </a:r>
             <a:r>
-              <a:rPr lang="fr-FR" b="1" dirty="0" smtClean="0"/>
-              <a:t>automatique</a:t>
-            </a:r>
-            <a:endParaRPr lang="fr-FR" b="1" dirty="0"/>
+              <a:rPr lang="fr-FR" dirty="0" smtClean="0"/>
+              <a:t>automatisée</a:t>
+            </a:r>
+            <a:endParaRPr lang="fr-FR" dirty="0"/>
           </a:p>
           <a:p>
             <a:endParaRPr lang="fr-FR" dirty="0"/>
@@ -8853,8 +10321,8 @@
         </p:nvSpPr>
         <p:spPr>
           <a:xfrm>
-            <a:off x="2864552" y="3972151"/>
-            <a:ext cx="4247445" cy="1477328"/>
+            <a:off x="2864552" y="3688047"/>
+            <a:ext cx="4247445" cy="1754327"/>
           </a:xfrm>
           <a:prstGeom prst="rect">
             <a:avLst/>
@@ -8866,6 +10334,16 @@
             <a:spAutoFit/>
           </a:bodyPr>
           <a:lstStyle/>
+          <a:p>
+            <a:r>
+              <a:rPr lang="fr-FR" dirty="0" smtClean="0"/>
+              <a:t>		  </a:t>
+            </a:r>
+            <a:r>
+              <a:rPr lang="fr-FR" b="1" dirty="0" smtClean="0"/>
+              <a:t>« Surfaces »</a:t>
+            </a:r>
+          </a:p>
           <a:p>
             <a:r>
               <a:rPr lang="fr-FR" dirty="0" smtClean="0"/>
@@ -9106,7 +10584,15 @@
           <a:p>
             <a:r>
               <a:rPr lang="fr-FR" dirty="0" smtClean="0"/>
-              <a:t>Détection des collisions environnantes et sur place</a:t>
+              <a:t>Détection des collisions </a:t>
+            </a:r>
+            <a:r>
+              <a:rPr lang="fr-FR" dirty="0" smtClean="0"/>
+              <a:t>dans chaque direction </a:t>
+            </a:r>
+            <a:r>
+              <a:rPr lang="fr-FR" dirty="0" smtClean="0"/>
+              <a:t>et sur place</a:t>
             </a:r>
           </a:p>
           <a:p>

</xml_diff>

<commit_message>
MAJ: PPT partie romain
</commit_message>
<xml_diff>
--- a/Administration/JamesGouinSePresente.pptx
+++ b/Administration/JamesGouinSePresente.pptx
@@ -837,15 +837,7 @@
             </a:pPr>
             <a:r>
               <a:rPr lang="fr-FR" b="1" dirty="0" smtClean="0"/>
-              <a:t>Champ </a:t>
-            </a:r>
-            <a:r>
-              <a:rPr lang="fr-FR" b="1" dirty="0" smtClean="0"/>
-              <a:t>de </a:t>
-            </a:r>
-            <a:r>
-              <a:rPr lang="fr-FR" b="1" dirty="0" smtClean="0"/>
-              <a:t>vision, création</a:t>
+              <a:t>Champ de vision, création</a:t>
             </a:r>
           </a:p>
           <a:p>
@@ -855,19 +847,7 @@
             </a:pPr>
             <a:r>
               <a:rPr lang="fr-FR" baseline="0" dirty="0" smtClean="0"/>
-              <a:t>blocs assignés </a:t>
-            </a:r>
-            <a:r>
-              <a:rPr lang="fr-FR" baseline="0" dirty="0" smtClean="0"/>
-              <a:t>à une</a:t>
-            </a:r>
-            <a:r>
-              <a:rPr lang="fr-FR" baseline="0" dirty="0" smtClean="0"/>
-              <a:t> </a:t>
-            </a:r>
-            <a:r>
-              <a:rPr lang="fr-FR" baseline="0" dirty="0" smtClean="0"/>
-              <a:t>lignes et colonne, tout dans une liste dans Ennemi.</a:t>
+              <a:t>blocs assignés à une lignes et colonne, tout dans une liste dans Ennemi.</a:t>
             </a:r>
           </a:p>
           <a:p>
@@ -877,15 +857,7 @@
             </a:pPr>
             <a:r>
               <a:rPr lang="fr-FR" baseline="0" dirty="0" smtClean="0"/>
-              <a:t>forme du champ de vision définissable avec des blocs assignés </a:t>
-            </a:r>
-            <a:r>
-              <a:rPr lang="fr-FR" baseline="0" dirty="0" smtClean="0"/>
-              <a:t>à</a:t>
-            </a:r>
-            <a:r>
-              <a:rPr lang="fr-FR" baseline="0" dirty="0" smtClean="0"/>
-              <a:t> certaines lignes et colonnes.</a:t>
+              <a:t>forme du champ de vision définissable avec des blocs assignés à certaines lignes et colonnes.</a:t>
             </a:r>
           </a:p>
           <a:p>
@@ -927,15 +899,7 @@
             </a:pPr>
             <a:r>
               <a:rPr lang="fr-FR" b="1" baseline="0" dirty="0" smtClean="0"/>
-              <a:t>Mise </a:t>
-            </a:r>
-            <a:r>
-              <a:rPr lang="fr-FR" b="1" baseline="0" dirty="0" smtClean="0"/>
-              <a:t>à</a:t>
-            </a:r>
-            <a:r>
-              <a:rPr lang="fr-FR" b="1" baseline="0" dirty="0" smtClean="0"/>
-              <a:t> jour du champ de vision 10fois par seconde :</a:t>
+              <a:t>Mise à jour du champ de vision 10fois par seconde :</a:t>
             </a:r>
           </a:p>
           <a:p>
@@ -1367,13 +1331,8 @@
             </a:pPr>
             <a:r>
               <a:rPr lang="fr-FR" b="1" baseline="0" dirty="0" smtClean="0"/>
-              <a:t>Retour de l’ennemis en arri</a:t>
-            </a:r>
-            <a:r>
-              <a:rPr lang="fr-FR" b="1" baseline="0" dirty="0" smtClean="0"/>
-              <a:t>ère si obstacle sur son chemin. Il n’essaye pas de le contourner</a:t>
-            </a:r>
-            <a:endParaRPr lang="fr-FR" b="1" baseline="0" dirty="0" smtClean="0"/>
+              <a:t>Retour de l’ennemis en arrière si obstacle sur son chemin. Il n’essaye pas de le contourner</a:t>
+            </a:r>
           </a:p>
           <a:p>
             <a:endParaRPr lang="fr-FR" dirty="0" smtClean="0"/>
@@ -1673,6 +1632,96 @@
               <a:rPr lang="fr-FR" dirty="0" smtClean="0"/>
               <a:t>Romain</a:t>
             </a:r>
+          </a:p>
+          <a:p>
+            <a:r>
+              <a:rPr lang="fr-FR" dirty="0" smtClean="0"/>
+              <a:t>	Le jeu a été développé</a:t>
+            </a:r>
+            <a:r>
+              <a:rPr lang="fr-FR" baseline="0" dirty="0" smtClean="0"/>
+              <a:t> su</a:t>
+            </a:r>
+            <a:r>
+              <a:rPr lang="fr-FR" dirty="0" smtClean="0"/>
+              <a:t>r 2 plateformes en simultané Mac et Windows</a:t>
+            </a:r>
+          </a:p>
+          <a:p>
+            <a:r>
+              <a:rPr lang="fr-FR" dirty="0" smtClean="0"/>
+              <a:t>	Grace à la diversité des OS,</a:t>
+            </a:r>
+            <a:r>
+              <a:rPr lang="fr-FR" baseline="0" dirty="0" smtClean="0"/>
+              <a:t> nous avons du plus réfléchir trouver des solutions cross compatible (gestion de la mémoire par exemple)</a:t>
+            </a:r>
+          </a:p>
+          <a:p>
+            <a:r>
+              <a:rPr lang="fr-FR" baseline="0" dirty="0" smtClean="0"/>
+              <a:t>	La possibilité de pouvoir ajouter des niveau facilement grâce à la population automatique</a:t>
+            </a:r>
+          </a:p>
+          <a:p>
+            <a:r>
+              <a:rPr lang="fr-FR" baseline="0" dirty="0" smtClean="0"/>
+              <a:t>	Les solutions sont cherchées et résolu en équipe et pas individuellement</a:t>
+            </a:r>
+          </a:p>
+          <a:p>
+            <a:r>
+              <a:rPr lang="fr-FR" baseline="0" dirty="0" smtClean="0"/>
+              <a:t>	</a:t>
+            </a:r>
+          </a:p>
+          <a:p>
+            <a:r>
+              <a:rPr lang="fr-FR" baseline="0" dirty="0" smtClean="0"/>
+              <a:t>	Une solution moins gourmande en CPU des </a:t>
+            </a:r>
+            <a:r>
+              <a:rPr lang="fr-FR" baseline="0" dirty="0" err="1" smtClean="0"/>
+              <a:t>AIs</a:t>
+            </a:r>
+            <a:r>
+              <a:rPr lang="fr-FR" baseline="0" dirty="0" smtClean="0"/>
+              <a:t> est </a:t>
+            </a:r>
+            <a:r>
+              <a:rPr lang="fr-FR" baseline="0" dirty="0" err="1" smtClean="0"/>
+              <a:t>envisagable</a:t>
+            </a:r>
+            <a:endParaRPr lang="fr-FR" baseline="0" dirty="0" smtClean="0"/>
+          </a:p>
+          <a:p>
+            <a:r>
+              <a:rPr lang="fr-FR" baseline="0" dirty="0" smtClean="0"/>
+              <a:t>	Nous avons le niveau Tutoriel, Ile Principal (sélection des niveaux) et le premier niveau qui est terminé.</a:t>
+            </a:r>
+          </a:p>
+          <a:p>
+            <a:r>
+              <a:rPr lang="fr-FR" baseline="0" dirty="0" smtClean="0"/>
+              <a:t>	Aucun boss n’a été </a:t>
+            </a:r>
+            <a:r>
+              <a:rPr lang="fr-FR" baseline="0" dirty="0" err="1" smtClean="0"/>
+              <a:t>implementé</a:t>
+            </a:r>
+            <a:endParaRPr lang="fr-FR" baseline="0" dirty="0" smtClean="0"/>
+          </a:p>
+          <a:p>
+            <a:r>
+              <a:rPr lang="fr-FR" baseline="0" dirty="0" smtClean="0"/>
+              <a:t>	Les pouvoirs spéciaux comme par exemple se cacher sous la neige pour échapper à un ennemi ou glisser sur le ventre pour aller plus vitre sur la neige</a:t>
+            </a:r>
+          </a:p>
+          <a:p>
+            <a:r>
+              <a:rPr lang="fr-FR" baseline="0" dirty="0" smtClean="0"/>
+              <a:t>	</a:t>
+            </a:r>
             <a:endParaRPr lang="fr-FR" dirty="0"/>
           </a:p>
         </p:txBody>
@@ -1759,7 +1808,7 @@
           <a:p>
             <a:r>
               <a:rPr lang="fr-FR" dirty="0" smtClean="0"/>
-              <a:t>Steve</a:t>
+              <a:t>Tous</a:t>
             </a:r>
             <a:endParaRPr lang="fr-FR" dirty="0"/>
           </a:p>
@@ -2031,6 +2080,281 @@
               <a:rPr lang="fr-FR" dirty="0" smtClean="0"/>
               <a:t>Romain</a:t>
             </a:r>
+          </a:p>
+          <a:p>
+            <a:r>
+              <a:rPr lang="fr-FR" dirty="0" smtClean="0"/>
+              <a:t>	On</a:t>
+            </a:r>
+            <a:r>
+              <a:rPr lang="fr-FR" baseline="0" dirty="0" smtClean="0"/>
+              <a:t> a commencé par la méthodologie Cascade</a:t>
+            </a:r>
+          </a:p>
+          <a:p>
+            <a:endParaRPr lang="fr-FR" dirty="0" smtClean="0"/>
+          </a:p>
+          <a:p>
+            <a:r>
+              <a:rPr lang="fr-FR" dirty="0" smtClean="0"/>
+              <a:t>	</a:t>
+            </a:r>
+            <a:r>
+              <a:rPr lang="fr-FR" sz="1200" kern="1200" dirty="0" smtClean="0">
+                <a:solidFill>
+                  <a:schemeClr val="tx1"/>
+                </a:solidFill>
+                <a:effectLst/>
+                <a:latin typeface="+mn-lt"/>
+                <a:ea typeface="+mn-ea"/>
+                <a:cs typeface="+mn-cs"/>
+              </a:rPr>
+              <a:t>Product </a:t>
+            </a:r>
+            <a:r>
+              <a:rPr lang="fr-FR" sz="1200" kern="1200" dirty="0" err="1" smtClean="0">
+                <a:solidFill>
+                  <a:schemeClr val="tx1"/>
+                </a:solidFill>
+                <a:effectLst/>
+                <a:latin typeface="+mn-lt"/>
+                <a:ea typeface="+mn-ea"/>
+                <a:cs typeface="+mn-cs"/>
+              </a:rPr>
+              <a:t>Backlog</a:t>
+            </a:r>
+            <a:r>
+              <a:rPr lang="fr-FR" sz="1200" kern="1200" dirty="0" smtClean="0">
+                <a:solidFill>
+                  <a:schemeClr val="tx1"/>
+                </a:solidFill>
+                <a:effectLst/>
+                <a:latin typeface="+mn-lt"/>
+                <a:ea typeface="+mn-ea"/>
+                <a:cs typeface="+mn-cs"/>
+              </a:rPr>
+              <a:t> : Cahier</a:t>
+            </a:r>
+            <a:r>
+              <a:rPr lang="fr-FR" sz="1200" kern="1200" baseline="0" dirty="0" smtClean="0">
+                <a:solidFill>
+                  <a:schemeClr val="tx1"/>
+                </a:solidFill>
+                <a:effectLst/>
+                <a:latin typeface="+mn-lt"/>
+                <a:ea typeface="+mn-ea"/>
+                <a:cs typeface="+mn-cs"/>
+              </a:rPr>
+              <a:t> des charge et </a:t>
+            </a:r>
+            <a:r>
+              <a:rPr lang="fr-FR" sz="1200" kern="1200" dirty="0" err="1" smtClean="0">
+                <a:solidFill>
+                  <a:schemeClr val="tx1"/>
+                </a:solidFill>
+                <a:effectLst/>
+                <a:latin typeface="+mn-lt"/>
+                <a:ea typeface="+mn-ea"/>
+                <a:cs typeface="+mn-cs"/>
+              </a:rPr>
+              <a:t>Specifications</a:t>
+            </a:r>
+            <a:endParaRPr lang="fr-FR" sz="1200" kern="1200" dirty="0" smtClean="0">
+              <a:solidFill>
+                <a:schemeClr val="tx1"/>
+              </a:solidFill>
+              <a:effectLst/>
+              <a:latin typeface="+mn-lt"/>
+              <a:ea typeface="+mn-ea"/>
+              <a:cs typeface="+mn-cs"/>
+            </a:endParaRPr>
+          </a:p>
+          <a:p>
+            <a:r>
+              <a:rPr lang="fr-FR" sz="1200" kern="1200" dirty="0" smtClean="0">
+                <a:solidFill>
+                  <a:schemeClr val="tx1"/>
+                </a:solidFill>
+                <a:effectLst/>
+                <a:latin typeface="+mn-lt"/>
+                <a:ea typeface="+mn-ea"/>
+                <a:cs typeface="+mn-cs"/>
+              </a:rPr>
+              <a:t>	Sprint </a:t>
+            </a:r>
+            <a:r>
+              <a:rPr lang="fr-FR" sz="1200" kern="1200" dirty="0" err="1" smtClean="0">
+                <a:solidFill>
+                  <a:schemeClr val="tx1"/>
+                </a:solidFill>
+                <a:effectLst/>
+                <a:latin typeface="+mn-lt"/>
+                <a:ea typeface="+mn-ea"/>
+                <a:cs typeface="+mn-cs"/>
+              </a:rPr>
+              <a:t>Backlog</a:t>
+            </a:r>
+            <a:r>
+              <a:rPr lang="fr-FR" sz="1200" kern="1200" baseline="0" dirty="0" smtClean="0">
+                <a:solidFill>
+                  <a:schemeClr val="tx1"/>
+                </a:solidFill>
+                <a:effectLst/>
+                <a:latin typeface="+mn-lt"/>
+                <a:ea typeface="+mn-ea"/>
+                <a:cs typeface="+mn-cs"/>
+              </a:rPr>
+              <a:t> : </a:t>
+            </a:r>
+            <a:r>
+              <a:rPr lang="fr-FR" sz="1200" kern="1200" dirty="0" smtClean="0">
+                <a:solidFill>
+                  <a:schemeClr val="tx1"/>
+                </a:solidFill>
+                <a:effectLst/>
+                <a:latin typeface="+mn-lt"/>
+                <a:ea typeface="+mn-ea"/>
+                <a:cs typeface="+mn-cs"/>
+              </a:rPr>
+              <a:t>tous lundi pendant les heures du projet</a:t>
+            </a:r>
+            <a:r>
+              <a:rPr lang="fr-CH" dirty="0" smtClean="0">
+                <a:effectLst/>
+              </a:rPr>
+              <a:t> </a:t>
+            </a:r>
+          </a:p>
+          <a:p>
+            <a:r>
+              <a:rPr lang="fr-CH" dirty="0" smtClean="0">
+                <a:effectLst/>
+              </a:rPr>
+              <a:t>	</a:t>
+            </a:r>
+          </a:p>
+          <a:p>
+            <a:r>
+              <a:rPr lang="fr-CH" sz="1200" kern="1200" dirty="0" smtClean="0">
+                <a:solidFill>
+                  <a:schemeClr val="tx1"/>
+                </a:solidFill>
+                <a:effectLst/>
+                <a:latin typeface="+mn-lt"/>
+                <a:ea typeface="+mn-ea"/>
+                <a:cs typeface="+mn-cs"/>
+              </a:rPr>
+              <a:t>	Sprint</a:t>
+            </a:r>
+            <a:r>
+              <a:rPr lang="fr-CH" sz="1200" kern="1200" baseline="0" dirty="0" smtClean="0">
+                <a:solidFill>
+                  <a:schemeClr val="tx1"/>
+                </a:solidFill>
+                <a:effectLst/>
+                <a:latin typeface="+mn-lt"/>
+                <a:ea typeface="+mn-ea"/>
+                <a:cs typeface="+mn-cs"/>
+              </a:rPr>
+              <a:t> : Durée de 1 semaine de lundi à lundi</a:t>
+            </a:r>
+          </a:p>
+          <a:p>
+            <a:r>
+              <a:rPr lang="fr-CH" sz="1200" kern="1200" baseline="0" dirty="0" smtClean="0">
+                <a:solidFill>
+                  <a:schemeClr val="tx1"/>
+                </a:solidFill>
+                <a:effectLst/>
+                <a:latin typeface="+mn-lt"/>
+                <a:ea typeface="+mn-ea"/>
+                <a:cs typeface="+mn-cs"/>
+              </a:rPr>
+              <a:t>	Resultat : Iteration avec nouvelles fonctionnalités</a:t>
+            </a:r>
+          </a:p>
+          <a:p>
+            <a:endParaRPr lang="fr-CH" sz="1200" kern="1200" baseline="0" dirty="0" smtClean="0">
+              <a:solidFill>
+                <a:schemeClr val="tx1"/>
+              </a:solidFill>
+              <a:effectLst/>
+              <a:latin typeface="+mn-lt"/>
+              <a:ea typeface="+mn-ea"/>
+              <a:cs typeface="+mn-cs"/>
+            </a:endParaRPr>
+          </a:p>
+          <a:p>
+            <a:r>
+              <a:rPr lang="fr-CH" sz="1200" kern="1200" baseline="0" dirty="0" smtClean="0">
+                <a:solidFill>
+                  <a:schemeClr val="tx1"/>
+                </a:solidFill>
+                <a:effectLst/>
+                <a:latin typeface="+mn-lt"/>
+                <a:ea typeface="+mn-ea"/>
+                <a:cs typeface="+mn-cs"/>
+              </a:rPr>
+              <a:t>	On arrivait bien à suivre le projet car on voyait la progression</a:t>
+            </a:r>
+          </a:p>
+          <a:p>
+            <a:r>
+              <a:rPr lang="fr-CH" sz="1200" kern="1200" baseline="0" dirty="0" smtClean="0">
+                <a:solidFill>
+                  <a:schemeClr val="tx1"/>
+                </a:solidFill>
+                <a:effectLst/>
+                <a:latin typeface="+mn-lt"/>
+                <a:ea typeface="+mn-ea"/>
+                <a:cs typeface="+mn-cs"/>
+              </a:rPr>
+              <a:t>	(avec les problemes et les solutions de chacun)</a:t>
+            </a:r>
+          </a:p>
+          <a:p>
+            <a:r>
+              <a:rPr lang="fr-CH" sz="1200" kern="1200" baseline="0" dirty="0" smtClean="0">
+                <a:solidFill>
+                  <a:schemeClr val="tx1"/>
+                </a:solidFill>
+                <a:effectLst/>
+                <a:latin typeface="+mn-lt"/>
+                <a:ea typeface="+mn-ea"/>
+                <a:cs typeface="+mn-cs"/>
+              </a:rPr>
+              <a:t>		</a:t>
+            </a:r>
+            <a:endParaRPr lang="fr-FR" sz="1200" kern="1200" dirty="0" smtClean="0">
+              <a:solidFill>
+                <a:schemeClr val="tx1"/>
+              </a:solidFill>
+              <a:effectLst/>
+              <a:latin typeface="+mn-lt"/>
+              <a:ea typeface="+mn-ea"/>
+              <a:cs typeface="+mn-cs"/>
+            </a:endParaRPr>
+          </a:p>
+          <a:p>
+            <a:r>
+              <a:rPr lang="fr-FR" sz="1200" kern="1200" dirty="0" smtClean="0">
+                <a:solidFill>
+                  <a:schemeClr val="tx1"/>
+                </a:solidFill>
+                <a:effectLst/>
+                <a:latin typeface="+mn-lt"/>
+                <a:ea typeface="+mn-ea"/>
+                <a:cs typeface="+mn-cs"/>
+              </a:rPr>
+              <a:t>	</a:t>
+            </a:r>
+            <a:endParaRPr lang="fr-FR" dirty="0" smtClean="0"/>
+          </a:p>
+          <a:p>
+            <a:r>
+              <a:rPr lang="fr-FR" dirty="0" smtClean="0"/>
+              <a:t>	</a:t>
+            </a:r>
             <a:endParaRPr lang="fr-FR" dirty="0"/>
           </a:p>
         </p:txBody>
@@ -2117,9 +2441,94 @@
           <a:p>
             <a:r>
               <a:rPr lang="fr-FR" dirty="0" smtClean="0"/>
-              <a:t>Tous</a:t>
-            </a:r>
-            <a:endParaRPr lang="fr-FR" dirty="0"/>
+              <a:t>Romain</a:t>
+            </a:r>
+          </a:p>
+          <a:p>
+            <a:r>
+              <a:rPr lang="fr-FR" dirty="0" smtClean="0"/>
+              <a:t>	Répartition global des t</a:t>
+            </a:r>
+            <a:r>
+              <a:rPr lang="fr-FR" dirty="0" smtClean="0"/>
+              <a:t>âches lors de la première planification</a:t>
+            </a:r>
+          </a:p>
+          <a:p>
+            <a:r>
+              <a:rPr lang="fr-FR" dirty="0" smtClean="0"/>
+              <a:t>	Répartition des sprints </a:t>
+            </a:r>
+            <a:r>
+              <a:rPr lang="fr-FR" dirty="0" err="1" smtClean="0"/>
+              <a:t>backlog</a:t>
+            </a:r>
+            <a:r>
+              <a:rPr lang="fr-FR" baseline="0" dirty="0" smtClean="0"/>
+              <a:t> chaque semaine</a:t>
+            </a:r>
+          </a:p>
+          <a:p>
+            <a:pPr marL="0" marR="0" indent="0" algn="l" defTabSz="457200" rtl="0" eaLnBrk="1" fontAlgn="auto" latinLnBrk="0" hangingPunct="1">
+              <a:lnSpc>
+                <a:spcPct val="100000"/>
+              </a:lnSpc>
+              <a:spcBef>
+                <a:spcPts val="0"/>
+              </a:spcBef>
+              <a:spcAft>
+                <a:spcPts val="0"/>
+              </a:spcAft>
+              <a:buClrTx/>
+              <a:buSzTx/>
+              <a:buFontTx/>
+              <a:buNone/>
+              <a:tabLst/>
+              <a:defRPr/>
+            </a:pPr>
+            <a:r>
+              <a:rPr lang="fr-FR" baseline="0" dirty="0" smtClean="0"/>
+              <a:t>	</a:t>
+            </a:r>
+            <a:r>
+              <a:rPr lang="fr-CH" sz="1200" kern="1200" baseline="0" dirty="0" smtClean="0">
+                <a:solidFill>
+                  <a:schemeClr val="tx1"/>
+                </a:solidFill>
+                <a:effectLst/>
+                <a:latin typeface="+mn-lt"/>
+                <a:ea typeface="+mn-ea"/>
+                <a:cs typeface="+mn-cs"/>
+              </a:rPr>
+              <a:t>Grace à une bonne comunication et un suivit accru du projet par toute l’equipe nous pouvions rapidement adapter la repartition des t</a:t>
+            </a:r>
+            <a:r>
+              <a:rPr lang="fr-CH" sz="1200" kern="1200" baseline="0" dirty="0" smtClean="0">
+                <a:solidFill>
+                  <a:schemeClr val="tx1"/>
+                </a:solidFill>
+                <a:effectLst/>
+                <a:latin typeface="+mn-lt"/>
+                <a:ea typeface="+mn-ea"/>
+                <a:cs typeface="+mn-cs"/>
+              </a:rPr>
+              <a:t>â</a:t>
+            </a:r>
+            <a:r>
+              <a:rPr lang="fr-CH" sz="1200" kern="1200" baseline="0" dirty="0" smtClean="0">
+                <a:solidFill>
+                  <a:schemeClr val="tx1"/>
+                </a:solidFill>
+                <a:effectLst/>
+                <a:latin typeface="+mn-lt"/>
+                <a:ea typeface="+mn-ea"/>
+                <a:cs typeface="+mn-cs"/>
+              </a:rPr>
+              <a:t>ches</a:t>
+            </a:r>
+          </a:p>
+          <a:p>
+            <a:endParaRPr lang="fr-FR" dirty="0" smtClean="0"/>
           </a:p>
         </p:txBody>
       </p:sp>
@@ -2218,11 +2627,7 @@
             </a:r>
             <a:r>
               <a:rPr lang="fr-FR" baseline="0" dirty="0" smtClean="0"/>
-              <a:t> y joue comment </a:t>
-            </a:r>
-            <a:r>
-              <a:rPr lang="fr-FR" baseline="0" dirty="0" smtClean="0"/>
-              <a:t>?</a:t>
+              <a:t> y joue comment ?</a:t>
             </a:r>
           </a:p>
           <a:p>
@@ -2263,11 +2668,7 @@
             </a:pPr>
             <a:r>
               <a:rPr lang="fr-FR" b="0" baseline="0" dirty="0" smtClean="0"/>
-              <a:t>Syst</a:t>
-            </a:r>
-            <a:r>
-              <a:rPr lang="fr-FR" b="0" baseline="0" dirty="0" smtClean="0"/>
-              <a:t>ème de vies</a:t>
+              <a:t>Système de vies</a:t>
             </a:r>
           </a:p>
           <a:p>
@@ -2869,11 +3270,7 @@
           <a:p>
             <a:r>
               <a:rPr lang="fr-FR" b="1" baseline="0" dirty="0" smtClean="0"/>
-              <a:t>Une population automatique c’est </a:t>
-            </a:r>
-            <a:r>
-              <a:rPr lang="fr-FR" b="1" baseline="0" dirty="0" smtClean="0"/>
-              <a:t>cool</a:t>
+              <a:t>Une population automatique c’est cool</a:t>
             </a:r>
           </a:p>
           <a:p>
@@ -2883,11 +3280,7 @@
             </a:pPr>
             <a:r>
               <a:rPr lang="fr-FR" b="0" baseline="0" dirty="0" smtClean="0"/>
-              <a:t>Associé </a:t>
-            </a:r>
-            <a:r>
-              <a:rPr lang="fr-FR" b="0" baseline="0" dirty="0" smtClean="0"/>
-              <a:t>à « </a:t>
+              <a:t>Associé à « </a:t>
             </a:r>
             <a:r>
               <a:rPr lang="fr-FR" b="0" baseline="0" dirty="0" err="1" smtClean="0"/>
@@ -3027,11 +3420,7 @@
             </a:r>
             <a:r>
               <a:rPr lang="fr-FR" b="1" baseline="0" dirty="0" smtClean="0"/>
-              <a:t> anticiper les zones </a:t>
-            </a:r>
-            <a:r>
-              <a:rPr lang="fr-FR" b="1" baseline="0" dirty="0" smtClean="0"/>
-              <a:t>interdites pour interdire le déplacement. Choix possibles :</a:t>
+              <a:t> anticiper les zones interdites pour interdire le déplacement. Choix possibles :</a:t>
             </a:r>
           </a:p>
           <a:p>
@@ -3080,7 +3469,6 @@
               <a:rPr lang="fr-FR" b="1" baseline="0" dirty="0" smtClean="0"/>
               <a:t>Quelles surface en collisions ?</a:t>
             </a:r>
-            <a:endParaRPr lang="fr-FR" b="1" baseline="0" dirty="0" smtClean="0"/>
           </a:p>
           <a:p>
             <a:pPr marL="171450" indent="-171450">
@@ -3089,23 +3477,7 @@
             </a:pPr>
             <a:r>
               <a:rPr lang="fr-FR" baseline="0" dirty="0" smtClean="0"/>
-              <a:t>Type </a:t>
-            </a:r>
-            <a:r>
-              <a:rPr lang="fr-FR" baseline="0" dirty="0" smtClean="0"/>
-              <a:t>ID, </a:t>
-            </a:r>
-            <a:r>
-              <a:rPr lang="fr-FR" baseline="0" dirty="0" smtClean="0"/>
-              <a:t>utilisation de la hiérarchie </a:t>
-            </a:r>
-            <a:r>
-              <a:rPr lang="fr-FR" baseline="0" dirty="0" smtClean="0"/>
-              <a:t>de </a:t>
-            </a:r>
-            <a:r>
-              <a:rPr lang="fr-FR" baseline="0" dirty="0" smtClean="0"/>
-              <a:t>classe</a:t>
+              <a:t>Type ID, utilisation de la hiérarchie de classe</a:t>
             </a:r>
           </a:p>
           <a:p>
@@ -3114,15 +3486,7 @@
           <a:p>
             <a:r>
               <a:rPr lang="fr-FR" b="1" baseline="0" dirty="0" smtClean="0"/>
-              <a:t>Pourquoi </a:t>
-            </a:r>
-            <a:r>
-              <a:rPr lang="fr-FR" b="1" baseline="0" dirty="0" smtClean="0"/>
-              <a:t>30px et pas 32px </a:t>
-            </a:r>
-            <a:r>
-              <a:rPr lang="fr-FR" b="1" baseline="0" dirty="0" smtClean="0"/>
-              <a:t>?</a:t>
+              <a:t>Pourquoi 30px et pas 32px ?</a:t>
             </a:r>
           </a:p>
           <a:p>
@@ -3165,13 +3529,8 @@
             </a:pPr>
             <a:r>
               <a:rPr lang="fr-FR" b="1" baseline="0" dirty="0" smtClean="0"/>
-              <a:t>M</a:t>
-            </a:r>
-            <a:r>
-              <a:rPr lang="fr-FR" b="1" baseline="0" dirty="0" smtClean="0"/>
-              <a:t>ême principe pour les blocs déplaçables</a:t>
-            </a:r>
-            <a:endParaRPr lang="fr-FR" b="1" baseline="0" dirty="0" smtClean="0"/>
+              <a:t>Même principe pour les blocs déplaçables</a:t>
+            </a:r>
           </a:p>
           <a:p>
             <a:endParaRPr lang="fr-FR" dirty="0"/>
@@ -3292,15 +3651,7 @@
             </a:r>
             <a:r>
               <a:rPr lang="fr-FR" baseline="0" dirty="0" smtClean="0"/>
-              <a:t> </a:t>
-            </a:r>
-            <a:r>
-              <a:rPr lang="fr-FR" baseline="0" dirty="0" smtClean="0"/>
-              <a:t>de </a:t>
-            </a:r>
-            <a:r>
-              <a:rPr lang="fr-FR" baseline="0" dirty="0" smtClean="0"/>
-              <a:t>partie</a:t>
+              <a:t> de partie</a:t>
             </a:r>
           </a:p>
           <a:p>
@@ -3404,11 +3755,7 @@
             </a:r>
             <a:r>
               <a:rPr lang="fr-FR" b="1" u="sng" baseline="0" dirty="0" smtClean="0"/>
-              <a:t> </a:t>
-            </a:r>
-            <a:r>
-              <a:rPr lang="fr-FR" b="1" u="sng" baseline="0" dirty="0" smtClean="0"/>
-              <a:t>le </a:t>
+              <a:t> le </a:t>
             </a:r>
             <a:r>
               <a:rPr lang="fr-FR" b="1" u="sng" baseline="0" dirty="0" err="1" smtClean="0"/>
@@ -3416,11 +3763,7 @@
             </a:r>
             <a:r>
               <a:rPr lang="fr-FR" b="1" u="sng" baseline="0" dirty="0" smtClean="0"/>
-              <a:t> avec </a:t>
-            </a:r>
-            <a:r>
-              <a:rPr lang="fr-FR" b="1" u="sng" baseline="0" dirty="0" smtClean="0"/>
-              <a:t>méchants /!\</a:t>
+              <a:t> avec méchants /!\</a:t>
             </a:r>
           </a:p>
           <a:p>
@@ -8104,13 +8447,28 @@
             </a:r>
             <a:r>
               <a:rPr lang="fr-FR" dirty="0" smtClean="0"/>
-              <a:t>, jeux cross-plateforme</a:t>
-            </a:r>
-          </a:p>
-          <a:p>
+              <a:t>, jeux cross-</a:t>
+            </a:r>
             <a:r>
               <a:rPr lang="fr-FR" dirty="0" smtClean="0"/>
-              <a:t>Population automatique</a:t>
+              <a:t>plateforme (Mac et Windows)</a:t>
+            </a:r>
+            <a:endParaRPr lang="fr-FR" dirty="0" smtClean="0"/>
+          </a:p>
+          <a:p>
+            <a:r>
+              <a:rPr lang="fr-FR" dirty="0" smtClean="0"/>
+              <a:t>Population </a:t>
+            </a:r>
+            <a:r>
+              <a:rPr lang="fr-FR" dirty="0" smtClean="0"/>
+              <a:t>automatique</a:t>
+            </a:r>
+          </a:p>
+          <a:p>
+            <a:r>
+              <a:rPr lang="fr-FR" dirty="0" smtClean="0"/>
+              <a:t>Banana Rocket: une équipe soudée</a:t>
             </a:r>
           </a:p>
           <a:p>
@@ -8128,11 +8486,7 @@
           <a:p>
             <a:r>
               <a:rPr lang="fr-FR" dirty="0" smtClean="0"/>
-              <a:t>Optimisation </a:t>
-            </a:r>
-            <a:r>
-              <a:rPr lang="fr-FR" dirty="0" smtClean="0"/>
-              <a:t>fluidité</a:t>
+              <a:t>Optimisation fluidité</a:t>
             </a:r>
           </a:p>
           <a:p>
@@ -8144,7 +8498,6 @@
               <a:rPr lang="fr-FR" dirty="0" smtClean="0"/>
               <a:t>fin</a:t>
             </a:r>
-            <a:endParaRPr lang="fr-FR" dirty="0" smtClean="0"/>
           </a:p>
           <a:p>
             <a:r>
@@ -8155,7 +8508,11 @@
           <a:p>
             <a:r>
               <a:rPr lang="fr-FR" dirty="0" smtClean="0"/>
-              <a:t>Pouvoirs spéciaux</a:t>
+              <a:t>Pouvoirs </a:t>
+            </a:r>
+            <a:r>
+              <a:rPr lang="fr-FR" dirty="0" smtClean="0"/>
+              <a:t>spéciaux</a:t>
             </a:r>
           </a:p>
           <a:p>
@@ -9414,27 +9771,28 @@
           <a:p>
             <a:r>
               <a:rPr lang="fr-FR" dirty="0" smtClean="0"/>
+              <a:t>Méthodologie </a:t>
+            </a:r>
+            <a:r>
+              <a:rPr lang="fr-FR" dirty="0" err="1" smtClean="0"/>
+              <a:t>Scrum</a:t>
+            </a:r>
+            <a:r>
+              <a:rPr lang="fr-FR" dirty="0" smtClean="0"/>
+              <a:t> (agile)</a:t>
+            </a:r>
+          </a:p>
+          <a:p>
+            <a:endParaRPr lang="fr-FR" dirty="0" smtClean="0"/>
+          </a:p>
+          <a:p>
+            <a:r>
+              <a:rPr lang="fr-FR" dirty="0" smtClean="0"/>
               <a:t>Mise </a:t>
             </a:r>
             <a:r>
               <a:rPr lang="fr-FR" dirty="0" smtClean="0"/>
-              <a:t>au </a:t>
-            </a:r>
-            <a:r>
-              <a:rPr lang="fr-FR" dirty="0" smtClean="0"/>
-              <a:t>point de l’avancement </a:t>
-            </a:r>
-            <a:r>
-              <a:rPr lang="fr-FR" dirty="0" smtClean="0"/>
-              <a:t>à</a:t>
-            </a:r>
-            <a:r>
-              <a:rPr lang="fr-FR" dirty="0" smtClean="0"/>
-              <a:t> </a:t>
-            </a:r>
-            <a:r>
-              <a:rPr lang="fr-FR" dirty="0" smtClean="0"/>
-              <a:t>chaque </a:t>
+              <a:t>au point de l’avancement à chaque </a:t>
             </a:r>
             <a:r>
               <a:rPr lang="fr-FR" dirty="0" smtClean="0"/>
@@ -9447,7 +9805,16 @@
           <a:p>
             <a:r>
               <a:rPr lang="fr-FR" dirty="0" smtClean="0"/>
-              <a:t>Majeurs fonctionnalités implémentées</a:t>
+              <a:t>Sprint de 1 semaine</a:t>
+            </a:r>
+          </a:p>
+          <a:p>
+            <a:endParaRPr lang="fr-FR" dirty="0" smtClean="0"/>
+          </a:p>
+          <a:p>
+            <a:r>
+              <a:rPr lang="fr-FR" dirty="0" smtClean="0"/>
+              <a:t>Nouvelles fonctionnalités implémentées par itération</a:t>
             </a:r>
             <a:endParaRPr lang="fr-FR" dirty="0"/>
           </a:p>
@@ -9620,19 +9987,7 @@
           <a:p>
             <a:r>
               <a:rPr lang="fr-FR" dirty="0" smtClean="0"/>
-              <a:t>Répartition initiale des t</a:t>
-            </a:r>
-            <a:r>
-              <a:rPr lang="fr-FR" dirty="0" smtClean="0"/>
-              <a:t>âches</a:t>
-            </a:r>
-            <a:r>
-              <a:rPr lang="fr-FR" dirty="0" smtClean="0"/>
-              <a:t> </a:t>
-            </a:r>
-            <a:r>
-              <a:rPr lang="fr-FR" dirty="0" smtClean="0"/>
-              <a:t>par </a:t>
+              <a:t>Répartition initiale des tâches par </a:t>
             </a:r>
             <a:r>
               <a:rPr lang="fr-FR" dirty="0" smtClean="0"/>
@@ -9640,15 +9995,31 @@
             </a:r>
           </a:p>
           <a:p>
+            <a:endParaRPr lang="fr-FR" dirty="0" smtClean="0"/>
+          </a:p>
+          <a:p>
             <a:r>
               <a:rPr lang="fr-FR" dirty="0" smtClean="0"/>
-              <a:t>Adaptation de la répartition des t</a:t>
+              <a:t>Répartition à chaque sprint des t</a:t>
             </a:r>
             <a:r>
               <a:rPr lang="fr-FR" dirty="0" smtClean="0"/>
-              <a:t>âches en fonction de l’avancement de chacun</a:t>
+              <a:t>âches pour le nouveau Sprint </a:t>
+            </a:r>
+            <a:r>
+              <a:rPr lang="fr-FR" dirty="0" err="1" smtClean="0"/>
+              <a:t>Backlog</a:t>
             </a:r>
             <a:endParaRPr lang="fr-FR" dirty="0" smtClean="0"/>
+          </a:p>
+          <a:p>
+            <a:endParaRPr lang="fr-FR" dirty="0" smtClean="0"/>
+          </a:p>
+          <a:p>
+            <a:r>
+              <a:rPr lang="fr-FR" dirty="0" smtClean="0"/>
+              <a:t>Adaptation de la répartition des tâches en fonction de l’avancement de chacun</a:t>
+            </a:r>
           </a:p>
           <a:p>
             <a:endParaRPr lang="fr-FR" dirty="0"/>
@@ -10228,11 +10599,7 @@
           <a:p>
             <a:r>
               <a:rPr lang="fr-FR" dirty="0" smtClean="0"/>
-              <a:t>Population </a:t>
-            </a:r>
-            <a:r>
-              <a:rPr lang="fr-FR" dirty="0" smtClean="0"/>
-              <a:t>automatisée</a:t>
+              <a:t>Population automatisée</a:t>
             </a:r>
             <a:endParaRPr lang="fr-FR" dirty="0"/>
           </a:p>
@@ -10584,15 +10951,7 @@
           <a:p>
             <a:r>
               <a:rPr lang="fr-FR" dirty="0" smtClean="0"/>
-              <a:t>Détection des collisions </a:t>
-            </a:r>
-            <a:r>
-              <a:rPr lang="fr-FR" dirty="0" smtClean="0"/>
-              <a:t>dans chaque direction </a:t>
-            </a:r>
-            <a:r>
-              <a:rPr lang="fr-FR" dirty="0" smtClean="0"/>
-              <a:t>et sur place</a:t>
+              <a:t>Détection des collisions dans chaque direction et sur place</a:t>
             </a:r>
           </a:p>
           <a:p>

</xml_diff>

<commit_message>
Modifications dans la présentation
</commit_message>
<xml_diff>
--- a/Administration/JamesGouinSePresente.pptx
+++ b/Administration/JamesGouinSePresente.pptx
@@ -123,6 +123,22 @@
       </a:defRPr>
     </a:lvl9pPr>
   </p:defaultTextStyle>
+  <p:extLst>
+    <p:ext uri="{EFAFB233-063F-42B5-8137-9DF3F51BA10A}">
+      <p15:sldGuideLst xmlns:p15="http://schemas.microsoft.com/office/powerpoint/2012/main">
+        <p15:guide id="1" orient="horz" pos="2160">
+          <p15:clr>
+            <a:srgbClr val="A4A3A4"/>
+          </p15:clr>
+        </p15:guide>
+        <p15:guide id="2" pos="2880">
+          <p15:clr>
+            <a:srgbClr val="A4A3A4"/>
+          </p15:clr>
+        </p15:guide>
+      </p15:sldGuideLst>
+    </p:ext>
+  </p:extLst>
 </p:presentation>
 </file>
 
@@ -208,7 +224,7 @@
           <a:p>
             <a:fld id="{64D0C252-870E-0640-B649-5DBEF39458AD}" type="datetimeFigureOut">
               <a:rPr lang="fr-FR" smtClean="0"/>
-              <a:t>26.01.15</a:t>
+              <a:t>27/01/2015</a:t>
             </a:fld>
             <a:endParaRPr lang="fr-FR"/>
           </a:p>
@@ -274,7 +290,7 @@
           <a:p>
             <a:fld id="{DD99509E-6BDC-B342-9D56-6CF33E61AF5F}" type="slidenum">
               <a:rPr lang="fr-FR" smtClean="0"/>
-              <a:t>‹#›</a:t>
+              <a:t>‹N°›</a:t>
             </a:fld>
             <a:endParaRPr lang="fr-FR"/>
           </a:p>
@@ -374,7 +390,7 @@
           <a:p>
             <a:fld id="{2511AB13-6564-5B49-9CE9-2B8226196AD7}" type="datetimeFigureOut">
               <a:rPr lang="fr-FR" smtClean="0"/>
-              <a:t>26.01.15</a:t>
+              <a:t>27/01/2015</a:t>
             </a:fld>
             <a:endParaRPr lang="fr-FR"/>
           </a:p>
@@ -533,7 +549,7 @@
           <a:p>
             <a:fld id="{953D97BD-1AB9-714E-AA5A-8BE4BC9E0007}" type="slidenum">
               <a:rPr lang="fr-FR" smtClean="0"/>
-              <a:t>‹#›</a:t>
+              <a:t>‹N°›</a:t>
             </a:fld>
             <a:endParaRPr lang="fr-FR"/>
           </a:p>
@@ -1468,12 +1484,16 @@
               <a:buChar char="•"/>
             </a:pPr>
             <a:r>
-              <a:rPr lang="fr-FR" b="0" dirty="0" err="1" smtClean="0"/>
-              <a:t>Obstruation</a:t>
+              <a:rPr lang="fr-FR" b="0" dirty="0" smtClean="0"/>
+              <a:t>Obstruction</a:t>
             </a:r>
             <a:r>
               <a:rPr lang="fr-FR" b="0" baseline="0" dirty="0" smtClean="0"/>
-              <a:t> du champ de vue</a:t>
+              <a:t> </a:t>
+            </a:r>
+            <a:r>
+              <a:rPr lang="fr-FR" b="0" baseline="0" dirty="0" smtClean="0"/>
+              <a:t>du champ de vue</a:t>
             </a:r>
           </a:p>
           <a:p>
@@ -2447,11 +2467,7 @@
           <a:p>
             <a:r>
               <a:rPr lang="fr-FR" dirty="0" smtClean="0"/>
-              <a:t>	Répartition global des t</a:t>
-            </a:r>
-            <a:r>
-              <a:rPr lang="fr-FR" dirty="0" smtClean="0"/>
-              <a:t>âches lors de la première planification</a:t>
+              <a:t>	Répartition global des tâches lors de la première planification</a:t>
             </a:r>
           </a:p>
           <a:p>
@@ -2500,31 +2516,7 @@
                 <a:ea typeface="+mn-ea"/>
                 <a:cs typeface="+mn-cs"/>
               </a:rPr>
-              <a:t>Grace à une bonne comunication et un suivit accru du projet par toute l’equipe nous pouvions rapidement adapter la repartition des t</a:t>
-            </a:r>
-            <a:r>
-              <a:rPr lang="fr-CH" sz="1200" kern="1200" baseline="0" dirty="0" smtClean="0">
-                <a:solidFill>
-                  <a:schemeClr val="tx1"/>
-                </a:solidFill>
-                <a:effectLst/>
-                <a:latin typeface="+mn-lt"/>
-                <a:ea typeface="+mn-ea"/>
-                <a:cs typeface="+mn-cs"/>
-              </a:rPr>
-              <a:t>â</a:t>
-            </a:r>
-            <a:r>
-              <a:rPr lang="fr-CH" sz="1200" kern="1200" baseline="0" dirty="0" smtClean="0">
-                <a:solidFill>
-                  <a:schemeClr val="tx1"/>
-                </a:solidFill>
-                <a:effectLst/>
-                <a:latin typeface="+mn-lt"/>
-                <a:ea typeface="+mn-ea"/>
-                <a:cs typeface="+mn-cs"/>
-              </a:rPr>
-              <a:t>ches</a:t>
+              <a:t>Grace à une bonne comunication et un suivit accru du projet par toute l’equipe nous pouvions rapidement adapter la repartition des tâches</a:t>
             </a:r>
           </a:p>
           <a:p>
@@ -2740,7 +2732,15 @@
             </a:pPr>
             <a:r>
               <a:rPr lang="fr-FR" b="0" baseline="0" dirty="0" smtClean="0"/>
-              <a:t>Utilisation d’une « Trousse d’objets »</a:t>
+              <a:t>Utilisation d’une « </a:t>
+            </a:r>
+            <a:r>
+              <a:rPr lang="fr-FR" b="0" baseline="0" dirty="0" smtClean="0"/>
+              <a:t>Sacoche d’objets</a:t>
+            </a:r>
+            <a:r>
+              <a:rPr lang="fr-FR" b="0" baseline="0" dirty="0" smtClean="0"/>
+              <a:t> »</a:t>
             </a:r>
           </a:p>
           <a:p>
@@ -2894,8 +2894,13 @@
             </a:pPr>
             <a:r>
               <a:rPr lang="fr-FR" b="1" baseline="0" dirty="0" smtClean="0"/>
-              <a:t>Le pingouin, il peut</a:t>
-            </a:r>
+              <a:t>Le </a:t>
+            </a:r>
+            <a:r>
+              <a:rPr lang="fr-FR" b="1" baseline="0" dirty="0" smtClean="0"/>
+              <a:t>pingouin peut</a:t>
+            </a:r>
+            <a:endParaRPr lang="fr-FR" b="1" baseline="0" dirty="0" smtClean="0"/>
           </a:p>
           <a:p>
             <a:pPr marL="171450" marR="0" indent="-171450" algn="l" defTabSz="457200" rtl="0" eaLnBrk="1" fontAlgn="auto" latinLnBrk="0" hangingPunct="1">
@@ -2943,8 +2948,12 @@
               <a:defRPr/>
             </a:pPr>
             <a:r>
+              <a:rPr lang="fr-FR" b="1" baseline="0" dirty="0" smtClean="0"/>
+              <a:t>Glisser</a:t>
+            </a:r>
+            <a:r>
               <a:rPr lang="fr-FR" baseline="0" dirty="0" smtClean="0"/>
-              <a:t>Glisser sur de la glace</a:t>
+              <a:t> sur de la glace</a:t>
             </a:r>
           </a:p>
           <a:p>
@@ -2975,8 +2984,21 @@
             </a:r>
             <a:r>
               <a:rPr lang="fr-FR" baseline="0" dirty="0" smtClean="0"/>
-              <a:t> pour tous</a:t>
-            </a:r>
+              <a:t> pour </a:t>
+            </a:r>
+            <a:r>
+              <a:rPr lang="fr-FR" baseline="0" dirty="0" smtClean="0"/>
+              <a:t>tous (Slot qui déplace le pingouin à chaque fin du </a:t>
+            </a:r>
+            <a:r>
+              <a:rPr lang="fr-FR" baseline="0" dirty="0" err="1" smtClean="0"/>
+              <a:t>timer</a:t>
+            </a:r>
+            <a:r>
+              <a:rPr lang="fr-FR" baseline="0" dirty="0" smtClean="0"/>
+              <a:t>)</a:t>
+            </a:r>
+            <a:endParaRPr lang="fr-FR" baseline="0" dirty="0" smtClean="0"/>
           </a:p>
           <a:p>
             <a:pPr marL="171450" marR="0" indent="-171450" algn="l" defTabSz="457200" rtl="0" eaLnBrk="1" fontAlgn="auto" latinLnBrk="0" hangingPunct="1">
@@ -2997,8 +3019,12 @@
               <a:defRPr/>
             </a:pPr>
             <a:r>
+              <a:rPr lang="fr-FR" b="1" baseline="0" dirty="0" smtClean="0"/>
+              <a:t>Couler</a:t>
+            </a:r>
+            <a:r>
               <a:rPr lang="fr-FR" baseline="0" dirty="0" smtClean="0"/>
-              <a:t>Couler dans l’eau</a:t>
+              <a:t> dans l’eau</a:t>
             </a:r>
           </a:p>
           <a:p>
@@ -3067,13 +3093,10 @@
               <a:t>Le bloc </a:t>
             </a:r>
             <a:r>
-              <a:rPr lang="fr-FR" b="1" baseline="0" dirty="0" err="1" smtClean="0"/>
-              <a:t>déplacable</a:t>
-            </a:r>
-            <a:r>
               <a:rPr lang="fr-FR" b="1" baseline="0" dirty="0" smtClean="0"/>
-              <a:t> il peut</a:t>
-            </a:r>
+              <a:t>déplaçable peut</a:t>
+            </a:r>
+            <a:endParaRPr lang="fr-FR" b="1" baseline="0" dirty="0" smtClean="0"/>
           </a:p>
           <a:p>
             <a:pPr marL="171450" marR="0" indent="-171450" algn="l" defTabSz="457200" rtl="0" eaLnBrk="1" fontAlgn="auto" latinLnBrk="0" hangingPunct="1">
@@ -4002,7 +4025,7 @@
           <a:p>
             <a:fld id="{8999B29F-751F-5744-80E1-600E8AC85EFD}" type="datetime1">
               <a:rPr lang="fr-CH" smtClean="0"/>
-              <a:t>26.01.15</a:t>
+              <a:t>27.01.2015</a:t>
             </a:fld>
             <a:endParaRPr lang="en-US"/>
           </a:p>
@@ -4026,7 +4049,7 @@
             <a:fld id="{687D7A59-36E2-48B9-B146-C1E59501F63F}" type="slidenum">
               <a:rPr lang="en-US" smtClean="0"/>
               <a:pPr/>
-              <a:t>‹#›</a:t>
+              <a:t>‹N°›</a:t>
             </a:fld>
             <a:endParaRPr lang="en-US"/>
           </a:p>
@@ -4056,7 +4079,7 @@
   <p:clrMapOvr>
     <a:masterClrMapping/>
   </p:clrMapOvr>
-  <p:transition xmlns:p14="http://schemas.microsoft.com/office/powerpoint/2010/main" spd="slow">
+  <p:transition spd="slow">
     <p:push/>
   </p:transition>
 </p:sldLayout>
@@ -4171,7 +4194,7 @@
           <a:p>
             <a:fld id="{AA19D44E-0FE8-C446-8611-5CEE6CB3864C}" type="datetime1">
               <a:rPr lang="fr-CH" smtClean="0"/>
-              <a:t>26.01.15</a:t>
+              <a:t>27.01.2015</a:t>
             </a:fld>
             <a:endParaRPr lang="en-US"/>
           </a:p>
@@ -4214,7 +4237,7 @@
             <a:fld id="{687D7A59-36E2-48B9-B146-C1E59501F63F}" type="slidenum">
               <a:rPr lang="en-US" smtClean="0"/>
               <a:pPr/>
-              <a:t>‹#›</a:t>
+              <a:t>‹N°›</a:t>
             </a:fld>
             <a:endParaRPr lang="en-US"/>
           </a:p>
@@ -4225,7 +4248,7 @@
   <p:clrMapOvr>
     <a:masterClrMapping/>
   </p:clrMapOvr>
-  <p:transition xmlns:p14="http://schemas.microsoft.com/office/powerpoint/2010/main" spd="slow">
+  <p:transition spd="slow">
     <p:push/>
   </p:transition>
 </p:sldLayout>
@@ -4350,7 +4373,7 @@
           <a:p>
             <a:fld id="{80BEAAA7-9C62-C645-9E7C-EAA05320C320}" type="datetime1">
               <a:rPr lang="fr-CH" smtClean="0"/>
-              <a:t>26.01.15</a:t>
+              <a:t>27.01.2015</a:t>
             </a:fld>
             <a:endParaRPr lang="en-US"/>
           </a:p>
@@ -4393,7 +4416,7 @@
             <a:fld id="{687D7A59-36E2-48B9-B146-C1E59501F63F}" type="slidenum">
               <a:rPr lang="en-US" smtClean="0"/>
               <a:pPr/>
-              <a:t>‹#›</a:t>
+              <a:t>‹N°›</a:t>
             </a:fld>
             <a:endParaRPr lang="en-US"/>
           </a:p>
@@ -4404,7 +4427,7 @@
   <p:clrMapOvr>
     <a:masterClrMapping/>
   </p:clrMapOvr>
-  <p:transition xmlns:p14="http://schemas.microsoft.com/office/powerpoint/2010/main" spd="slow">
+  <p:transition spd="slow">
     <p:push/>
   </p:transition>
 </p:sldLayout>
@@ -4537,7 +4560,7 @@
           <a:p>
             <a:fld id="{08EFB404-E2A9-5F44-BFF3-54F39A88F3D4}" type="datetime1">
               <a:rPr lang="fr-CH" smtClean="0"/>
-              <a:t>26.01.15</a:t>
+              <a:t>27.01.2015</a:t>
             </a:fld>
             <a:endParaRPr lang="en-US"/>
           </a:p>
@@ -4580,7 +4603,7 @@
             <a:fld id="{687D7A59-36E2-48B9-B146-C1E59501F63F}" type="slidenum">
               <a:rPr lang="en-US" smtClean="0"/>
               <a:pPr/>
-              <a:t>‹#›</a:t>
+              <a:t>‹N°›</a:t>
             </a:fld>
             <a:endParaRPr lang="en-US"/>
           </a:p>
@@ -4591,7 +4614,7 @@
   <p:clrMapOvr>
     <a:masterClrMapping/>
   </p:clrMapOvr>
-  <p:transition xmlns:p14="http://schemas.microsoft.com/office/powerpoint/2010/main" spd="slow">
+  <p:transition spd="slow">
     <p:push/>
   </p:transition>
 </p:sldLayout>
@@ -4803,7 +4826,7 @@
           <a:p>
             <a:fld id="{AF1D1857-115B-B442-B1E5-180228E51561}" type="datetime1">
               <a:rPr lang="fr-CH" smtClean="0"/>
-              <a:t>26.01.15</a:t>
+              <a:t>27.01.2015</a:t>
             </a:fld>
             <a:endParaRPr lang="en-US"/>
           </a:p>
@@ -4846,7 +4869,7 @@
             <a:fld id="{687D7A59-36E2-48B9-B146-C1E59501F63F}" type="slidenum">
               <a:rPr lang="en-US" smtClean="0"/>
               <a:pPr/>
-              <a:t>‹#›</a:t>
+              <a:t>‹N°›</a:t>
             </a:fld>
             <a:endParaRPr lang="en-US"/>
           </a:p>
@@ -5007,7 +5030,7 @@
   <p:clrMapOvr>
     <a:masterClrMapping/>
   </p:clrMapOvr>
-  <p:transition xmlns:p14="http://schemas.microsoft.com/office/powerpoint/2010/main" spd="slow">
+  <p:transition spd="slow">
     <p:push/>
   </p:transition>
 </p:sldLayout>
@@ -5155,7 +5178,7 @@
           <a:p>
             <a:fld id="{412BE0F2-A6D5-5740-9873-A96C8BB8BA9B}" type="datetime1">
               <a:rPr lang="fr-CH" smtClean="0"/>
-              <a:t>26.01.15</a:t>
+              <a:t>27.01.2015</a:t>
             </a:fld>
             <a:endParaRPr lang="en-US"/>
           </a:p>
@@ -5198,7 +5221,7 @@
             <a:fld id="{687D7A59-36E2-48B9-B146-C1E59501F63F}" type="slidenum">
               <a:rPr lang="en-US" smtClean="0"/>
               <a:pPr/>
-              <a:t>‹#›</a:t>
+              <a:t>‹N°›</a:t>
             </a:fld>
             <a:endParaRPr lang="en-US"/>
           </a:p>
@@ -5266,7 +5289,7 @@
   <p:clrMapOvr>
     <a:masterClrMapping/>
   </p:clrMapOvr>
-  <p:transition xmlns:p14="http://schemas.microsoft.com/office/powerpoint/2010/main" spd="slow">
+  <p:transition spd="slow">
     <p:push/>
   </p:transition>
 </p:sldLayout>
@@ -5467,7 +5490,7 @@
           <a:p>
             <a:fld id="{8213B743-169F-5645-AB8C-8899780DDA5A}" type="datetime1">
               <a:rPr lang="fr-CH" smtClean="0"/>
-              <a:t>26.01.15</a:t>
+              <a:t>27.01.2015</a:t>
             </a:fld>
             <a:endParaRPr lang="en-US"/>
           </a:p>
@@ -5510,7 +5533,7 @@
             <a:fld id="{687D7A59-36E2-48B9-B146-C1E59501F63F}" type="slidenum">
               <a:rPr lang="en-US" smtClean="0"/>
               <a:pPr/>
-              <a:t>‹#›</a:t>
+              <a:t>‹N°›</a:t>
             </a:fld>
             <a:endParaRPr lang="en-US"/>
           </a:p>
@@ -5635,7 +5658,7 @@
   <p:clrMapOvr>
     <a:masterClrMapping/>
   </p:clrMapOvr>
-  <p:transition xmlns:p14="http://schemas.microsoft.com/office/powerpoint/2010/main" spd="slow">
+  <p:transition spd="slow">
     <p:push/>
   </p:transition>
 </p:sldLayout>
@@ -5698,7 +5721,7 @@
           <a:p>
             <a:fld id="{E56CAA3E-DE66-BE4C-86BB-836CC203C1C4}" type="datetime1">
               <a:rPr lang="fr-CH" smtClean="0"/>
-              <a:t>26.01.15</a:t>
+              <a:t>27.01.2015</a:t>
             </a:fld>
             <a:endParaRPr lang="en-US"/>
           </a:p>
@@ -5741,7 +5764,7 @@
             <a:fld id="{687D7A59-36E2-48B9-B146-C1E59501F63F}" type="slidenum">
               <a:rPr lang="en-US" smtClean="0"/>
               <a:pPr/>
-              <a:t>‹#›</a:t>
+              <a:t>‹N°›</a:t>
             </a:fld>
             <a:endParaRPr lang="en-US"/>
           </a:p>
@@ -5752,7 +5775,7 @@
   <p:clrMapOvr>
     <a:masterClrMapping/>
   </p:clrMapOvr>
-  <p:transition xmlns:p14="http://schemas.microsoft.com/office/powerpoint/2010/main" spd="slow">
+  <p:transition spd="slow">
     <p:push/>
   </p:transition>
 </p:sldLayout>
@@ -5792,7 +5815,7 @@
           <a:p>
             <a:fld id="{F9C2E405-4970-F748-8838-75D6937AFE4A}" type="datetime1">
               <a:rPr lang="fr-CH" smtClean="0"/>
-              <a:t>26.01.15</a:t>
+              <a:t>27.01.2015</a:t>
             </a:fld>
             <a:endParaRPr lang="en-US"/>
           </a:p>
@@ -5835,7 +5858,7 @@
             <a:fld id="{687D7A59-36E2-48B9-B146-C1E59501F63F}" type="slidenum">
               <a:rPr lang="en-US" smtClean="0"/>
               <a:pPr/>
-              <a:t>‹#›</a:t>
+              <a:t>‹N°›</a:t>
             </a:fld>
             <a:endParaRPr lang="en-US"/>
           </a:p>
@@ -5846,7 +5869,7 @@
   <p:clrMapOvr>
     <a:masterClrMapping/>
   </p:clrMapOvr>
-  <p:transition xmlns:p14="http://schemas.microsoft.com/office/powerpoint/2010/main" spd="slow">
+  <p:transition spd="slow">
     <p:push/>
   </p:transition>
 </p:sldLayout>
@@ -6084,7 +6107,7 @@
           <a:p>
             <a:fld id="{C796D4D8-C33D-D547-8ECD-671A356435E7}" type="datetime1">
               <a:rPr lang="fr-CH" smtClean="0"/>
-              <a:t>26.01.15</a:t>
+              <a:t>27.01.2015</a:t>
             </a:fld>
             <a:endParaRPr lang="en-US"/>
           </a:p>
@@ -6127,7 +6150,7 @@
             <a:fld id="{687D7A59-36E2-48B9-B146-C1E59501F63F}" type="slidenum">
               <a:rPr lang="en-US" smtClean="0"/>
               <a:pPr/>
-              <a:t>‹#›</a:t>
+              <a:t>‹N°›</a:t>
             </a:fld>
             <a:endParaRPr lang="en-US"/>
           </a:p>
@@ -6138,7 +6161,7 @@
   <p:clrMapOvr>
     <a:masterClrMapping/>
   </p:clrMapOvr>
-  <p:transition xmlns:p14="http://schemas.microsoft.com/office/powerpoint/2010/main" spd="slow">
+  <p:transition spd="slow">
     <p:push/>
   </p:transition>
 </p:sldLayout>
@@ -6357,7 +6380,7 @@
           <a:p>
             <a:fld id="{D81A6492-30A7-F940-B414-588B0E51CD1D}" type="datetime1">
               <a:rPr lang="fr-CH" smtClean="0"/>
-              <a:t>26.01.15</a:t>
+              <a:t>27.01.2015</a:t>
             </a:fld>
             <a:endParaRPr lang="en-US"/>
           </a:p>
@@ -6400,7 +6423,7 @@
             <a:fld id="{687D7A59-36E2-48B9-B146-C1E59501F63F}" type="slidenum">
               <a:rPr lang="en-US" smtClean="0"/>
               <a:pPr/>
-              <a:t>‹#›</a:t>
+              <a:t>‹N°›</a:t>
             </a:fld>
             <a:endParaRPr lang="en-US"/>
           </a:p>
@@ -6411,7 +6434,7 @@
   <p:clrMapOvr>
     <a:masterClrMapping/>
   </p:clrMapOvr>
-  <p:transition xmlns:p14="http://schemas.microsoft.com/office/powerpoint/2010/main" spd="slow">
+  <p:transition spd="slow">
     <p:push/>
   </p:transition>
 </p:sldLayout>
@@ -6583,7 +6606,7 @@
           <a:p>
             <a:fld id="{6CF81F46-A522-9B4E-90AB-C50863641B6B}" type="datetime1">
               <a:rPr lang="fr-CH" smtClean="0"/>
-              <a:t>26.01.15</a:t>
+              <a:t>27.01.2015</a:t>
             </a:fld>
             <a:endParaRPr lang="en-US"/>
           </a:p>
@@ -6666,7 +6689,7 @@
             <a:fld id="{687D7A59-36E2-48B9-B146-C1E59501F63F}" type="slidenum">
               <a:rPr lang="en-US" smtClean="0"/>
               <a:pPr/>
-              <a:t>‹#›</a:t>
+              <a:t>‹N°›</a:t>
             </a:fld>
             <a:endParaRPr lang="en-US"/>
           </a:p>
@@ -6795,7 +6818,7 @@
     <p:sldLayoutId id="2147483873" r:id="rId10"/>
     <p:sldLayoutId id="2147483874" r:id="rId11"/>
   </p:sldLayoutIdLst>
-  <p:transition xmlns:p14="http://schemas.microsoft.com/office/powerpoint/2010/main" spd="slow">
+  <p:transition spd="slow">
     <p:push/>
   </p:transition>
   <p:hf hdr="0" ftr="0" dt="0"/>
@@ -7257,13 +7280,13 @@
   <p:clrMapOvr>
     <a:masterClrMapping/>
   </p:clrMapOvr>
-  <p:transition xmlns:p14="http://schemas.microsoft.com/office/powerpoint/2010/main" spd="slow">
+  <p:transition spd="slow">
     <p:push/>
   </p:transition>
   <p:timing>
     <p:tnLst>
       <p:par>
-        <p:cTn xmlns:p14="http://schemas.microsoft.com/office/powerpoint/2010/main" id="1" dur="indefinite" restart="never" nodeType="tmRoot"/>
+        <p:cTn id="1" dur="indefinite" restart="never" nodeType="tmRoot"/>
       </p:par>
     </p:tnLst>
   </p:timing>
@@ -7331,7 +7354,7 @@
           <p:nvPr/>
         </p:nvPicPr>
         <p:blipFill rotWithShape="1">
-          <a:blip r:embed="rId3">
+          <a:blip r:embed="rId3" cstate="email">
             <a:extLst>
               <a:ext uri="{28A0092B-C50C-407E-A947-70E740481C1C}">
                 <a14:useLocalDpi xmlns:a14="http://schemas.microsoft.com/office/drawing/2010/main" val="0"/>
@@ -7360,7 +7383,7 @@
           <p:nvPr/>
         </p:nvPicPr>
         <p:blipFill rotWithShape="1">
-          <a:blip r:embed="rId4">
+          <a:blip r:embed="rId4" cstate="email">
             <a:extLst>
               <a:ext uri="{28A0092B-C50C-407E-A947-70E740481C1C}">
                 <a14:useLocalDpi xmlns:a14="http://schemas.microsoft.com/office/drawing/2010/main" val="0"/>
@@ -7389,7 +7412,7 @@
           <p:nvPr/>
         </p:nvPicPr>
         <p:blipFill rotWithShape="1">
-          <a:blip r:embed="rId4">
+          <a:blip r:embed="rId4" cstate="email">
             <a:extLst>
               <a:ext uri="{28A0092B-C50C-407E-A947-70E740481C1C}">
                 <a14:useLocalDpi xmlns:a14="http://schemas.microsoft.com/office/drawing/2010/main" val="0"/>
@@ -7546,8 +7569,12 @@
           <a:lstStyle/>
           <a:p>
             <a:r>
+              <a:rPr lang="fr-FR" smtClean="0"/>
+              <a:t>Champs </a:t>
+            </a:r>
+            <a:r>
               <a:rPr lang="fr-FR" dirty="0" smtClean="0"/>
-              <a:t>Champs de vision</a:t>
+              <a:t>de vision</a:t>
             </a:r>
             <a:endParaRPr lang="fr-FR" dirty="0"/>
           </a:p>
@@ -7601,13 +7628,13 @@
   <p:clrMapOvr>
     <a:masterClrMapping/>
   </p:clrMapOvr>
-  <p:transition xmlns:p14="http://schemas.microsoft.com/office/powerpoint/2010/main" spd="slow">
+  <p:transition spd="slow">
     <p:push/>
   </p:transition>
   <p:timing>
     <p:tnLst>
       <p:par>
-        <p:cTn xmlns:p14="http://schemas.microsoft.com/office/powerpoint/2010/main" id="1" dur="indefinite" restart="never" nodeType="tmRoot">
+        <p:cTn id="1" dur="indefinite" restart="never" nodeType="tmRoot">
           <p:childTnLst>
             <p:seq concurrent="1" nextAc="seek">
               <p:cTn id="2" dur="indefinite" nodeType="mainSeq">
@@ -7998,13 +8025,13 @@
   <p:clrMapOvr>
     <a:masterClrMapping/>
   </p:clrMapOvr>
-  <p:transition xmlns:p14="http://schemas.microsoft.com/office/powerpoint/2010/main" spd="slow">
+  <p:transition spd="slow">
     <p:push/>
   </p:transition>
   <p:timing>
     <p:tnLst>
       <p:par>
-        <p:cTn xmlns:p14="http://schemas.microsoft.com/office/powerpoint/2010/main" id="1" dur="indefinite" restart="never" nodeType="tmRoot"/>
+        <p:cTn id="1" dur="indefinite" restart="never" nodeType="tmRoot"/>
       </p:par>
     </p:tnLst>
   </p:timing>
@@ -8301,7 +8328,7 @@
           <p:nvPr/>
         </p:nvPicPr>
         <p:blipFill>
-          <a:blip r:embed="rId4" cstate="print">
+          <a:blip r:embed="rId4" cstate="email">
             <a:extLst>
               <a:ext uri="{28A0092B-C50C-407E-A947-70E740481C1C}">
                 <a14:useLocalDpi xmlns:a14="http://schemas.microsoft.com/office/drawing/2010/main" val="0"/>
@@ -8356,13 +8383,13 @@
   <p:clrMapOvr>
     <a:masterClrMapping/>
   </p:clrMapOvr>
-  <p:transition xmlns:p14="http://schemas.microsoft.com/office/powerpoint/2010/main" spd="slow">
+  <p:transition spd="slow">
     <p:push/>
   </p:transition>
   <p:timing>
     <p:tnLst>
       <p:par>
-        <p:cTn xmlns:p14="http://schemas.microsoft.com/office/powerpoint/2010/main" id="1" dur="indefinite" restart="never" nodeType="tmRoot"/>
+        <p:cTn id="1" dur="indefinite" restart="never" nodeType="tmRoot"/>
       </p:par>
     </p:tnLst>
   </p:timing>
@@ -8447,22 +8474,13 @@
             </a:r>
             <a:r>
               <a:rPr lang="fr-FR" dirty="0" smtClean="0"/>
-              <a:t>, jeux cross-</a:t>
-            </a:r>
+              <a:t>, jeux cross-plateforme (Mac et Windows)</a:t>
+            </a:r>
+          </a:p>
+          <a:p>
             <a:r>
               <a:rPr lang="fr-FR" dirty="0" smtClean="0"/>
-              <a:t>plateforme (Mac et Windows)</a:t>
-            </a:r>
-            <a:endParaRPr lang="fr-FR" dirty="0" smtClean="0"/>
-          </a:p>
-          <a:p>
-            <a:r>
-              <a:rPr lang="fr-FR" dirty="0" smtClean="0"/>
-              <a:t>Population </a:t>
-            </a:r>
-            <a:r>
-              <a:rPr lang="fr-FR" dirty="0" smtClean="0"/>
-              <a:t>automatique</a:t>
+              <a:t>Population automatique</a:t>
             </a:r>
           </a:p>
           <a:p>
@@ -8508,11 +8526,7 @@
           <a:p>
             <a:r>
               <a:rPr lang="fr-FR" dirty="0" smtClean="0"/>
-              <a:t>Pouvoirs </a:t>
-            </a:r>
-            <a:r>
-              <a:rPr lang="fr-FR" dirty="0" smtClean="0"/>
-              <a:t>spéciaux</a:t>
+              <a:t>Pouvoirs spéciaux</a:t>
             </a:r>
           </a:p>
           <a:p>
@@ -8615,13 +8629,13 @@
   <p:clrMapOvr>
     <a:masterClrMapping/>
   </p:clrMapOvr>
-  <p:transition xmlns:p14="http://schemas.microsoft.com/office/powerpoint/2010/main" spd="slow">
+  <p:transition spd="slow">
     <p:push/>
   </p:transition>
   <p:timing>
     <p:tnLst>
       <p:par>
-        <p:cTn xmlns:p14="http://schemas.microsoft.com/office/powerpoint/2010/main" id="1" dur="indefinite" restart="never" nodeType="tmRoot"/>
+        <p:cTn id="1" dur="indefinite" restart="never" nodeType="tmRoot"/>
       </p:par>
     </p:tnLst>
   </p:timing>
@@ -9020,13 +9034,13 @@
   <p:clrMapOvr>
     <a:masterClrMapping/>
   </p:clrMapOvr>
-  <p:transition xmlns:p14="http://schemas.microsoft.com/office/powerpoint/2010/main" spd="slow">
+  <p:transition spd="slow">
     <p:push/>
   </p:transition>
   <p:timing>
     <p:tnLst>
       <p:par>
-        <p:cTn xmlns:p14="http://schemas.microsoft.com/office/powerpoint/2010/main" id="1" dur="indefinite" restart="never" nodeType="tmRoot"/>
+        <p:cTn id="1" dur="indefinite" restart="never" nodeType="tmRoot"/>
       </p:par>
     </p:tnLst>
   </p:timing>
@@ -9059,7 +9073,7 @@
           <p:nvPr/>
         </p:nvPicPr>
         <p:blipFill>
-          <a:blip r:embed="rId3" cstate="print">
+          <a:blip r:embed="rId3" cstate="email">
             <a:extLst>
               <a:ext uri="{28A0092B-C50C-407E-A947-70E740481C1C}">
                 <a14:useLocalDpi xmlns:a14="http://schemas.microsoft.com/office/drawing/2010/main" val="0"/>
@@ -9272,13 +9286,13 @@
   <p:clrMapOvr>
     <a:masterClrMapping/>
   </p:clrMapOvr>
-  <p:transition xmlns:p14="http://schemas.microsoft.com/office/powerpoint/2010/main" spd="slow">
+  <p:transition spd="slow">
     <p:push/>
   </p:transition>
   <p:timing>
     <p:tnLst>
       <p:par>
-        <p:cTn xmlns:p14="http://schemas.microsoft.com/office/powerpoint/2010/main" id="1" dur="indefinite" restart="never" nodeType="tmRoot"/>
+        <p:cTn id="1" dur="indefinite" restart="never" nodeType="tmRoot"/>
       </p:par>
     </p:tnLst>
   </p:timing>
@@ -9675,13 +9689,13 @@
   <p:clrMapOvr>
     <a:masterClrMapping/>
   </p:clrMapOvr>
-  <p:transition xmlns:p14="http://schemas.microsoft.com/office/powerpoint/2010/main" spd="slow">
+  <p:transition spd="slow">
     <p:push/>
   </p:transition>
   <p:timing>
     <p:tnLst>
       <p:par>
-        <p:cTn xmlns:p14="http://schemas.microsoft.com/office/powerpoint/2010/main" id="1" dur="indefinite" restart="never" nodeType="tmRoot"/>
+        <p:cTn id="1" dur="indefinite" restart="never" nodeType="tmRoot"/>
       </p:par>
     </p:tnLst>
   </p:timing>
@@ -9788,24 +9802,24 @@
           <a:p>
             <a:r>
               <a:rPr lang="fr-FR" dirty="0" smtClean="0"/>
-              <a:t>Mise </a:t>
+              <a:t>Discussion de </a:t>
             </a:r>
             <a:r>
               <a:rPr lang="fr-FR" dirty="0" smtClean="0"/>
-              <a:t>au point de l’avancement à chaque </a:t>
-            </a:r>
+              <a:t>l’avancement à chaque rencontre</a:t>
+            </a:r>
+          </a:p>
+          <a:p>
+            <a:endParaRPr lang="fr-FR" dirty="0"/>
+          </a:p>
+          <a:p>
             <a:r>
               <a:rPr lang="fr-FR" dirty="0" smtClean="0"/>
-              <a:t>rencontre</a:t>
-            </a:r>
-          </a:p>
-          <a:p>
-            <a:endParaRPr lang="fr-FR" dirty="0"/>
-          </a:p>
-          <a:p>
+              <a:t>Durée du sprint : Une </a:t>
+            </a:r>
             <a:r>
               <a:rPr lang="fr-FR" dirty="0" smtClean="0"/>
-              <a:t>Sprint de 1 semaine</a:t>
+              <a:t>semaine</a:t>
             </a:r>
           </a:p>
           <a:p>
@@ -9891,13 +9905,13 @@
   <p:clrMapOvr>
     <a:masterClrMapping/>
   </p:clrMapOvr>
-  <p:transition xmlns:p14="http://schemas.microsoft.com/office/powerpoint/2010/main" spd="slow">
+  <p:transition spd="slow">
     <p:push/>
   </p:transition>
   <p:timing>
     <p:tnLst>
       <p:par>
-        <p:cTn xmlns:p14="http://schemas.microsoft.com/office/powerpoint/2010/main" id="1" dur="indefinite" restart="never" nodeType="tmRoot"/>
+        <p:cTn id="1" dur="indefinite" restart="never" nodeType="tmRoot"/>
       </p:par>
     </p:tnLst>
   </p:timing>
@@ -9987,24 +10001,16 @@
           <a:p>
             <a:r>
               <a:rPr lang="fr-FR" dirty="0" smtClean="0"/>
-              <a:t>Répartition initiale des tâches par </a:t>
-            </a:r>
+              <a:t>Répartition initiale des tâches par fonctionnalité</a:t>
+            </a:r>
+          </a:p>
+          <a:p>
+            <a:endParaRPr lang="fr-FR" dirty="0" smtClean="0"/>
+          </a:p>
+          <a:p>
             <a:r>
               <a:rPr lang="fr-FR" dirty="0" smtClean="0"/>
-              <a:t>fonctionnalité</a:t>
-            </a:r>
-          </a:p>
-          <a:p>
-            <a:endParaRPr lang="fr-FR" dirty="0" smtClean="0"/>
-          </a:p>
-          <a:p>
-            <a:r>
-              <a:rPr lang="fr-FR" dirty="0" smtClean="0"/>
-              <a:t>Répartition à chaque sprint des t</a:t>
-            </a:r>
-            <a:r>
-              <a:rPr lang="fr-FR" dirty="0" smtClean="0"/>
-              <a:t>âches pour le nouveau Sprint </a:t>
+              <a:t>Répartition à chaque sprint des tâches pour le nouveau Sprint </a:t>
             </a:r>
             <a:r>
               <a:rPr lang="fr-FR" dirty="0" err="1" smtClean="0"/>
@@ -10097,13 +10103,13 @@
   <p:clrMapOvr>
     <a:masterClrMapping/>
   </p:clrMapOvr>
-  <p:transition xmlns:p14="http://schemas.microsoft.com/office/powerpoint/2010/main" spd="slow">
+  <p:transition spd="slow">
     <p:push/>
   </p:transition>
   <p:timing>
     <p:tnLst>
       <p:par>
-        <p:cTn xmlns:p14="http://schemas.microsoft.com/office/powerpoint/2010/main" id="1" dur="indefinite" restart="never" nodeType="tmRoot"/>
+        <p:cTn id="1" dur="indefinite" restart="never" nodeType="tmRoot"/>
       </p:par>
     </p:tnLst>
   </p:timing>
@@ -10196,8 +10202,9 @@
           <a:p>
             <a:r>
               <a:rPr lang="fr-FR" dirty="0" smtClean="0"/>
-              <a:t>5 slots de sauvegarde</a:t>
-            </a:r>
+              <a:t>5 profils sauvegardées</a:t>
+            </a:r>
+            <a:endParaRPr lang="fr-FR" dirty="0" smtClean="0"/>
           </a:p>
         </p:txBody>
       </p:sp>
@@ -10480,13 +10487,13 @@
   <p:clrMapOvr>
     <a:masterClrMapping/>
   </p:clrMapOvr>
-  <p:transition xmlns:p14="http://schemas.microsoft.com/office/powerpoint/2010/main" spd="slow">
+  <p:transition spd="slow">
     <p:push/>
   </p:transition>
   <p:timing>
     <p:tnLst>
       <p:par>
-        <p:cTn xmlns:p14="http://schemas.microsoft.com/office/powerpoint/2010/main" id="1" dur="indefinite" restart="never" nodeType="tmRoot"/>
+        <p:cTn id="1" dur="indefinite" restart="never" nodeType="tmRoot"/>
       </p:par>
     </p:tnLst>
   </p:timing>
@@ -10573,13 +10580,21 @@
           <a:p>
             <a:r>
               <a:rPr lang="fr-FR" dirty="0" smtClean="0"/>
-              <a:t>6 vues par niveau, changement de vue (ici?)</a:t>
-            </a:r>
-          </a:p>
-          <a:p>
+              <a:t>6 vues par </a:t>
+            </a:r>
             <a:r>
               <a:rPr lang="fr-FR" dirty="0" smtClean="0"/>
-              <a:t>Surface composée de blocs invisibles</a:t>
+              <a:t>niveau avec déplacement de la vue</a:t>
+            </a:r>
+          </a:p>
+          <a:p>
+            <a:r>
+              <a:rPr lang="fr-FR" dirty="0" smtClean="0"/>
+              <a:t>Surface </a:t>
+            </a:r>
+            <a:r>
+              <a:rPr lang="fr-FR" dirty="0" smtClean="0"/>
+              <a:t>composée de blocs invisibles</a:t>
             </a:r>
           </a:p>
           <a:p>
@@ -10845,13 +10860,13 @@
   <p:clrMapOvr>
     <a:masterClrMapping/>
   </p:clrMapOvr>
-  <p:transition xmlns:p14="http://schemas.microsoft.com/office/powerpoint/2010/main" spd="slow">
+  <p:transition spd="slow">
     <p:push/>
   </p:transition>
   <p:timing>
     <p:tnLst>
       <p:par>
-        <p:cTn xmlns:p14="http://schemas.microsoft.com/office/powerpoint/2010/main" id="1" dur="indefinite" restart="never" nodeType="tmRoot"/>
+        <p:cTn id="1" dur="indefinite" restart="never" nodeType="tmRoot"/>
       </p:par>
     </p:tnLst>
   </p:timing>
@@ -10974,7 +10989,7 @@
           <p:nvPr/>
         </p:nvPicPr>
         <p:blipFill rotWithShape="1">
-          <a:blip r:embed="rId4">
+          <a:blip r:embed="rId4" cstate="email">
             <a:extLst>
               <a:ext uri="{28A0092B-C50C-407E-A947-70E740481C1C}">
                 <a14:useLocalDpi xmlns:a14="http://schemas.microsoft.com/office/drawing/2010/main" val="0"/>
@@ -11096,13 +11111,13 @@
   <p:clrMapOvr>
     <a:masterClrMapping/>
   </p:clrMapOvr>
-  <p:transition xmlns:p14="http://schemas.microsoft.com/office/powerpoint/2010/main" spd="slow">
+  <p:transition spd="slow">
     <p:push/>
   </p:transition>
   <p:timing>
     <p:tnLst>
       <p:par>
-        <p:cTn xmlns:p14="http://schemas.microsoft.com/office/powerpoint/2010/main" id="1" dur="indefinite" restart="never" nodeType="tmRoot"/>
+        <p:cTn id="1" dur="indefinite" restart="never" nodeType="tmRoot"/>
       </p:par>
     </p:tnLst>
   </p:timing>
@@ -11260,13 +11275,13 @@
   <p:clrMapOvr>
     <a:masterClrMapping/>
   </p:clrMapOvr>
-  <p:transition xmlns:p14="http://schemas.microsoft.com/office/powerpoint/2010/main" spd="slow">
+  <p:transition spd="slow">
     <p:push/>
   </p:transition>
   <p:timing>
     <p:tnLst>
       <p:par>
-        <p:cTn xmlns:p14="http://schemas.microsoft.com/office/powerpoint/2010/main" id="1" dur="indefinite" restart="never" nodeType="tmRoot"/>
+        <p:cTn id="1" dur="indefinite" restart="never" nodeType="tmRoot"/>
       </p:par>
     </p:tnLst>
   </p:timing>

</xml_diff>

<commit_message>
Modification de la présentation
</commit_message>
<xml_diff>
--- a/Administration/JamesGouinSePresente.pptx
+++ b/Administration/JamesGouinSePresente.pptx
@@ -125,7 +125,7 @@
   </p:defaultTextStyle>
   <p:extLst>
     <p:ext uri="{EFAFB233-063F-42B5-8137-9DF3F51BA10A}">
-      <p15:sldGuideLst xmlns:p15="http://schemas.microsoft.com/office/powerpoint/2012/main">
+      <p15:sldGuideLst xmlns:p15="http://schemas.microsoft.com/office/powerpoint/2012/main" xmlns="">
         <p15:guide id="1" orient="horz" pos="2160">
           <p15:clr>
             <a:srgbClr val="A4A3A4"/>
@@ -224,7 +224,7 @@
           <a:p>
             <a:fld id="{64D0C252-870E-0640-B649-5DBEF39458AD}" type="datetimeFigureOut">
               <a:rPr lang="fr-FR" smtClean="0"/>
-              <a:t>27/01/2015</a:t>
+              <a:t>27.01.15</a:t>
             </a:fld>
             <a:endParaRPr lang="fr-FR"/>
           </a:p>
@@ -290,7 +290,7 @@
           <a:p>
             <a:fld id="{DD99509E-6BDC-B342-9D56-6CF33E61AF5F}" type="slidenum">
               <a:rPr lang="fr-FR" smtClean="0"/>
-              <a:t>‹N°›</a:t>
+              <a:t>‹#›</a:t>
             </a:fld>
             <a:endParaRPr lang="fr-FR"/>
           </a:p>
@@ -390,7 +390,7 @@
           <a:p>
             <a:fld id="{2511AB13-6564-5B49-9CE9-2B8226196AD7}" type="datetimeFigureOut">
               <a:rPr lang="fr-FR" smtClean="0"/>
-              <a:t>27/01/2015</a:t>
+              <a:t>27.01.15</a:t>
             </a:fld>
             <a:endParaRPr lang="fr-FR"/>
           </a:p>
@@ -549,7 +549,7 @@
           <a:p>
             <a:fld id="{953D97BD-1AB9-714E-AA5A-8BE4BC9E0007}" type="slidenum">
               <a:rPr lang="fr-FR" smtClean="0"/>
-              <a:t>‹N°›</a:t>
+              <a:t>‹#›</a:t>
             </a:fld>
             <a:endParaRPr lang="fr-FR"/>
           </a:p>
@@ -814,12 +814,31 @@
           <a:p>
             <a:r>
               <a:rPr lang="fr-FR" b="1" dirty="0" smtClean="0"/>
+              <a:t>Ennemi se déplace, le pingouin doit éviter leur champ</a:t>
+            </a:r>
+            <a:r>
+              <a:rPr lang="fr-FR" b="1" baseline="0" dirty="0" smtClean="0"/>
+              <a:t> de vision.</a:t>
+            </a:r>
+            <a:endParaRPr lang="fr-FR" b="1" dirty="0" smtClean="0"/>
+          </a:p>
+          <a:p>
+            <a:endParaRPr lang="fr-FR" dirty="0" smtClean="0"/>
+          </a:p>
+          <a:p>
+            <a:r>
+              <a:rPr lang="fr-FR" b="1" dirty="0" smtClean="0"/>
               <a:t>Classes</a:t>
             </a:r>
             <a:r>
               <a:rPr lang="fr-FR" b="1" baseline="0" dirty="0" smtClean="0"/>
-              <a:t> Ennemi (héritage)</a:t>
-            </a:r>
+              <a:t> Ennemi </a:t>
+            </a:r>
+            <a:r>
+              <a:rPr lang="fr-FR" b="1" baseline="0" dirty="0" smtClean="0"/>
+              <a:t>(MEME CLASSE POUR TOUS)</a:t>
+            </a:r>
+            <a:endParaRPr lang="fr-FR" b="1" baseline="0" dirty="0" smtClean="0"/>
           </a:p>
           <a:p>
             <a:pPr marL="171450" indent="-171450">
@@ -830,6 +849,10 @@
               <a:rPr lang="fr-FR" baseline="0" dirty="0" err="1" smtClean="0"/>
               <a:t>E_Renard</a:t>
             </a:r>
+            <a:r>
+              <a:rPr lang="fr-FR" baseline="0" dirty="0" smtClean="0"/>
+              <a:t> </a:t>
+            </a:r>
             <a:endParaRPr lang="fr-FR" baseline="0" dirty="0" smtClean="0"/>
           </a:p>
           <a:p>
@@ -841,19 +864,37 @@
               <a:rPr lang="fr-FR" baseline="0" dirty="0" err="1" smtClean="0"/>
               <a:t>E_Loup</a:t>
             </a:r>
-            <a:endParaRPr lang="fr-FR" dirty="0" smtClean="0"/>
-          </a:p>
-          <a:p>
-            <a:endParaRPr lang="fr-FR" dirty="0" smtClean="0"/>
+            <a:endParaRPr lang="fr-FR" baseline="0" dirty="0" smtClean="0"/>
           </a:p>
           <a:p>
             <a:pPr marL="0" indent="0">
               <a:buFont typeface="Arial"/>
               <a:buNone/>
             </a:pPr>
-            <a:r>
-              <a:rPr lang="fr-FR" b="1" dirty="0" smtClean="0"/>
-              <a:t>Champ de vision, création</a:t>
+            <a:endParaRPr lang="fr-FR" baseline="0" dirty="0" smtClean="0"/>
+          </a:p>
+          <a:p>
+            <a:pPr marL="0" indent="0">
+              <a:buFont typeface="Arial"/>
+              <a:buNone/>
+            </a:pPr>
+            <a:r>
+              <a:rPr lang="fr-FR" b="1" baseline="0" dirty="0" smtClean="0"/>
+              <a:t>Les classes hésitantes sont lég</a:t>
+            </a:r>
+            <a:r>
+              <a:rPr lang="fr-FR" b="1" baseline="0" dirty="0" smtClean="0"/>
+              <a:t>ères,</a:t>
+            </a:r>
+          </a:p>
+          <a:p>
+            <a:pPr marL="0" indent="0">
+              <a:buFont typeface="Arial"/>
+              <a:buNone/>
+            </a:pPr>
+            <a:r>
+              <a:rPr lang="fr-FR" baseline="0" dirty="0" smtClean="0"/>
+              <a:t>Elles définissent uniquement :</a:t>
             </a:r>
           </a:p>
           <a:p>
@@ -862,8 +903,64 @@
               <a:buChar char="•"/>
             </a:pPr>
             <a:r>
+              <a:rPr lang="fr-FR" dirty="0" smtClean="0"/>
+              <a:t>Forme du champ</a:t>
+            </a:r>
+            <a:r>
               <a:rPr lang="fr-FR" baseline="0" dirty="0" smtClean="0"/>
-              <a:t>blocs assignés à une lignes et colonne, tout dans une liste dans Ennemi.</a:t>
+              <a:t> de vision</a:t>
+            </a:r>
+          </a:p>
+          <a:p>
+            <a:pPr marL="171450" indent="-171450">
+              <a:buFont typeface="Arial"/>
+              <a:buChar char="•"/>
+            </a:pPr>
+            <a:r>
+              <a:rPr lang="fr-FR" baseline="0" dirty="0" smtClean="0"/>
+              <a:t>apparence du méchant</a:t>
+            </a:r>
+          </a:p>
+          <a:p>
+            <a:pPr marL="171450" indent="-171450">
+              <a:buFont typeface="Arial"/>
+              <a:buChar char="•"/>
+            </a:pPr>
+            <a:r>
+              <a:rPr lang="fr-FR" baseline="0" dirty="0" smtClean="0"/>
+              <a:t>Vitesse de déplacement</a:t>
+            </a:r>
+            <a:endParaRPr lang="fr-FR" dirty="0" smtClean="0"/>
+          </a:p>
+          <a:p>
+            <a:endParaRPr lang="fr-FR" dirty="0" smtClean="0"/>
+          </a:p>
+          <a:p>
+            <a:pPr marL="0" indent="0">
+              <a:buFont typeface="Arial"/>
+              <a:buNone/>
+            </a:pPr>
+            <a:r>
+              <a:rPr lang="fr-FR" b="1" dirty="0" smtClean="0"/>
+              <a:t>Champ de vision, création</a:t>
+            </a:r>
+          </a:p>
+          <a:p>
+            <a:pPr marL="171450" indent="-171450">
+              <a:buFont typeface="Arial"/>
+              <a:buChar char="•"/>
+            </a:pPr>
+            <a:r>
+              <a:rPr lang="fr-FR" baseline="0" dirty="0" smtClean="0"/>
+              <a:t>blocs assignés à une lignes et colonne, tout dans une liste </a:t>
+            </a:r>
+            <a:r>
+              <a:rPr lang="fr-FR" baseline="0" dirty="0" smtClean="0"/>
+              <a:t>dans chaque </a:t>
+            </a:r>
+            <a:r>
+              <a:rPr lang="fr-FR" baseline="0" dirty="0" smtClean="0"/>
+              <a:t>Ennemi.</a:t>
             </a:r>
           </a:p>
           <a:p>
@@ -1347,8 +1444,36 @@
             </a:pPr>
             <a:r>
               <a:rPr lang="fr-FR" b="1" baseline="0" dirty="0" smtClean="0"/>
-              <a:t>Retour de l’ennemis en arrière si obstacle sur son chemin. Il n’essaye pas de le contourner</a:t>
-            </a:r>
+              <a:t>Retour de l’ennemis en arrière si obstacle sur son chemin. Il n’essaye pas de le </a:t>
+            </a:r>
+            <a:r>
+              <a:rPr lang="fr-FR" b="1" baseline="0" dirty="0" smtClean="0"/>
+              <a:t>contourner</a:t>
+            </a:r>
+          </a:p>
+          <a:p>
+            <a:pPr marL="171450" marR="0" indent="-171450" algn="l" defTabSz="457200" rtl="0" eaLnBrk="1" fontAlgn="auto" latinLnBrk="0" hangingPunct="1">
+              <a:lnSpc>
+                <a:spcPct val="100000"/>
+              </a:lnSpc>
+              <a:spcBef>
+                <a:spcPts val="0"/>
+              </a:spcBef>
+              <a:spcAft>
+                <a:spcPts val="0"/>
+              </a:spcAft>
+              <a:buClrTx/>
+              <a:buSzTx/>
+              <a:buFont typeface="Arial"/>
+              <a:buChar char="•"/>
+              <a:tabLst/>
+              <a:defRPr/>
+            </a:pPr>
+            <a:r>
+              <a:rPr lang="fr-FR" b="0" baseline="0" dirty="0" smtClean="0"/>
+              <a:t>Fonctionnement voulu, défini pour les puzzles.</a:t>
+            </a:r>
+            <a:endParaRPr lang="fr-FR" b="0" baseline="0" dirty="0" smtClean="0"/>
           </a:p>
           <a:p>
             <a:endParaRPr lang="fr-FR" dirty="0" smtClean="0"/>
@@ -1489,11 +1614,7 @@
             </a:r>
             <a:r>
               <a:rPr lang="fr-FR" b="0" baseline="0" dirty="0" smtClean="0"/>
-              <a:t> </a:t>
-            </a:r>
-            <a:r>
-              <a:rPr lang="fr-FR" b="0" baseline="0" dirty="0" smtClean="0"/>
-              <a:t>du champ de vue</a:t>
+              <a:t> du champ de vue</a:t>
             </a:r>
           </a:p>
           <a:p>
@@ -2732,15 +2853,7 @@
             </a:pPr>
             <a:r>
               <a:rPr lang="fr-FR" b="0" baseline="0" dirty="0" smtClean="0"/>
-              <a:t>Utilisation d’une « </a:t>
-            </a:r>
-            <a:r>
-              <a:rPr lang="fr-FR" b="0" baseline="0" dirty="0" smtClean="0"/>
-              <a:t>Sacoche d’objets</a:t>
-            </a:r>
-            <a:r>
-              <a:rPr lang="fr-FR" b="0" baseline="0" dirty="0" smtClean="0"/>
-              <a:t> »</a:t>
+              <a:t>Utilisation d’une « Sacoche d’objets »</a:t>
             </a:r>
           </a:p>
           <a:p>
@@ -2894,13 +3007,8 @@
             </a:pPr>
             <a:r>
               <a:rPr lang="fr-FR" b="1" baseline="0" dirty="0" smtClean="0"/>
-              <a:t>Le </a:t>
-            </a:r>
-            <a:r>
-              <a:rPr lang="fr-FR" b="1" baseline="0" dirty="0" smtClean="0"/>
-              <a:t>pingouin peut</a:t>
-            </a:r>
-            <a:endParaRPr lang="fr-FR" b="1" baseline="0" dirty="0" smtClean="0"/>
+              <a:t>Le pingouin peut</a:t>
+            </a:r>
           </a:p>
           <a:p>
             <a:pPr marL="171450" marR="0" indent="-171450" algn="l" defTabSz="457200" rtl="0" eaLnBrk="1" fontAlgn="auto" latinLnBrk="0" hangingPunct="1">
@@ -2984,11 +3092,7 @@
             </a:r>
             <a:r>
               <a:rPr lang="fr-FR" baseline="0" dirty="0" smtClean="0"/>
-              <a:t> pour </a:t>
-            </a:r>
-            <a:r>
-              <a:rPr lang="fr-FR" baseline="0" dirty="0" smtClean="0"/>
-              <a:t>tous (Slot qui déplace le pingouin à chaque fin du </a:t>
+              <a:t> pour tous (Slot qui déplace le pingouin à chaque fin du </a:t>
             </a:r>
             <a:r>
               <a:rPr lang="fr-FR" baseline="0" dirty="0" err="1" smtClean="0"/>
@@ -2998,7 +3102,6 @@
               <a:rPr lang="fr-FR" baseline="0" dirty="0" smtClean="0"/>
               <a:t>)</a:t>
             </a:r>
-            <a:endParaRPr lang="fr-FR" baseline="0" dirty="0" smtClean="0"/>
           </a:p>
           <a:p>
             <a:pPr marL="171450" marR="0" indent="-171450" algn="l" defTabSz="457200" rtl="0" eaLnBrk="1" fontAlgn="auto" latinLnBrk="0" hangingPunct="1">
@@ -3090,13 +3193,8 @@
             </a:pPr>
             <a:r>
               <a:rPr lang="fr-FR" b="1" baseline="0" dirty="0" smtClean="0"/>
-              <a:t>Le bloc </a:t>
-            </a:r>
-            <a:r>
-              <a:rPr lang="fr-FR" b="1" baseline="0" dirty="0" smtClean="0"/>
-              <a:t>déplaçable peut</a:t>
-            </a:r>
-            <a:endParaRPr lang="fr-FR" b="1" baseline="0" dirty="0" smtClean="0"/>
+              <a:t>Le bloc déplaçable peut</a:t>
+            </a:r>
           </a:p>
           <a:p>
             <a:pPr marL="171450" marR="0" indent="-171450" algn="l" defTabSz="457200" rtl="0" eaLnBrk="1" fontAlgn="auto" latinLnBrk="0" hangingPunct="1">
@@ -3453,8 +3551,23 @@
             </a:pPr>
             <a:r>
               <a:rPr lang="fr-FR" b="0" baseline="0" dirty="0" smtClean="0"/>
-              <a:t>Détection des collisions par « frôlage » et calcul de la position</a:t>
-            </a:r>
+              <a:t>Détection des collisions par « frôlage » et calcul de la </a:t>
+            </a:r>
+            <a:r>
+              <a:rPr lang="fr-FR" b="0" baseline="0" dirty="0" smtClean="0"/>
+              <a:t>position</a:t>
+            </a:r>
+          </a:p>
+          <a:p>
+            <a:pPr marL="628650" lvl="1" indent="-171450">
+              <a:buFont typeface="Arial"/>
+              <a:buChar char="•"/>
+            </a:pPr>
+            <a:r>
+              <a:rPr lang="fr-FR" b="0" baseline="0" dirty="0" smtClean="0"/>
+              <a:t>Compliqué</a:t>
+            </a:r>
+            <a:endParaRPr lang="fr-FR" b="0" baseline="0" dirty="0" smtClean="0"/>
           </a:p>
           <a:p>
             <a:pPr marL="171450" indent="-171450">
@@ -3463,8 +3576,23 @@
             </a:pPr>
             <a:r>
               <a:rPr lang="fr-FR" b="0" baseline="0" dirty="0" smtClean="0"/>
-              <a:t>Faire bouger et revenir en arrière si KO</a:t>
-            </a:r>
+              <a:t>Faire bouger et revenir en arrière si </a:t>
+            </a:r>
+            <a:r>
+              <a:rPr lang="fr-FR" b="0" baseline="0" dirty="0" smtClean="0"/>
+              <a:t>KO</a:t>
+            </a:r>
+          </a:p>
+          <a:p>
+            <a:pPr marL="628650" lvl="1" indent="-171450">
+              <a:buFont typeface="Arial"/>
+              <a:buChar char="•"/>
+            </a:pPr>
+            <a:r>
+              <a:rPr lang="fr-FR" b="0" baseline="0" dirty="0" smtClean="0"/>
+              <a:t>Pas fluide</a:t>
+            </a:r>
+            <a:endParaRPr lang="fr-FR" b="0" baseline="0" dirty="0" smtClean="0"/>
           </a:p>
           <a:p>
             <a:pPr marL="171450" indent="-171450">
@@ -3473,8 +3601,23 @@
             </a:pPr>
             <a:r>
               <a:rPr lang="fr-FR" b="0" baseline="0" dirty="0" smtClean="0"/>
-              <a:t>Implémentation en croix</a:t>
-            </a:r>
+              <a:t>Implémentation en </a:t>
+            </a:r>
+            <a:r>
+              <a:rPr lang="fr-FR" b="0" baseline="0" dirty="0" smtClean="0"/>
+              <a:t>croix</a:t>
+            </a:r>
+          </a:p>
+          <a:p>
+            <a:pPr marL="628650" lvl="1" indent="-171450">
+              <a:buFont typeface="Arial"/>
+              <a:buChar char="•"/>
+            </a:pPr>
+            <a:r>
+              <a:rPr lang="fr-FR" b="0" baseline="0" dirty="0" smtClean="0"/>
+              <a:t>OK mais nécessite 30px au lieux de 32px</a:t>
+            </a:r>
+            <a:endParaRPr lang="fr-FR" b="0" baseline="0" dirty="0" smtClean="0"/>
           </a:p>
           <a:p>
             <a:pPr marL="171450" indent="-171450">
@@ -3552,7 +3695,15 @@
             </a:pPr>
             <a:r>
               <a:rPr lang="fr-FR" b="1" baseline="0" dirty="0" smtClean="0"/>
-              <a:t>Même principe pour les blocs déplaçables</a:t>
+              <a:t>Même </a:t>
+            </a:r>
+            <a:r>
+              <a:rPr lang="fr-FR" b="1" baseline="0" dirty="0" smtClean="0"/>
+              <a:t>principe appliqué </a:t>
+            </a:r>
+            <a:r>
+              <a:rPr lang="fr-FR" b="1" baseline="0" dirty="0" smtClean="0"/>
+              <a:t>pour les blocs déplaçables</a:t>
             </a:r>
           </a:p>
           <a:p>
@@ -4025,7 +4176,7 @@
           <a:p>
             <a:fld id="{8999B29F-751F-5744-80E1-600E8AC85EFD}" type="datetime1">
               <a:rPr lang="fr-CH" smtClean="0"/>
-              <a:t>27.01.2015</a:t>
+              <a:t>27.01.15</a:t>
             </a:fld>
             <a:endParaRPr lang="en-US"/>
           </a:p>
@@ -4049,7 +4200,7 @@
             <a:fld id="{687D7A59-36E2-48B9-B146-C1E59501F63F}" type="slidenum">
               <a:rPr lang="en-US" smtClean="0"/>
               <a:pPr/>
-              <a:t>‹N°›</a:t>
+              <a:t>‹#›</a:t>
             </a:fld>
             <a:endParaRPr lang="en-US"/>
           </a:p>
@@ -4079,7 +4230,7 @@
   <p:clrMapOvr>
     <a:masterClrMapping/>
   </p:clrMapOvr>
-  <p:transition spd="slow">
+  <p:transition xmlns:p14="http://schemas.microsoft.com/office/powerpoint/2010/main" spd="slow">
     <p:push/>
   </p:transition>
 </p:sldLayout>
@@ -4194,7 +4345,7 @@
           <a:p>
             <a:fld id="{AA19D44E-0FE8-C446-8611-5CEE6CB3864C}" type="datetime1">
               <a:rPr lang="fr-CH" smtClean="0"/>
-              <a:t>27.01.2015</a:t>
+              <a:t>27.01.15</a:t>
             </a:fld>
             <a:endParaRPr lang="en-US"/>
           </a:p>
@@ -4237,7 +4388,7 @@
             <a:fld id="{687D7A59-36E2-48B9-B146-C1E59501F63F}" type="slidenum">
               <a:rPr lang="en-US" smtClean="0"/>
               <a:pPr/>
-              <a:t>‹N°›</a:t>
+              <a:t>‹#›</a:t>
             </a:fld>
             <a:endParaRPr lang="en-US"/>
           </a:p>
@@ -4248,7 +4399,7 @@
   <p:clrMapOvr>
     <a:masterClrMapping/>
   </p:clrMapOvr>
-  <p:transition spd="slow">
+  <p:transition xmlns:p14="http://schemas.microsoft.com/office/powerpoint/2010/main" spd="slow">
     <p:push/>
   </p:transition>
 </p:sldLayout>
@@ -4373,7 +4524,7 @@
           <a:p>
             <a:fld id="{80BEAAA7-9C62-C645-9E7C-EAA05320C320}" type="datetime1">
               <a:rPr lang="fr-CH" smtClean="0"/>
-              <a:t>27.01.2015</a:t>
+              <a:t>27.01.15</a:t>
             </a:fld>
             <a:endParaRPr lang="en-US"/>
           </a:p>
@@ -4416,7 +4567,7 @@
             <a:fld id="{687D7A59-36E2-48B9-B146-C1E59501F63F}" type="slidenum">
               <a:rPr lang="en-US" smtClean="0"/>
               <a:pPr/>
-              <a:t>‹N°›</a:t>
+              <a:t>‹#›</a:t>
             </a:fld>
             <a:endParaRPr lang="en-US"/>
           </a:p>
@@ -4427,7 +4578,7 @@
   <p:clrMapOvr>
     <a:masterClrMapping/>
   </p:clrMapOvr>
-  <p:transition spd="slow">
+  <p:transition xmlns:p14="http://schemas.microsoft.com/office/powerpoint/2010/main" spd="slow">
     <p:push/>
   </p:transition>
 </p:sldLayout>
@@ -4560,7 +4711,7 @@
           <a:p>
             <a:fld id="{08EFB404-E2A9-5F44-BFF3-54F39A88F3D4}" type="datetime1">
               <a:rPr lang="fr-CH" smtClean="0"/>
-              <a:t>27.01.2015</a:t>
+              <a:t>27.01.15</a:t>
             </a:fld>
             <a:endParaRPr lang="en-US"/>
           </a:p>
@@ -4603,7 +4754,7 @@
             <a:fld id="{687D7A59-36E2-48B9-B146-C1E59501F63F}" type="slidenum">
               <a:rPr lang="en-US" smtClean="0"/>
               <a:pPr/>
-              <a:t>‹N°›</a:t>
+              <a:t>‹#›</a:t>
             </a:fld>
             <a:endParaRPr lang="en-US"/>
           </a:p>
@@ -4614,7 +4765,7 @@
   <p:clrMapOvr>
     <a:masterClrMapping/>
   </p:clrMapOvr>
-  <p:transition spd="slow">
+  <p:transition xmlns:p14="http://schemas.microsoft.com/office/powerpoint/2010/main" spd="slow">
     <p:push/>
   </p:transition>
 </p:sldLayout>
@@ -4826,7 +4977,7 @@
           <a:p>
             <a:fld id="{AF1D1857-115B-B442-B1E5-180228E51561}" type="datetime1">
               <a:rPr lang="fr-CH" smtClean="0"/>
-              <a:t>27.01.2015</a:t>
+              <a:t>27.01.15</a:t>
             </a:fld>
             <a:endParaRPr lang="en-US"/>
           </a:p>
@@ -4869,7 +5020,7 @@
             <a:fld id="{687D7A59-36E2-48B9-B146-C1E59501F63F}" type="slidenum">
               <a:rPr lang="en-US" smtClean="0"/>
               <a:pPr/>
-              <a:t>‹N°›</a:t>
+              <a:t>‹#›</a:t>
             </a:fld>
             <a:endParaRPr lang="en-US"/>
           </a:p>
@@ -5030,7 +5181,7 @@
   <p:clrMapOvr>
     <a:masterClrMapping/>
   </p:clrMapOvr>
-  <p:transition spd="slow">
+  <p:transition xmlns:p14="http://schemas.microsoft.com/office/powerpoint/2010/main" spd="slow">
     <p:push/>
   </p:transition>
 </p:sldLayout>
@@ -5178,7 +5329,7 @@
           <a:p>
             <a:fld id="{412BE0F2-A6D5-5740-9873-A96C8BB8BA9B}" type="datetime1">
               <a:rPr lang="fr-CH" smtClean="0"/>
-              <a:t>27.01.2015</a:t>
+              <a:t>27.01.15</a:t>
             </a:fld>
             <a:endParaRPr lang="en-US"/>
           </a:p>
@@ -5221,7 +5372,7 @@
             <a:fld id="{687D7A59-36E2-48B9-B146-C1E59501F63F}" type="slidenum">
               <a:rPr lang="en-US" smtClean="0"/>
               <a:pPr/>
-              <a:t>‹N°›</a:t>
+              <a:t>‹#›</a:t>
             </a:fld>
             <a:endParaRPr lang="en-US"/>
           </a:p>
@@ -5289,7 +5440,7 @@
   <p:clrMapOvr>
     <a:masterClrMapping/>
   </p:clrMapOvr>
-  <p:transition spd="slow">
+  <p:transition xmlns:p14="http://schemas.microsoft.com/office/powerpoint/2010/main" spd="slow">
     <p:push/>
   </p:transition>
 </p:sldLayout>
@@ -5490,7 +5641,7 @@
           <a:p>
             <a:fld id="{8213B743-169F-5645-AB8C-8899780DDA5A}" type="datetime1">
               <a:rPr lang="fr-CH" smtClean="0"/>
-              <a:t>27.01.2015</a:t>
+              <a:t>27.01.15</a:t>
             </a:fld>
             <a:endParaRPr lang="en-US"/>
           </a:p>
@@ -5533,7 +5684,7 @@
             <a:fld id="{687D7A59-36E2-48B9-B146-C1E59501F63F}" type="slidenum">
               <a:rPr lang="en-US" smtClean="0"/>
               <a:pPr/>
-              <a:t>‹N°›</a:t>
+              <a:t>‹#›</a:t>
             </a:fld>
             <a:endParaRPr lang="en-US"/>
           </a:p>
@@ -5658,7 +5809,7 @@
   <p:clrMapOvr>
     <a:masterClrMapping/>
   </p:clrMapOvr>
-  <p:transition spd="slow">
+  <p:transition xmlns:p14="http://schemas.microsoft.com/office/powerpoint/2010/main" spd="slow">
     <p:push/>
   </p:transition>
 </p:sldLayout>
@@ -5721,7 +5872,7 @@
           <a:p>
             <a:fld id="{E56CAA3E-DE66-BE4C-86BB-836CC203C1C4}" type="datetime1">
               <a:rPr lang="fr-CH" smtClean="0"/>
-              <a:t>27.01.2015</a:t>
+              <a:t>27.01.15</a:t>
             </a:fld>
             <a:endParaRPr lang="en-US"/>
           </a:p>
@@ -5764,7 +5915,7 @@
             <a:fld id="{687D7A59-36E2-48B9-B146-C1E59501F63F}" type="slidenum">
               <a:rPr lang="en-US" smtClean="0"/>
               <a:pPr/>
-              <a:t>‹N°›</a:t>
+              <a:t>‹#›</a:t>
             </a:fld>
             <a:endParaRPr lang="en-US"/>
           </a:p>
@@ -5775,7 +5926,7 @@
   <p:clrMapOvr>
     <a:masterClrMapping/>
   </p:clrMapOvr>
-  <p:transition spd="slow">
+  <p:transition xmlns:p14="http://schemas.microsoft.com/office/powerpoint/2010/main" spd="slow">
     <p:push/>
   </p:transition>
 </p:sldLayout>
@@ -5815,7 +5966,7 @@
           <a:p>
             <a:fld id="{F9C2E405-4970-F748-8838-75D6937AFE4A}" type="datetime1">
               <a:rPr lang="fr-CH" smtClean="0"/>
-              <a:t>27.01.2015</a:t>
+              <a:t>27.01.15</a:t>
             </a:fld>
             <a:endParaRPr lang="en-US"/>
           </a:p>
@@ -5858,7 +6009,7 @@
             <a:fld id="{687D7A59-36E2-48B9-B146-C1E59501F63F}" type="slidenum">
               <a:rPr lang="en-US" smtClean="0"/>
               <a:pPr/>
-              <a:t>‹N°›</a:t>
+              <a:t>‹#›</a:t>
             </a:fld>
             <a:endParaRPr lang="en-US"/>
           </a:p>
@@ -5869,7 +6020,7 @@
   <p:clrMapOvr>
     <a:masterClrMapping/>
   </p:clrMapOvr>
-  <p:transition spd="slow">
+  <p:transition xmlns:p14="http://schemas.microsoft.com/office/powerpoint/2010/main" spd="slow">
     <p:push/>
   </p:transition>
 </p:sldLayout>
@@ -6107,7 +6258,7 @@
           <a:p>
             <a:fld id="{C796D4D8-C33D-D547-8ECD-671A356435E7}" type="datetime1">
               <a:rPr lang="fr-CH" smtClean="0"/>
-              <a:t>27.01.2015</a:t>
+              <a:t>27.01.15</a:t>
             </a:fld>
             <a:endParaRPr lang="en-US"/>
           </a:p>
@@ -6150,7 +6301,7 @@
             <a:fld id="{687D7A59-36E2-48B9-B146-C1E59501F63F}" type="slidenum">
               <a:rPr lang="en-US" smtClean="0"/>
               <a:pPr/>
-              <a:t>‹N°›</a:t>
+              <a:t>‹#›</a:t>
             </a:fld>
             <a:endParaRPr lang="en-US"/>
           </a:p>
@@ -6161,7 +6312,7 @@
   <p:clrMapOvr>
     <a:masterClrMapping/>
   </p:clrMapOvr>
-  <p:transition spd="slow">
+  <p:transition xmlns:p14="http://schemas.microsoft.com/office/powerpoint/2010/main" spd="slow">
     <p:push/>
   </p:transition>
 </p:sldLayout>
@@ -6380,7 +6531,7 @@
           <a:p>
             <a:fld id="{D81A6492-30A7-F940-B414-588B0E51CD1D}" type="datetime1">
               <a:rPr lang="fr-CH" smtClean="0"/>
-              <a:t>27.01.2015</a:t>
+              <a:t>27.01.15</a:t>
             </a:fld>
             <a:endParaRPr lang="en-US"/>
           </a:p>
@@ -6423,7 +6574,7 @@
             <a:fld id="{687D7A59-36E2-48B9-B146-C1E59501F63F}" type="slidenum">
               <a:rPr lang="en-US" smtClean="0"/>
               <a:pPr/>
-              <a:t>‹N°›</a:t>
+              <a:t>‹#›</a:t>
             </a:fld>
             <a:endParaRPr lang="en-US"/>
           </a:p>
@@ -6434,7 +6585,7 @@
   <p:clrMapOvr>
     <a:masterClrMapping/>
   </p:clrMapOvr>
-  <p:transition spd="slow">
+  <p:transition xmlns:p14="http://schemas.microsoft.com/office/powerpoint/2010/main" spd="slow">
     <p:push/>
   </p:transition>
 </p:sldLayout>
@@ -6606,7 +6757,7 @@
           <a:p>
             <a:fld id="{6CF81F46-A522-9B4E-90AB-C50863641B6B}" type="datetime1">
               <a:rPr lang="fr-CH" smtClean="0"/>
-              <a:t>27.01.2015</a:t>
+              <a:t>27.01.15</a:t>
             </a:fld>
             <a:endParaRPr lang="en-US"/>
           </a:p>
@@ -6689,7 +6840,7 @@
             <a:fld id="{687D7A59-36E2-48B9-B146-C1E59501F63F}" type="slidenum">
               <a:rPr lang="en-US" smtClean="0"/>
               <a:pPr/>
-              <a:t>‹N°›</a:t>
+              <a:t>‹#›</a:t>
             </a:fld>
             <a:endParaRPr lang="en-US"/>
           </a:p>
@@ -6818,7 +6969,7 @@
     <p:sldLayoutId id="2147483873" r:id="rId10"/>
     <p:sldLayoutId id="2147483874" r:id="rId11"/>
   </p:sldLayoutIdLst>
-  <p:transition spd="slow">
+  <p:transition xmlns:p14="http://schemas.microsoft.com/office/powerpoint/2010/main" spd="slow">
     <p:push/>
   </p:transition>
   <p:hf hdr="0" ftr="0" dt="0"/>
@@ -7280,13 +7431,13 @@
   <p:clrMapOvr>
     <a:masterClrMapping/>
   </p:clrMapOvr>
-  <p:transition spd="slow">
+  <p:transition xmlns:p14="http://schemas.microsoft.com/office/powerpoint/2010/main" spd="slow">
     <p:push/>
   </p:transition>
   <p:timing>
     <p:tnLst>
       <p:par>
-        <p:cTn id="1" dur="indefinite" restart="never" nodeType="tmRoot"/>
+        <p:cTn xmlns:p14="http://schemas.microsoft.com/office/powerpoint/2010/main" id="1" dur="indefinite" restart="never" nodeType="tmRoot"/>
       </p:par>
     </p:tnLst>
   </p:timing>
@@ -7628,13 +7779,13 @@
   <p:clrMapOvr>
     <a:masterClrMapping/>
   </p:clrMapOvr>
-  <p:transition spd="slow">
+  <p:transition xmlns:p14="http://schemas.microsoft.com/office/powerpoint/2010/main" spd="slow">
     <p:push/>
   </p:transition>
   <p:timing>
     <p:tnLst>
       <p:par>
-        <p:cTn id="1" dur="indefinite" restart="never" nodeType="tmRoot">
+        <p:cTn xmlns:p14="http://schemas.microsoft.com/office/powerpoint/2010/main" id="1" dur="indefinite" restart="never" nodeType="tmRoot">
           <p:childTnLst>
             <p:seq concurrent="1" nextAc="seek">
               <p:cTn id="2" dur="indefinite" nodeType="mainSeq">
@@ -8025,13 +8176,13 @@
   <p:clrMapOvr>
     <a:masterClrMapping/>
   </p:clrMapOvr>
-  <p:transition spd="slow">
+  <p:transition xmlns:p14="http://schemas.microsoft.com/office/powerpoint/2010/main" spd="slow">
     <p:push/>
   </p:transition>
   <p:timing>
     <p:tnLst>
       <p:par>
-        <p:cTn id="1" dur="indefinite" restart="never" nodeType="tmRoot"/>
+        <p:cTn xmlns:p14="http://schemas.microsoft.com/office/powerpoint/2010/main" id="1" dur="indefinite" restart="never" nodeType="tmRoot"/>
       </p:par>
     </p:tnLst>
   </p:timing>
@@ -8383,13 +8534,13 @@
   <p:clrMapOvr>
     <a:masterClrMapping/>
   </p:clrMapOvr>
-  <p:transition spd="slow">
+  <p:transition xmlns:p14="http://schemas.microsoft.com/office/powerpoint/2010/main" spd="slow">
     <p:push/>
   </p:transition>
   <p:timing>
     <p:tnLst>
       <p:par>
-        <p:cTn id="1" dur="indefinite" restart="never" nodeType="tmRoot"/>
+        <p:cTn xmlns:p14="http://schemas.microsoft.com/office/powerpoint/2010/main" id="1" dur="indefinite" restart="never" nodeType="tmRoot"/>
       </p:par>
     </p:tnLst>
   </p:timing>
@@ -8629,13 +8780,13 @@
   <p:clrMapOvr>
     <a:masterClrMapping/>
   </p:clrMapOvr>
-  <p:transition spd="slow">
+  <p:transition xmlns:p14="http://schemas.microsoft.com/office/powerpoint/2010/main" spd="slow">
     <p:push/>
   </p:transition>
   <p:timing>
     <p:tnLst>
       <p:par>
-        <p:cTn id="1" dur="indefinite" restart="never" nodeType="tmRoot"/>
+        <p:cTn xmlns:p14="http://schemas.microsoft.com/office/powerpoint/2010/main" id="1" dur="indefinite" restart="never" nodeType="tmRoot"/>
       </p:par>
     </p:tnLst>
   </p:timing>
@@ -9034,13 +9185,13 @@
   <p:clrMapOvr>
     <a:masterClrMapping/>
   </p:clrMapOvr>
-  <p:transition spd="slow">
+  <p:transition xmlns:p14="http://schemas.microsoft.com/office/powerpoint/2010/main" spd="slow">
     <p:push/>
   </p:transition>
   <p:timing>
     <p:tnLst>
       <p:par>
-        <p:cTn id="1" dur="indefinite" restart="never" nodeType="tmRoot"/>
+        <p:cTn xmlns:p14="http://schemas.microsoft.com/office/powerpoint/2010/main" id="1" dur="indefinite" restart="never" nodeType="tmRoot"/>
       </p:par>
     </p:tnLst>
   </p:timing>
@@ -9086,7 +9237,7 @@
         </p:blipFill>
         <p:spPr>
           <a:xfrm>
-            <a:off x="1433687" y="1653664"/>
+            <a:off x="1433687" y="1157298"/>
             <a:ext cx="6172200" cy="2939143"/>
           </a:xfrm>
           <a:prstGeom prst="rect">
@@ -9102,8 +9253,8 @@
         </p:nvSpPr>
         <p:spPr>
           <a:xfrm>
-            <a:off x="2980028" y="4713112"/>
-            <a:ext cx="3091599" cy="923330"/>
+            <a:off x="2980028" y="3910167"/>
+            <a:ext cx="3091599" cy="1508105"/>
           </a:xfrm>
           <a:prstGeom prst="rect">
             <a:avLst/>
@@ -9171,9 +9322,49 @@
                   <a:srgbClr val="C50000"/>
                 </a:solidFill>
               </a:rPr>
-              <a:t>Steve Visinand</a:t>
-            </a:r>
-            <a:endParaRPr lang="fr-FR" dirty="0">
+              <a:t>Steve </a:t>
+            </a:r>
+            <a:r>
+              <a:rPr lang="fr-FR" dirty="0" smtClean="0">
+                <a:solidFill>
+                  <a:srgbClr val="C50000"/>
+                </a:solidFill>
+              </a:rPr>
+              <a:t>Visinand</a:t>
+            </a:r>
+            <a:endParaRPr lang="fr-FR" sz="1200" dirty="0">
+              <a:solidFill>
+                <a:srgbClr val="C50000"/>
+              </a:solidFill>
+            </a:endParaRPr>
+          </a:p>
+          <a:p>
+            <a:pPr algn="ctr"/>
+            <a:endParaRPr lang="fr-FR" sz="1200" dirty="0" smtClean="0">
+              <a:solidFill>
+                <a:srgbClr val="C50000"/>
+              </a:solidFill>
+            </a:endParaRPr>
+          </a:p>
+          <a:p>
+            <a:pPr algn="ctr"/>
+            <a:endParaRPr lang="fr-FR" sz="500" dirty="0">
+              <a:solidFill>
+                <a:srgbClr val="C50000"/>
+              </a:solidFill>
+            </a:endParaRPr>
+          </a:p>
+          <a:p>
+            <a:pPr algn="ctr"/>
+            <a:r>
+              <a:rPr lang="fr-CH" dirty="0" smtClean="0">
+                <a:solidFill>
+                  <a:srgbClr val="C50000"/>
+                </a:solidFill>
+              </a:rPr>
+              <a:t>27.01.15</a:t>
+            </a:r>
+            <a:endParaRPr lang="fr-FR" dirty="0" smtClean="0">
               <a:solidFill>
                 <a:srgbClr val="C50000"/>
               </a:solidFill>
@@ -9250,7 +9441,7 @@
         </p:nvSpPr>
         <p:spPr>
           <a:xfrm>
-            <a:off x="3719375" y="1150636"/>
+            <a:off x="3719375" y="873255"/>
             <a:ext cx="1583524" cy="369332"/>
           </a:xfrm>
           <a:prstGeom prst="rect">
@@ -9276,6 +9467,30 @@
           </a:p>
         </p:txBody>
       </p:sp>
+      <p:pic>
+        <p:nvPicPr>
+          <p:cNvPr id="2" name="Image 1"/>
+          <p:cNvPicPr>
+            <a:picLocks noChangeAspect="1"/>
+          </p:cNvPicPr>
+          <p:nvPr/>
+        </p:nvPicPr>
+        <p:blipFill>
+          <a:blip r:embed="rId5"/>
+          <a:stretch>
+            <a:fillRect/>
+          </a:stretch>
+        </p:blipFill>
+        <p:spPr>
+          <a:xfrm>
+            <a:off x="2980028" y="5535422"/>
+            <a:ext cx="3091599" cy="441840"/>
+          </a:xfrm>
+          <a:prstGeom prst="rect">
+            <a:avLst/>
+          </a:prstGeom>
+        </p:spPr>
+      </p:pic>
     </p:spTree>
     <p:extLst>
       <p:ext uri="{BB962C8B-B14F-4D97-AF65-F5344CB8AC3E}">
@@ -9286,13 +9501,13 @@
   <p:clrMapOvr>
     <a:masterClrMapping/>
   </p:clrMapOvr>
-  <p:transition spd="slow">
+  <p:transition xmlns:p14="http://schemas.microsoft.com/office/powerpoint/2010/main" spd="slow">
     <p:push/>
   </p:transition>
   <p:timing>
     <p:tnLst>
       <p:par>
-        <p:cTn id="1" dur="indefinite" restart="never" nodeType="tmRoot"/>
+        <p:cTn xmlns:p14="http://schemas.microsoft.com/office/powerpoint/2010/main" id="1" dur="indefinite" restart="never" nodeType="tmRoot"/>
       </p:par>
     </p:tnLst>
   </p:timing>
@@ -9689,13 +9904,13 @@
   <p:clrMapOvr>
     <a:masterClrMapping/>
   </p:clrMapOvr>
-  <p:transition spd="slow">
+  <p:transition xmlns:p14="http://schemas.microsoft.com/office/powerpoint/2010/main" spd="slow">
     <p:push/>
   </p:transition>
   <p:timing>
     <p:tnLst>
       <p:par>
-        <p:cTn id="1" dur="indefinite" restart="never" nodeType="tmRoot"/>
+        <p:cTn xmlns:p14="http://schemas.microsoft.com/office/powerpoint/2010/main" id="1" dur="indefinite" restart="never" nodeType="tmRoot"/>
       </p:par>
     </p:tnLst>
   </p:timing>
@@ -9802,24 +10017,16 @@
           <a:p>
             <a:r>
               <a:rPr lang="fr-FR" dirty="0" smtClean="0"/>
-              <a:t>Discussion de </a:t>
-            </a:r>
+              <a:t>Discussion de l’avancement à chaque rencontre</a:t>
+            </a:r>
+          </a:p>
+          <a:p>
+            <a:endParaRPr lang="fr-FR" dirty="0"/>
+          </a:p>
+          <a:p>
             <a:r>
               <a:rPr lang="fr-FR" dirty="0" smtClean="0"/>
-              <a:t>l’avancement à chaque rencontre</a:t>
-            </a:r>
-          </a:p>
-          <a:p>
-            <a:endParaRPr lang="fr-FR" dirty="0"/>
-          </a:p>
-          <a:p>
-            <a:r>
-              <a:rPr lang="fr-FR" dirty="0" smtClean="0"/>
-              <a:t>Durée du sprint : Une </a:t>
-            </a:r>
-            <a:r>
-              <a:rPr lang="fr-FR" dirty="0" smtClean="0"/>
-              <a:t>semaine</a:t>
+              <a:t>Durée du sprint : Une semaine</a:t>
             </a:r>
           </a:p>
           <a:p>
@@ -9905,13 +10112,13 @@
   <p:clrMapOvr>
     <a:masterClrMapping/>
   </p:clrMapOvr>
-  <p:transition spd="slow">
+  <p:transition xmlns:p14="http://schemas.microsoft.com/office/powerpoint/2010/main" spd="slow">
     <p:push/>
   </p:transition>
   <p:timing>
     <p:tnLst>
       <p:par>
-        <p:cTn id="1" dur="indefinite" restart="never" nodeType="tmRoot"/>
+        <p:cTn xmlns:p14="http://schemas.microsoft.com/office/powerpoint/2010/main" id="1" dur="indefinite" restart="never" nodeType="tmRoot"/>
       </p:par>
     </p:tnLst>
   </p:timing>
@@ -10103,13 +10310,13 @@
   <p:clrMapOvr>
     <a:masterClrMapping/>
   </p:clrMapOvr>
-  <p:transition spd="slow">
+  <p:transition xmlns:p14="http://schemas.microsoft.com/office/powerpoint/2010/main" spd="slow">
     <p:push/>
   </p:transition>
   <p:timing>
     <p:tnLst>
       <p:par>
-        <p:cTn id="1" dur="indefinite" restart="never" nodeType="tmRoot"/>
+        <p:cTn xmlns:p14="http://schemas.microsoft.com/office/powerpoint/2010/main" id="1" dur="indefinite" restart="never" nodeType="tmRoot"/>
       </p:par>
     </p:tnLst>
   </p:timing>
@@ -10204,7 +10411,6 @@
               <a:rPr lang="fr-FR" dirty="0" smtClean="0"/>
               <a:t>5 profils sauvegardées</a:t>
             </a:r>
-            <a:endParaRPr lang="fr-FR" dirty="0" smtClean="0"/>
           </a:p>
         </p:txBody>
       </p:sp>
@@ -10362,7 +10568,7 @@
         <p:spPr>
           <a:xfrm>
             <a:off x="1261323" y="3661866"/>
-            <a:ext cx="1794393" cy="2308324"/>
+            <a:ext cx="1794393" cy="1477328"/>
           </a:xfrm>
           <a:prstGeom prst="rect">
             <a:avLst/>
@@ -10401,19 +10607,7 @@
               <a:rPr lang="fr-FR" dirty="0" smtClean="0"/>
               <a:t>Poisson</a:t>
             </a:r>
-          </a:p>
-          <a:p>
             <a:endParaRPr lang="fr-FR" dirty="0" smtClean="0"/>
-          </a:p>
-          <a:p>
-            <a:endParaRPr lang="fr-FR" dirty="0"/>
-          </a:p>
-          <a:p>
-            <a:r>
-              <a:rPr lang="fr-FR" dirty="0" smtClean="0"/>
-              <a:t>Ennemi</a:t>
-            </a:r>
-            <a:endParaRPr lang="fr-FR" dirty="0"/>
           </a:p>
         </p:txBody>
       </p:sp>
@@ -10477,6 +10671,36 @@
           </a:prstGeom>
         </p:spPr>
       </p:pic>
+      <p:sp>
+        <p:nvSpPr>
+          <p:cNvPr id="12" name="ZoneTexte 11"/>
+          <p:cNvSpPr txBox="1"/>
+          <p:nvPr/>
+        </p:nvSpPr>
+        <p:spPr>
+          <a:xfrm>
+            <a:off x="1261323" y="5600858"/>
+            <a:ext cx="1794393" cy="369332"/>
+          </a:xfrm>
+          <a:prstGeom prst="rect">
+            <a:avLst/>
+          </a:prstGeom>
+          <a:noFill/>
+        </p:spPr>
+        <p:txBody>
+          <a:bodyPr wrap="square" rtlCol="0">
+            <a:spAutoFit/>
+          </a:bodyPr>
+          <a:lstStyle/>
+          <a:p>
+            <a:r>
+              <a:rPr lang="fr-FR" dirty="0" smtClean="0"/>
+              <a:t>Ennemi</a:t>
+            </a:r>
+            <a:endParaRPr lang="fr-FR" dirty="0"/>
+          </a:p>
+        </p:txBody>
+      </p:sp>
     </p:spTree>
     <p:extLst>
       <p:ext uri="{BB962C8B-B14F-4D97-AF65-F5344CB8AC3E}">
@@ -10487,15 +10711,288 @@
   <p:clrMapOvr>
     <a:masterClrMapping/>
   </p:clrMapOvr>
-  <p:transition spd="slow">
+  <p:transition xmlns:p14="http://schemas.microsoft.com/office/powerpoint/2010/main" spd="slow">
     <p:push/>
   </p:transition>
   <p:timing>
     <p:tnLst>
       <p:par>
-        <p:cTn id="1" dur="indefinite" restart="never" nodeType="tmRoot"/>
+        <p:cTn xmlns:p14="http://schemas.microsoft.com/office/powerpoint/2010/main" id="1" dur="indefinite" restart="never" nodeType="tmRoot">
+          <p:childTnLst>
+            <p:seq concurrent="1" nextAc="seek">
+              <p:cTn id="2" dur="indefinite" nodeType="mainSeq">
+                <p:childTnLst>
+                  <p:par>
+                    <p:cTn id="3" fill="hold">
+                      <p:stCondLst>
+                        <p:cond delay="indefinite"/>
+                      </p:stCondLst>
+                      <p:childTnLst>
+                        <p:par>
+                          <p:cTn id="4" fill="hold">
+                            <p:stCondLst>
+                              <p:cond delay="0"/>
+                            </p:stCondLst>
+                            <p:childTnLst>
+                              <p:par>
+                                <p:cTn id="5" presetID="10" presetClass="entr" presetSubtype="0" fill="hold" grpId="0" nodeType="clickEffect">
+                                  <p:stCondLst>
+                                    <p:cond delay="0"/>
+                                  </p:stCondLst>
+                                  <p:childTnLst>
+                                    <p:set>
+                                      <p:cBhvr>
+                                        <p:cTn id="6" dur="1" fill="hold">
+                                          <p:stCondLst>
+                                            <p:cond delay="0"/>
+                                          </p:stCondLst>
+                                        </p:cTn>
+                                        <p:tgtEl>
+                                          <p:spTgt spid="9"/>
+                                        </p:tgtEl>
+                                        <p:attrNameLst>
+                                          <p:attrName>style.visibility</p:attrName>
+                                        </p:attrNameLst>
+                                      </p:cBhvr>
+                                      <p:to>
+                                        <p:strVal val="visible"/>
+                                      </p:to>
+                                    </p:set>
+                                    <p:animEffect transition="in" filter="fade">
+                                      <p:cBhvr>
+                                        <p:cTn id="7" dur="500"/>
+                                        <p:tgtEl>
+                                          <p:spTgt spid="9"/>
+                                        </p:tgtEl>
+                                      </p:cBhvr>
+                                    </p:animEffect>
+                                  </p:childTnLst>
+                                </p:cTn>
+                              </p:par>
+                              <p:par>
+                                <p:cTn id="8" presetID="10" presetClass="entr" presetSubtype="0" fill="hold" nodeType="withEffect">
+                                  <p:stCondLst>
+                                    <p:cond delay="0"/>
+                                  </p:stCondLst>
+                                  <p:childTnLst>
+                                    <p:set>
+                                      <p:cBhvr>
+                                        <p:cTn id="9" dur="1" fill="hold">
+                                          <p:stCondLst>
+                                            <p:cond delay="0"/>
+                                          </p:stCondLst>
+                                        </p:cTn>
+                                        <p:tgtEl>
+                                          <p:spTgt spid="7"/>
+                                        </p:tgtEl>
+                                        <p:attrNameLst>
+                                          <p:attrName>style.visibility</p:attrName>
+                                        </p:attrNameLst>
+                                      </p:cBhvr>
+                                      <p:to>
+                                        <p:strVal val="visible"/>
+                                      </p:to>
+                                    </p:set>
+                                    <p:animEffect transition="in" filter="fade">
+                                      <p:cBhvr>
+                                        <p:cTn id="10" dur="500"/>
+                                        <p:tgtEl>
+                                          <p:spTgt spid="7"/>
+                                        </p:tgtEl>
+                                      </p:cBhvr>
+                                    </p:animEffect>
+                                  </p:childTnLst>
+                                </p:cTn>
+                              </p:par>
+                              <p:par>
+                                <p:cTn id="11" presetID="10" presetClass="entr" presetSubtype="0" fill="hold" nodeType="withEffect">
+                                  <p:stCondLst>
+                                    <p:cond delay="0"/>
+                                  </p:stCondLst>
+                                  <p:childTnLst>
+                                    <p:set>
+                                      <p:cBhvr>
+                                        <p:cTn id="12" dur="1" fill="hold">
+                                          <p:stCondLst>
+                                            <p:cond delay="0"/>
+                                          </p:stCondLst>
+                                        </p:cTn>
+                                        <p:tgtEl>
+                                          <p:spTgt spid="8"/>
+                                        </p:tgtEl>
+                                        <p:attrNameLst>
+                                          <p:attrName>style.visibility</p:attrName>
+                                        </p:attrNameLst>
+                                      </p:cBhvr>
+                                      <p:to>
+                                        <p:strVal val="visible"/>
+                                      </p:to>
+                                    </p:set>
+                                    <p:animEffect transition="in" filter="fade">
+                                      <p:cBhvr>
+                                        <p:cTn id="13" dur="500"/>
+                                        <p:tgtEl>
+                                          <p:spTgt spid="8"/>
+                                        </p:tgtEl>
+                                      </p:cBhvr>
+                                    </p:animEffect>
+                                  </p:childTnLst>
+                                </p:cTn>
+                              </p:par>
+                              <p:par>
+                                <p:cTn id="14" presetID="10" presetClass="entr" presetSubtype="0" fill="hold" nodeType="withEffect">
+                                  <p:stCondLst>
+                                    <p:cond delay="0"/>
+                                  </p:stCondLst>
+                                  <p:childTnLst>
+                                    <p:set>
+                                      <p:cBhvr>
+                                        <p:cTn id="15" dur="1" fill="hold">
+                                          <p:stCondLst>
+                                            <p:cond delay="0"/>
+                                          </p:stCondLst>
+                                        </p:cTn>
+                                        <p:tgtEl>
+                                          <p:spTgt spid="10"/>
+                                        </p:tgtEl>
+                                        <p:attrNameLst>
+                                          <p:attrName>style.visibility</p:attrName>
+                                        </p:attrNameLst>
+                                      </p:cBhvr>
+                                      <p:to>
+                                        <p:strVal val="visible"/>
+                                      </p:to>
+                                    </p:set>
+                                    <p:animEffect transition="in" filter="fade">
+                                      <p:cBhvr>
+                                        <p:cTn id="16" dur="500"/>
+                                        <p:tgtEl>
+                                          <p:spTgt spid="10"/>
+                                        </p:tgtEl>
+                                      </p:cBhvr>
+                                    </p:animEffect>
+                                  </p:childTnLst>
+                                </p:cTn>
+                              </p:par>
+                            </p:childTnLst>
+                          </p:cTn>
+                        </p:par>
+                      </p:childTnLst>
+                    </p:cTn>
+                  </p:par>
+                  <p:par>
+                    <p:cTn id="17" fill="hold">
+                      <p:stCondLst>
+                        <p:cond delay="indefinite"/>
+                      </p:stCondLst>
+                      <p:childTnLst>
+                        <p:par>
+                          <p:cTn id="18" fill="hold">
+                            <p:stCondLst>
+                              <p:cond delay="0"/>
+                            </p:stCondLst>
+                            <p:childTnLst>
+                              <p:par>
+                                <p:cTn id="19" presetID="10" presetClass="entr" presetSubtype="0" fill="hold" grpId="0" nodeType="clickEffect">
+                                  <p:stCondLst>
+                                    <p:cond delay="0"/>
+                                  </p:stCondLst>
+                                  <p:childTnLst>
+                                    <p:set>
+                                      <p:cBhvr>
+                                        <p:cTn id="20" dur="1" fill="hold">
+                                          <p:stCondLst>
+                                            <p:cond delay="0"/>
+                                          </p:stCondLst>
+                                        </p:cTn>
+                                        <p:tgtEl>
+                                          <p:spTgt spid="12"/>
+                                        </p:tgtEl>
+                                        <p:attrNameLst>
+                                          <p:attrName>style.visibility</p:attrName>
+                                        </p:attrNameLst>
+                                      </p:cBhvr>
+                                      <p:to>
+                                        <p:strVal val="visible"/>
+                                      </p:to>
+                                    </p:set>
+                                    <p:animEffect transition="in" filter="fade">
+                                      <p:cBhvr>
+                                        <p:cTn id="21" dur="500"/>
+                                        <p:tgtEl>
+                                          <p:spTgt spid="12"/>
+                                        </p:tgtEl>
+                                      </p:cBhvr>
+                                    </p:animEffect>
+                                  </p:childTnLst>
+                                </p:cTn>
+                              </p:par>
+                              <p:par>
+                                <p:cTn id="22" presetID="10" presetClass="entr" presetSubtype="0" fill="hold" nodeType="withEffect">
+                                  <p:stCondLst>
+                                    <p:cond delay="0"/>
+                                  </p:stCondLst>
+                                  <p:childTnLst>
+                                    <p:set>
+                                      <p:cBhvr>
+                                        <p:cTn id="23" dur="1" fill="hold">
+                                          <p:stCondLst>
+                                            <p:cond delay="0"/>
+                                          </p:stCondLst>
+                                        </p:cTn>
+                                        <p:tgtEl>
+                                          <p:spTgt spid="11"/>
+                                        </p:tgtEl>
+                                        <p:attrNameLst>
+                                          <p:attrName>style.visibility</p:attrName>
+                                        </p:attrNameLst>
+                                      </p:cBhvr>
+                                      <p:to>
+                                        <p:strVal val="visible"/>
+                                      </p:to>
+                                    </p:set>
+                                    <p:animEffect transition="in" filter="fade">
+                                      <p:cBhvr>
+                                        <p:cTn id="24" dur="500"/>
+                                        <p:tgtEl>
+                                          <p:spTgt spid="11"/>
+                                        </p:tgtEl>
+                                      </p:cBhvr>
+                                    </p:animEffect>
+                                  </p:childTnLst>
+                                </p:cTn>
+                              </p:par>
+                            </p:childTnLst>
+                          </p:cTn>
+                        </p:par>
+                      </p:childTnLst>
+                    </p:cTn>
+                  </p:par>
+                </p:childTnLst>
+              </p:cTn>
+              <p:prevCondLst>
+                <p:cond evt="onPrev" delay="0">
+                  <p:tgtEl>
+                    <p:sldTgt/>
+                  </p:tgtEl>
+                </p:cond>
+              </p:prevCondLst>
+              <p:nextCondLst>
+                <p:cond evt="onNext" delay="0">
+                  <p:tgtEl>
+                    <p:sldTgt/>
+                  </p:tgtEl>
+                </p:cond>
+              </p:nextCondLst>
+            </p:seq>
+          </p:childTnLst>
+        </p:cTn>
       </p:par>
     </p:tnLst>
+    <p:bldLst>
+      <p:bldP spid="9" grpId="0"/>
+      <p:bldP spid="12" grpId="0"/>
+    </p:bldLst>
   </p:timing>
 </p:sld>
 </file>
@@ -10580,21 +11077,13 @@
           <a:p>
             <a:r>
               <a:rPr lang="fr-FR" dirty="0" smtClean="0"/>
-              <a:t>6 vues par </a:t>
-            </a:r>
+              <a:t>6 vues par niveau avec déplacement de la vue</a:t>
+            </a:r>
+          </a:p>
+          <a:p>
             <a:r>
               <a:rPr lang="fr-FR" dirty="0" smtClean="0"/>
-              <a:t>niveau avec déplacement de la vue</a:t>
-            </a:r>
-          </a:p>
-          <a:p>
-            <a:r>
-              <a:rPr lang="fr-FR" dirty="0" smtClean="0"/>
-              <a:t>Surface </a:t>
-            </a:r>
-            <a:r>
-              <a:rPr lang="fr-FR" dirty="0" smtClean="0"/>
-              <a:t>composée de blocs invisibles</a:t>
+              <a:t>Surface composée de blocs invisibles</a:t>
             </a:r>
           </a:p>
           <a:p>
@@ -10860,13 +11349,13 @@
   <p:clrMapOvr>
     <a:masterClrMapping/>
   </p:clrMapOvr>
-  <p:transition spd="slow">
+  <p:transition xmlns:p14="http://schemas.microsoft.com/office/powerpoint/2010/main" spd="slow">
     <p:push/>
   </p:transition>
   <p:timing>
     <p:tnLst>
       <p:par>
-        <p:cTn id="1" dur="indefinite" restart="never" nodeType="tmRoot"/>
+        <p:cTn xmlns:p14="http://schemas.microsoft.com/office/powerpoint/2010/main" id="1" dur="indefinite" restart="never" nodeType="tmRoot"/>
       </p:par>
     </p:tnLst>
   </p:timing>
@@ -11111,13 +11600,13 @@
   <p:clrMapOvr>
     <a:masterClrMapping/>
   </p:clrMapOvr>
-  <p:transition spd="slow">
+  <p:transition xmlns:p14="http://schemas.microsoft.com/office/powerpoint/2010/main" spd="slow">
     <p:push/>
   </p:transition>
   <p:timing>
     <p:tnLst>
       <p:par>
-        <p:cTn id="1" dur="indefinite" restart="never" nodeType="tmRoot"/>
+        <p:cTn xmlns:p14="http://schemas.microsoft.com/office/powerpoint/2010/main" id="1" dur="indefinite" restart="never" nodeType="tmRoot"/>
       </p:par>
     </p:tnLst>
   </p:timing>
@@ -11275,13 +11764,13 @@
   <p:clrMapOvr>
     <a:masterClrMapping/>
   </p:clrMapOvr>
-  <p:transition spd="slow">
+  <p:transition xmlns:p14="http://schemas.microsoft.com/office/powerpoint/2010/main" spd="slow">
     <p:push/>
   </p:transition>
   <p:timing>
     <p:tnLst>
       <p:par>
-        <p:cTn id="1" dur="indefinite" restart="never" nodeType="tmRoot"/>
+        <p:cTn xmlns:p14="http://schemas.microsoft.com/office/powerpoint/2010/main" id="1" dur="indefinite" restart="never" nodeType="tmRoot"/>
       </p:par>
     </p:tnLst>
   </p:timing>

</xml_diff>

<commit_message>
Prez centrage du logo de l'école
</commit_message>
<xml_diff>
--- a/Administration/JamesGouinSePresente.pptx
+++ b/Administration/JamesGouinSePresente.pptx
@@ -125,7 +125,7 @@
   </p:defaultTextStyle>
   <p:extLst>
     <p:ext uri="{EFAFB233-063F-42B5-8137-9DF3F51BA10A}">
-      <p15:sldGuideLst xmlns:p15="http://schemas.microsoft.com/office/powerpoint/2012/main" xmlns="">
+      <p15:sldGuideLst xmlns="" xmlns:p15="http://schemas.microsoft.com/office/powerpoint/2012/main">
         <p15:guide id="1" orient="horz" pos="2160">
           <p15:clr>
             <a:srgbClr val="A4A3A4"/>
@@ -832,13 +832,8 @@
             </a:r>
             <a:r>
               <a:rPr lang="fr-FR" b="1" baseline="0" dirty="0" smtClean="0"/>
-              <a:t> Ennemi </a:t>
-            </a:r>
-            <a:r>
-              <a:rPr lang="fr-FR" b="1" baseline="0" dirty="0" smtClean="0"/>
-              <a:t>(MEME CLASSE POUR TOUS)</a:t>
-            </a:r>
-            <a:endParaRPr lang="fr-FR" b="1" baseline="0" dirty="0" smtClean="0"/>
+              <a:t> Ennemi (MEME CLASSE POUR TOUS)</a:t>
+            </a:r>
           </a:p>
           <a:p>
             <a:pPr marL="171450" indent="-171450">
@@ -853,7 +848,6 @@
               <a:rPr lang="fr-FR" baseline="0" dirty="0" smtClean="0"/>
               <a:t> </a:t>
             </a:r>
-            <a:endParaRPr lang="fr-FR" baseline="0" dirty="0" smtClean="0"/>
           </a:p>
           <a:p>
             <a:pPr marL="171450" indent="-171450">
@@ -880,11 +874,7 @@
             </a:pPr>
             <a:r>
               <a:rPr lang="fr-FR" b="1" baseline="0" dirty="0" smtClean="0"/>
-              <a:t>Les classes hésitantes sont lég</a:t>
-            </a:r>
-            <a:r>
-              <a:rPr lang="fr-FR" b="1" baseline="0" dirty="0" smtClean="0"/>
-              <a:t>ères,</a:t>
+              <a:t>Les classes hésitantes sont légères,</a:t>
             </a:r>
           </a:p>
           <a:p>
@@ -952,15 +942,7 @@
             </a:pPr>
             <a:r>
               <a:rPr lang="fr-FR" baseline="0" dirty="0" smtClean="0"/>
-              <a:t>blocs assignés à une lignes et colonne, tout dans une liste </a:t>
-            </a:r>
-            <a:r>
-              <a:rPr lang="fr-FR" baseline="0" dirty="0" smtClean="0"/>
-              <a:t>dans chaque </a:t>
-            </a:r>
-            <a:r>
-              <a:rPr lang="fr-FR" baseline="0" dirty="0" smtClean="0"/>
-              <a:t>Ennemi.</a:t>
+              <a:t>blocs assignés à une lignes et colonne, tout dans une liste dans chaque Ennemi.</a:t>
             </a:r>
           </a:p>
           <a:p>
@@ -1444,11 +1426,7 @@
             </a:pPr>
             <a:r>
               <a:rPr lang="fr-FR" b="1" baseline="0" dirty="0" smtClean="0"/>
-              <a:t>Retour de l’ennemis en arrière si obstacle sur son chemin. Il n’essaye pas de le </a:t>
-            </a:r>
-            <a:r>
-              <a:rPr lang="fr-FR" b="1" baseline="0" dirty="0" smtClean="0"/>
-              <a:t>contourner</a:t>
+              <a:t>Retour de l’ennemis en arrière si obstacle sur son chemin. Il n’essaye pas de le contourner</a:t>
             </a:r>
           </a:p>
           <a:p>
@@ -1473,7 +1451,6 @@
               <a:rPr lang="fr-FR" b="0" baseline="0" dirty="0" smtClean="0"/>
               <a:t>Fonctionnement voulu, défini pour les puzzles.</a:t>
             </a:r>
-            <a:endParaRPr lang="fr-FR" b="0" baseline="0" dirty="0" smtClean="0"/>
           </a:p>
           <a:p>
             <a:endParaRPr lang="fr-FR" dirty="0" smtClean="0"/>
@@ -3551,11 +3528,7 @@
             </a:pPr>
             <a:r>
               <a:rPr lang="fr-FR" b="0" baseline="0" dirty="0" smtClean="0"/>
-              <a:t>Détection des collisions par « frôlage » et calcul de la </a:t>
-            </a:r>
-            <a:r>
-              <a:rPr lang="fr-FR" b="0" baseline="0" dirty="0" smtClean="0"/>
-              <a:t>position</a:t>
+              <a:t>Détection des collisions par « frôlage » et calcul de la position</a:t>
             </a:r>
           </a:p>
           <a:p>
@@ -3567,7 +3540,6 @@
               <a:rPr lang="fr-FR" b="0" baseline="0" dirty="0" smtClean="0"/>
               <a:t>Compliqué</a:t>
             </a:r>
-            <a:endParaRPr lang="fr-FR" b="0" baseline="0" dirty="0" smtClean="0"/>
           </a:p>
           <a:p>
             <a:pPr marL="171450" indent="-171450">
@@ -3576,11 +3548,7 @@
             </a:pPr>
             <a:r>
               <a:rPr lang="fr-FR" b="0" baseline="0" dirty="0" smtClean="0"/>
-              <a:t>Faire bouger et revenir en arrière si </a:t>
-            </a:r>
-            <a:r>
-              <a:rPr lang="fr-FR" b="0" baseline="0" dirty="0" smtClean="0"/>
-              <a:t>KO</a:t>
+              <a:t>Faire bouger et revenir en arrière si KO</a:t>
             </a:r>
           </a:p>
           <a:p>
@@ -3592,7 +3560,6 @@
               <a:rPr lang="fr-FR" b="0" baseline="0" dirty="0" smtClean="0"/>
               <a:t>Pas fluide</a:t>
             </a:r>
-            <a:endParaRPr lang="fr-FR" b="0" baseline="0" dirty="0" smtClean="0"/>
           </a:p>
           <a:p>
             <a:pPr marL="171450" indent="-171450">
@@ -3601,11 +3568,7 @@
             </a:pPr>
             <a:r>
               <a:rPr lang="fr-FR" b="0" baseline="0" dirty="0" smtClean="0"/>
-              <a:t>Implémentation en </a:t>
-            </a:r>
-            <a:r>
-              <a:rPr lang="fr-FR" b="0" baseline="0" dirty="0" smtClean="0"/>
-              <a:t>croix</a:t>
+              <a:t>Implémentation en croix</a:t>
             </a:r>
           </a:p>
           <a:p>
@@ -3617,7 +3580,6 @@
               <a:rPr lang="fr-FR" b="0" baseline="0" dirty="0" smtClean="0"/>
               <a:t>OK mais nécessite 30px au lieux de 32px</a:t>
             </a:r>
-            <a:endParaRPr lang="fr-FR" b="0" baseline="0" dirty="0" smtClean="0"/>
           </a:p>
           <a:p>
             <a:pPr marL="171450" indent="-171450">
@@ -3695,15 +3657,7 @@
             </a:pPr>
             <a:r>
               <a:rPr lang="fr-FR" b="1" baseline="0" dirty="0" smtClean="0"/>
-              <a:t>Même </a:t>
-            </a:r>
-            <a:r>
-              <a:rPr lang="fr-FR" b="1" baseline="0" dirty="0" smtClean="0"/>
-              <a:t>principe appliqué </a:t>
-            </a:r>
-            <a:r>
-              <a:rPr lang="fr-FR" b="1" baseline="0" dirty="0" smtClean="0"/>
-              <a:t>pour les blocs déplaçables</a:t>
+              <a:t>Même principe appliqué pour les blocs déplaçables</a:t>
             </a:r>
           </a:p>
           <a:p>
@@ -9322,15 +9276,7 @@
                   <a:srgbClr val="C50000"/>
                 </a:solidFill>
               </a:rPr>
-              <a:t>Steve </a:t>
-            </a:r>
-            <a:r>
-              <a:rPr lang="fr-FR" dirty="0" smtClean="0">
-                <a:solidFill>
-                  <a:srgbClr val="C50000"/>
-                </a:solidFill>
-              </a:rPr>
-              <a:t>Visinand</a:t>
+              <a:t>Steve Visinand</a:t>
             </a:r>
             <a:endParaRPr lang="fr-FR" sz="1200" dirty="0">
               <a:solidFill>
@@ -9483,7 +9429,7 @@
         </p:blipFill>
         <p:spPr>
           <a:xfrm>
-            <a:off x="2980028" y="5535422"/>
+            <a:off x="3124051" y="5535422"/>
             <a:ext cx="3091599" cy="441840"/>
           </a:xfrm>
           <a:prstGeom prst="rect">
@@ -10607,7 +10553,6 @@
               <a:rPr lang="fr-FR" dirty="0" smtClean="0"/>
               <a:t>Poisson</a:t>
             </a:r>
-            <a:endParaRPr lang="fr-FR" dirty="0" smtClean="0"/>
           </a:p>
         </p:txBody>
       </p:sp>

</xml_diff>